<commit_message>
Update Real Time Actions with Configuration Manager.pptx
</commit_message>
<xml_diff>
--- a/September122019/Real Time Actions with Configuration Manager.pptx
+++ b/September122019/Real Time Actions with Configuration Manager.pptx
@@ -6,7 +6,7 @@
     <p:sldMasterId id="2147483663" r:id="rId5"/>
   </p:sldMasterIdLst>
   <p:notesMasterIdLst>
-    <p:notesMasterId r:id="rId15"/>
+    <p:notesMasterId r:id="rId16"/>
   </p:notesMasterIdLst>
   <p:sldIdLst>
     <p:sldId id="1720" r:id="rId6"/>
@@ -15,9 +15,10 @@
     <p:sldId id="1722" r:id="rId9"/>
     <p:sldId id="1723" r:id="rId10"/>
     <p:sldId id="1724" r:id="rId11"/>
-    <p:sldId id="1527" r:id="rId12"/>
-    <p:sldId id="1529" r:id="rId13"/>
-    <p:sldId id="1532" r:id="rId14"/>
+    <p:sldId id="1725" r:id="rId12"/>
+    <p:sldId id="1527" r:id="rId13"/>
+    <p:sldId id="1529" r:id="rId14"/>
+    <p:sldId id="1532" r:id="rId15"/>
   </p:sldIdLst>
   <p:sldSz cx="12192000" cy="6858000"/>
   <p:notesSz cx="6858000" cy="9144000"/>
@@ -2968,6 +2969,927 @@
 </dgm:colorsDef>
 </file>
 
+<file path=ppt/diagrams/colors4.xml><?xml version="1.0" encoding="utf-8"?>
+<dgm:colorsDef xmlns:dgm="http://schemas.openxmlformats.org/drawingml/2006/diagram" xmlns:a="http://schemas.openxmlformats.org/drawingml/2006/main" uniqueId="urn:microsoft.com/office/officeart/2018/5/colors/Iconchunking_neutralicon_colorful1">
+  <dgm:title val=""/>
+  <dgm:desc val=""/>
+  <dgm:catLst>
+    <dgm:cat type="colorful" pri="10100"/>
+  </dgm:catLst>
+  <dgm:styleLbl name="node0">
+    <dgm:fillClrLst meth="repeat">
+      <a:schemeClr val="accent1"/>
+    </dgm:fillClrLst>
+    <dgm:linClrLst meth="repeat">
+      <a:schemeClr val="lt1"/>
+    </dgm:linClrLst>
+    <dgm:effectClrLst/>
+    <dgm:txLinClrLst/>
+    <dgm:txFillClrLst/>
+    <dgm:txEffectClrLst/>
+  </dgm:styleLbl>
+  <dgm:styleLbl name="node1">
+    <dgm:fillClrLst meth="repeat">
+      <a:schemeClr val="bg1"/>
+    </dgm:fillClrLst>
+    <dgm:linClrLst meth="repeat">
+      <a:schemeClr val="lt1">
+        <a:alpha val="0"/>
+      </a:schemeClr>
+    </dgm:linClrLst>
+    <dgm:effectClrLst/>
+    <dgm:txLinClrLst/>
+    <dgm:txFillClrLst meth="repeat">
+      <a:schemeClr val="dk1"/>
+    </dgm:txFillClrLst>
+    <dgm:txEffectClrLst/>
+  </dgm:styleLbl>
+  <dgm:styleLbl name="alignNode1">
+    <dgm:fillClrLst meth="repeat">
+      <a:schemeClr val="accent2"/>
+      <a:schemeClr val="accent3"/>
+      <a:schemeClr val="accent4"/>
+      <a:schemeClr val="accent5"/>
+      <a:schemeClr val="accent6"/>
+    </dgm:fillClrLst>
+    <dgm:linClrLst meth="repeat">
+      <a:schemeClr val="accent2"/>
+      <a:schemeClr val="accent3"/>
+      <a:schemeClr val="accent4"/>
+      <a:schemeClr val="accent5"/>
+      <a:schemeClr val="accent6"/>
+    </dgm:linClrLst>
+    <dgm:effectClrLst/>
+    <dgm:txLinClrLst/>
+    <dgm:txFillClrLst/>
+    <dgm:txEffectClrLst/>
+  </dgm:styleLbl>
+  <dgm:styleLbl name="lnNode1">
+    <dgm:fillClrLst meth="repeat">
+      <a:schemeClr val="accent2"/>
+      <a:schemeClr val="accent3"/>
+      <a:schemeClr val="accent4"/>
+      <a:schemeClr val="accent5"/>
+      <a:schemeClr val="accent6"/>
+    </dgm:fillClrLst>
+    <dgm:linClrLst meth="repeat">
+      <a:schemeClr val="lt1"/>
+    </dgm:linClrLst>
+    <dgm:effectClrLst/>
+    <dgm:txLinClrLst/>
+    <dgm:txFillClrLst/>
+    <dgm:txEffectClrLst/>
+  </dgm:styleLbl>
+  <dgm:styleLbl name="vennNode1">
+    <dgm:fillClrLst meth="repeat">
+      <a:schemeClr val="accent2">
+        <a:alpha val="50000"/>
+      </a:schemeClr>
+      <a:schemeClr val="accent3">
+        <a:alpha val="50000"/>
+      </a:schemeClr>
+      <a:schemeClr val="accent4">
+        <a:alpha val="50000"/>
+      </a:schemeClr>
+      <a:schemeClr val="accent5">
+        <a:alpha val="50000"/>
+      </a:schemeClr>
+      <a:schemeClr val="accent6">
+        <a:alpha val="50000"/>
+      </a:schemeClr>
+    </dgm:fillClrLst>
+    <dgm:linClrLst meth="repeat">
+      <a:schemeClr val="lt1"/>
+    </dgm:linClrLst>
+    <dgm:effectClrLst/>
+    <dgm:txLinClrLst/>
+    <dgm:txFillClrLst/>
+    <dgm:txEffectClrLst/>
+  </dgm:styleLbl>
+  <dgm:styleLbl name="node2">
+    <dgm:fillClrLst>
+      <a:schemeClr val="accent2"/>
+    </dgm:fillClrLst>
+    <dgm:linClrLst meth="repeat">
+      <a:schemeClr val="lt1"/>
+    </dgm:linClrLst>
+    <dgm:effectClrLst/>
+    <dgm:txLinClrLst/>
+    <dgm:txFillClrLst/>
+    <dgm:txEffectClrLst/>
+  </dgm:styleLbl>
+  <dgm:styleLbl name="node3">
+    <dgm:fillClrLst>
+      <a:schemeClr val="accent3"/>
+    </dgm:fillClrLst>
+    <dgm:linClrLst meth="repeat">
+      <a:schemeClr val="lt1"/>
+    </dgm:linClrLst>
+    <dgm:effectClrLst/>
+    <dgm:txLinClrLst/>
+    <dgm:txFillClrLst/>
+    <dgm:txEffectClrLst/>
+  </dgm:styleLbl>
+  <dgm:styleLbl name="node4">
+    <dgm:fillClrLst>
+      <a:schemeClr val="accent4"/>
+    </dgm:fillClrLst>
+    <dgm:linClrLst meth="repeat">
+      <a:schemeClr val="lt1"/>
+    </dgm:linClrLst>
+    <dgm:effectClrLst/>
+    <dgm:txLinClrLst/>
+    <dgm:txFillClrLst/>
+    <dgm:txEffectClrLst/>
+  </dgm:styleLbl>
+  <dgm:styleLbl name="fgImgPlace1">
+    <dgm:fillClrLst meth="repeat">
+      <a:schemeClr val="accent2">
+        <a:tint val="50000"/>
+      </a:schemeClr>
+      <a:schemeClr val="accent3">
+        <a:tint val="50000"/>
+      </a:schemeClr>
+      <a:schemeClr val="accent4">
+        <a:tint val="50000"/>
+      </a:schemeClr>
+      <a:schemeClr val="accent5">
+        <a:tint val="50000"/>
+      </a:schemeClr>
+      <a:schemeClr val="accent6">
+        <a:tint val="50000"/>
+      </a:schemeClr>
+    </dgm:fillClrLst>
+    <dgm:linClrLst meth="repeat">
+      <a:schemeClr val="lt1"/>
+    </dgm:linClrLst>
+    <dgm:effectClrLst/>
+    <dgm:txLinClrLst/>
+    <dgm:txFillClrLst meth="repeat">
+      <a:schemeClr val="lt1"/>
+    </dgm:txFillClrLst>
+    <dgm:txEffectClrLst/>
+  </dgm:styleLbl>
+  <dgm:styleLbl name="alignImgPlace1">
+    <dgm:fillClrLst>
+      <a:schemeClr val="accent1">
+        <a:tint val="50000"/>
+      </a:schemeClr>
+      <a:schemeClr val="accent2">
+        <a:tint val="20000"/>
+      </a:schemeClr>
+    </dgm:fillClrLst>
+    <dgm:linClrLst meth="repeat">
+      <a:schemeClr val="lt1"/>
+    </dgm:linClrLst>
+    <dgm:effectClrLst/>
+    <dgm:txLinClrLst/>
+    <dgm:txFillClrLst meth="repeat">
+      <a:schemeClr val="lt1"/>
+    </dgm:txFillClrLst>
+    <dgm:txEffectClrLst/>
+  </dgm:styleLbl>
+  <dgm:styleLbl name="bgImgPlace1">
+    <dgm:fillClrLst>
+      <a:schemeClr val="accent1">
+        <a:tint val="50000"/>
+      </a:schemeClr>
+      <a:schemeClr val="accent2">
+        <a:tint val="20000"/>
+      </a:schemeClr>
+    </dgm:fillClrLst>
+    <dgm:linClrLst meth="repeat">
+      <a:schemeClr val="lt1"/>
+    </dgm:linClrLst>
+    <dgm:effectClrLst/>
+    <dgm:txLinClrLst/>
+    <dgm:txFillClrLst meth="repeat">
+      <a:schemeClr val="lt1"/>
+    </dgm:txFillClrLst>
+    <dgm:txEffectClrLst/>
+  </dgm:styleLbl>
+  <dgm:styleLbl name="sibTrans2D1">
+    <dgm:fillClrLst meth="repeat">
+      <a:schemeClr val="accent2"/>
+      <a:schemeClr val="accent3"/>
+      <a:schemeClr val="accent4"/>
+      <a:schemeClr val="accent5"/>
+      <a:schemeClr val="accent6"/>
+    </dgm:fillClrLst>
+    <dgm:linClrLst meth="cycle">
+      <a:schemeClr val="lt1"/>
+    </dgm:linClrLst>
+    <dgm:effectClrLst/>
+    <dgm:txLinClrLst/>
+    <dgm:txFillClrLst/>
+    <dgm:txEffectClrLst/>
+  </dgm:styleLbl>
+  <dgm:styleLbl name="fgSibTrans2D1">
+    <dgm:fillClrLst meth="repeat">
+      <a:schemeClr val="accent2"/>
+      <a:schemeClr val="accent3"/>
+      <a:schemeClr val="accent4"/>
+      <a:schemeClr val="accent5"/>
+      <a:schemeClr val="accent6"/>
+    </dgm:fillClrLst>
+    <dgm:linClrLst meth="cycle">
+      <a:schemeClr val="lt1"/>
+    </dgm:linClrLst>
+    <dgm:effectClrLst/>
+    <dgm:txLinClrLst/>
+    <dgm:txFillClrLst meth="repeat">
+      <a:schemeClr val="lt1"/>
+    </dgm:txFillClrLst>
+    <dgm:txEffectClrLst/>
+  </dgm:styleLbl>
+  <dgm:styleLbl name="bgSibTrans2D1">
+    <dgm:fillClrLst meth="repeat">
+      <a:schemeClr val="accent2"/>
+      <a:schemeClr val="accent3"/>
+      <a:schemeClr val="accent4"/>
+      <a:schemeClr val="accent5"/>
+      <a:schemeClr val="accent6"/>
+    </dgm:fillClrLst>
+    <dgm:linClrLst meth="cycle">
+      <a:schemeClr val="lt1"/>
+    </dgm:linClrLst>
+    <dgm:effectClrLst/>
+    <dgm:txLinClrLst/>
+    <dgm:txFillClrLst meth="repeat">
+      <a:schemeClr val="lt1"/>
+    </dgm:txFillClrLst>
+    <dgm:txEffectClrLst/>
+  </dgm:styleLbl>
+  <dgm:styleLbl name="sibTrans1D1">
+    <dgm:fillClrLst meth="repeat">
+      <a:schemeClr val="accent2"/>
+      <a:schemeClr val="accent3"/>
+      <a:schemeClr val="accent4"/>
+      <a:schemeClr val="accent5"/>
+      <a:schemeClr val="accent6"/>
+    </dgm:fillClrLst>
+    <dgm:linClrLst meth="repeat">
+      <a:schemeClr val="accent2"/>
+      <a:schemeClr val="accent3"/>
+      <a:schemeClr val="accent4"/>
+      <a:schemeClr val="accent5"/>
+      <a:schemeClr val="accent6"/>
+    </dgm:linClrLst>
+    <dgm:effectClrLst/>
+    <dgm:txLinClrLst/>
+    <dgm:txFillClrLst meth="repeat">
+      <a:schemeClr val="tx1"/>
+    </dgm:txFillClrLst>
+    <dgm:txEffectClrLst/>
+  </dgm:styleLbl>
+  <dgm:styleLbl name="callout">
+    <dgm:fillClrLst meth="repeat">
+      <a:schemeClr val="accent2"/>
+    </dgm:fillClrLst>
+    <dgm:linClrLst meth="repeat">
+      <a:schemeClr val="accent2">
+        <a:tint val="50000"/>
+      </a:schemeClr>
+    </dgm:linClrLst>
+    <dgm:effectClrLst/>
+    <dgm:txLinClrLst/>
+    <dgm:txFillClrLst meth="repeat">
+      <a:schemeClr val="tx1"/>
+    </dgm:txFillClrLst>
+    <dgm:txEffectClrLst/>
+  </dgm:styleLbl>
+  <dgm:styleLbl name="asst0">
+    <dgm:fillClrLst meth="repeat">
+      <a:schemeClr val="accent1"/>
+    </dgm:fillClrLst>
+    <dgm:linClrLst meth="repeat">
+      <a:schemeClr val="lt1"/>
+    </dgm:linClrLst>
+    <dgm:effectClrLst/>
+    <dgm:txLinClrLst/>
+    <dgm:txFillClrLst/>
+    <dgm:txEffectClrLst/>
+  </dgm:styleLbl>
+  <dgm:styleLbl name="asst1">
+    <dgm:fillClrLst meth="repeat">
+      <a:schemeClr val="accent2"/>
+    </dgm:fillClrLst>
+    <dgm:linClrLst meth="repeat">
+      <a:schemeClr val="lt1"/>
+    </dgm:linClrLst>
+    <dgm:effectClrLst/>
+    <dgm:txLinClrLst/>
+    <dgm:txFillClrLst/>
+    <dgm:txEffectClrLst/>
+  </dgm:styleLbl>
+  <dgm:styleLbl name="asst2">
+    <dgm:fillClrLst>
+      <a:schemeClr val="accent3"/>
+    </dgm:fillClrLst>
+    <dgm:linClrLst meth="repeat">
+      <a:schemeClr val="lt1"/>
+    </dgm:linClrLst>
+    <dgm:effectClrLst/>
+    <dgm:txLinClrLst/>
+    <dgm:txFillClrLst/>
+    <dgm:txEffectClrLst/>
+  </dgm:styleLbl>
+  <dgm:styleLbl name="asst3">
+    <dgm:fillClrLst>
+      <a:schemeClr val="accent4"/>
+    </dgm:fillClrLst>
+    <dgm:linClrLst meth="repeat">
+      <a:schemeClr val="lt1"/>
+    </dgm:linClrLst>
+    <dgm:effectClrLst/>
+    <dgm:txLinClrLst/>
+    <dgm:txFillClrLst/>
+    <dgm:txEffectClrLst/>
+  </dgm:styleLbl>
+  <dgm:styleLbl name="asst4">
+    <dgm:fillClrLst>
+      <a:schemeClr val="accent5"/>
+    </dgm:fillClrLst>
+    <dgm:linClrLst meth="repeat">
+      <a:schemeClr val="lt1"/>
+    </dgm:linClrLst>
+    <dgm:effectClrLst/>
+    <dgm:txLinClrLst/>
+    <dgm:txFillClrLst/>
+    <dgm:txEffectClrLst/>
+  </dgm:styleLbl>
+  <dgm:styleLbl name="parChTrans2D1">
+    <dgm:fillClrLst meth="repeat">
+      <a:schemeClr val="accent2"/>
+    </dgm:fillClrLst>
+    <dgm:linClrLst meth="repeat">
+      <a:schemeClr val="lt1"/>
+    </dgm:linClrLst>
+    <dgm:effectClrLst/>
+    <dgm:txLinClrLst/>
+    <dgm:txFillClrLst meth="repeat">
+      <a:schemeClr val="lt1"/>
+    </dgm:txFillClrLst>
+    <dgm:txEffectClrLst/>
+  </dgm:styleLbl>
+  <dgm:styleLbl name="parChTrans2D2">
+    <dgm:fillClrLst meth="repeat">
+      <a:schemeClr val="accent3"/>
+    </dgm:fillClrLst>
+    <dgm:linClrLst meth="repeat">
+      <a:schemeClr val="lt1"/>
+    </dgm:linClrLst>
+    <dgm:effectClrLst/>
+    <dgm:txLinClrLst/>
+    <dgm:txFillClrLst/>
+    <dgm:txEffectClrLst/>
+  </dgm:styleLbl>
+  <dgm:styleLbl name="parChTrans2D3">
+    <dgm:fillClrLst meth="repeat">
+      <a:schemeClr val="accent4"/>
+    </dgm:fillClrLst>
+    <dgm:linClrLst meth="repeat">
+      <a:schemeClr val="lt1"/>
+    </dgm:linClrLst>
+    <dgm:effectClrLst/>
+    <dgm:txLinClrLst/>
+    <dgm:txFillClrLst/>
+    <dgm:txEffectClrLst/>
+  </dgm:styleLbl>
+  <dgm:styleLbl name="parChTrans2D4">
+    <dgm:fillClrLst meth="repeat">
+      <a:schemeClr val="accent5"/>
+    </dgm:fillClrLst>
+    <dgm:linClrLst meth="repeat">
+      <a:schemeClr val="lt1"/>
+    </dgm:linClrLst>
+    <dgm:effectClrLst/>
+    <dgm:txLinClrLst/>
+    <dgm:txFillClrLst meth="repeat">
+      <a:schemeClr val="lt1"/>
+    </dgm:txFillClrLst>
+    <dgm:txEffectClrLst/>
+  </dgm:styleLbl>
+  <dgm:styleLbl name="parChTrans1D1">
+    <dgm:fillClrLst meth="repeat">
+      <a:schemeClr val="accent2"/>
+    </dgm:fillClrLst>
+    <dgm:linClrLst meth="repeat">
+      <a:schemeClr val="accent1"/>
+    </dgm:linClrLst>
+    <dgm:effectClrLst/>
+    <dgm:txLinClrLst/>
+    <dgm:txFillClrLst meth="repeat">
+      <a:schemeClr val="tx1"/>
+    </dgm:txFillClrLst>
+    <dgm:txEffectClrLst/>
+  </dgm:styleLbl>
+  <dgm:styleLbl name="parChTrans1D2">
+    <dgm:fillClrLst meth="repeat">
+      <a:schemeClr val="accent3">
+        <a:tint val="90000"/>
+      </a:schemeClr>
+    </dgm:fillClrLst>
+    <dgm:linClrLst meth="repeat">
+      <a:schemeClr val="accent2"/>
+    </dgm:linClrLst>
+    <dgm:effectClrLst/>
+    <dgm:txLinClrLst/>
+    <dgm:txFillClrLst meth="repeat">
+      <a:schemeClr val="tx1"/>
+    </dgm:txFillClrLst>
+    <dgm:txEffectClrLst/>
+  </dgm:styleLbl>
+  <dgm:styleLbl name="parChTrans1D3">
+    <dgm:fillClrLst meth="repeat">
+      <a:schemeClr val="accent4">
+        <a:tint val="70000"/>
+      </a:schemeClr>
+    </dgm:fillClrLst>
+    <dgm:linClrLst meth="repeat">
+      <a:schemeClr val="accent3"/>
+    </dgm:linClrLst>
+    <dgm:effectClrLst/>
+    <dgm:txLinClrLst/>
+    <dgm:txFillClrLst meth="repeat">
+      <a:schemeClr val="tx1"/>
+    </dgm:txFillClrLst>
+    <dgm:txEffectClrLst/>
+  </dgm:styleLbl>
+  <dgm:styleLbl name="parChTrans1D4">
+    <dgm:fillClrLst meth="repeat">
+      <a:schemeClr val="accent5">
+        <a:tint val="50000"/>
+      </a:schemeClr>
+    </dgm:fillClrLst>
+    <dgm:linClrLst meth="repeat">
+      <a:schemeClr val="accent4"/>
+    </dgm:linClrLst>
+    <dgm:effectClrLst/>
+    <dgm:txLinClrLst/>
+    <dgm:txFillClrLst meth="repeat">
+      <a:schemeClr val="tx1"/>
+    </dgm:txFillClrLst>
+    <dgm:txEffectClrLst/>
+  </dgm:styleLbl>
+  <dgm:styleLbl name="fgAcc1">
+    <dgm:fillClrLst meth="repeat">
+      <a:schemeClr val="lt1">
+        <a:alpha val="90000"/>
+      </a:schemeClr>
+    </dgm:fillClrLst>
+    <dgm:linClrLst meth="repeat">
+      <a:schemeClr val="accent2"/>
+      <a:schemeClr val="accent3"/>
+      <a:schemeClr val="accent4"/>
+      <a:schemeClr val="accent5"/>
+      <a:schemeClr val="accent6"/>
+    </dgm:linClrLst>
+    <dgm:effectClrLst/>
+    <dgm:txLinClrLst/>
+    <dgm:txFillClrLst meth="repeat">
+      <a:schemeClr val="dk1"/>
+    </dgm:txFillClrLst>
+    <dgm:txEffectClrLst/>
+  </dgm:styleLbl>
+  <dgm:styleLbl name="conFgAcc1">
+    <dgm:fillClrLst meth="repeat">
+      <a:schemeClr val="lt1">
+        <a:alpha val="90000"/>
+      </a:schemeClr>
+    </dgm:fillClrLst>
+    <dgm:linClrLst meth="repeat">
+      <a:schemeClr val="accent2"/>
+      <a:schemeClr val="accent3"/>
+      <a:schemeClr val="accent4"/>
+      <a:schemeClr val="accent5"/>
+      <a:schemeClr val="accent6"/>
+    </dgm:linClrLst>
+    <dgm:effectClrLst/>
+    <dgm:txLinClrLst/>
+    <dgm:txFillClrLst meth="repeat">
+      <a:schemeClr val="dk1"/>
+    </dgm:txFillClrLst>
+    <dgm:txEffectClrLst/>
+  </dgm:styleLbl>
+  <dgm:styleLbl name="alignAcc1">
+    <dgm:fillClrLst meth="repeat">
+      <a:schemeClr val="lt1">
+        <a:alpha val="90000"/>
+      </a:schemeClr>
+    </dgm:fillClrLst>
+    <dgm:linClrLst meth="repeat">
+      <a:schemeClr val="accent2"/>
+      <a:schemeClr val="accent3"/>
+      <a:schemeClr val="accent4"/>
+      <a:schemeClr val="accent5"/>
+      <a:schemeClr val="accent6"/>
+    </dgm:linClrLst>
+    <dgm:effectClrLst/>
+    <dgm:txLinClrLst/>
+    <dgm:txFillClrLst meth="repeat">
+      <a:schemeClr val="dk1"/>
+    </dgm:txFillClrLst>
+    <dgm:txEffectClrLst/>
+  </dgm:styleLbl>
+  <dgm:styleLbl name="trAlignAcc1">
+    <dgm:fillClrLst meth="repeat">
+      <a:schemeClr val="lt1">
+        <a:alpha val="40000"/>
+      </a:schemeClr>
+    </dgm:fillClrLst>
+    <dgm:linClrLst meth="repeat">
+      <a:schemeClr val="accent1"/>
+    </dgm:linClrLst>
+    <dgm:effectClrLst/>
+    <dgm:txLinClrLst/>
+    <dgm:txFillClrLst meth="repeat">
+      <a:schemeClr val="dk1"/>
+    </dgm:txFillClrLst>
+    <dgm:txEffectClrLst/>
+  </dgm:styleLbl>
+  <dgm:styleLbl name="bgAcc1">
+    <dgm:fillClrLst meth="repeat">
+      <a:schemeClr val="lt1">
+        <a:alpha val="90000"/>
+      </a:schemeClr>
+    </dgm:fillClrLst>
+    <dgm:linClrLst meth="repeat">
+      <a:schemeClr val="accent2"/>
+      <a:schemeClr val="accent3"/>
+      <a:schemeClr val="accent4"/>
+      <a:schemeClr val="accent5"/>
+      <a:schemeClr val="accent6"/>
+    </dgm:linClrLst>
+    <dgm:effectClrLst/>
+    <dgm:txLinClrLst/>
+    <dgm:txFillClrLst meth="repeat">
+      <a:schemeClr val="dk1"/>
+    </dgm:txFillClrLst>
+    <dgm:txEffectClrLst/>
+  </dgm:styleLbl>
+  <dgm:styleLbl name="solidFgAcc1">
+    <dgm:fillClrLst meth="repeat">
+      <a:schemeClr val="lt1"/>
+    </dgm:fillClrLst>
+    <dgm:linClrLst meth="repeat">
+      <a:schemeClr val="accent2"/>
+      <a:schemeClr val="accent3"/>
+      <a:schemeClr val="accent4"/>
+      <a:schemeClr val="accent5"/>
+      <a:schemeClr val="accent6"/>
+    </dgm:linClrLst>
+    <dgm:effectClrLst/>
+    <dgm:txLinClrLst/>
+    <dgm:txFillClrLst meth="repeat">
+      <a:schemeClr val="dk1"/>
+    </dgm:txFillClrLst>
+    <dgm:txEffectClrLst/>
+  </dgm:styleLbl>
+  <dgm:styleLbl name="solidAlignAcc1">
+    <dgm:fillClrLst meth="repeat">
+      <a:schemeClr val="lt1"/>
+    </dgm:fillClrLst>
+    <dgm:linClrLst meth="repeat">
+      <a:schemeClr val="accent2"/>
+      <a:schemeClr val="accent3"/>
+      <a:schemeClr val="accent4"/>
+      <a:schemeClr val="accent5"/>
+      <a:schemeClr val="accent6"/>
+    </dgm:linClrLst>
+    <dgm:effectClrLst/>
+    <dgm:txLinClrLst/>
+    <dgm:txFillClrLst meth="repeat">
+      <a:schemeClr val="dk1"/>
+    </dgm:txFillClrLst>
+    <dgm:txEffectClrLst/>
+  </dgm:styleLbl>
+  <dgm:styleLbl name="solidBgAcc1">
+    <dgm:fillClrLst meth="repeat">
+      <a:schemeClr val="lt1"/>
+    </dgm:fillClrLst>
+    <dgm:linClrLst meth="repeat">
+      <a:schemeClr val="accent2"/>
+      <a:schemeClr val="accent3"/>
+      <a:schemeClr val="accent4"/>
+      <a:schemeClr val="accent5"/>
+      <a:schemeClr val="accent6"/>
+    </dgm:linClrLst>
+    <dgm:effectClrLst/>
+    <dgm:txLinClrLst/>
+    <dgm:txFillClrLst meth="repeat">
+      <a:schemeClr val="dk1"/>
+    </dgm:txFillClrLst>
+    <dgm:txEffectClrLst/>
+  </dgm:styleLbl>
+  <dgm:styleLbl name="fgAccFollowNode1">
+    <dgm:fillClrLst meth="repeat">
+      <a:schemeClr val="accent2">
+        <a:tint val="40000"/>
+        <a:alpha val="90000"/>
+      </a:schemeClr>
+      <a:schemeClr val="accent3">
+        <a:tint val="40000"/>
+        <a:alpha val="90000"/>
+      </a:schemeClr>
+      <a:schemeClr val="accent4">
+        <a:tint val="40000"/>
+        <a:alpha val="90000"/>
+      </a:schemeClr>
+      <a:schemeClr val="accent5">
+        <a:tint val="40000"/>
+        <a:alpha val="90000"/>
+      </a:schemeClr>
+      <a:schemeClr val="accent6">
+        <a:tint val="40000"/>
+        <a:alpha val="90000"/>
+      </a:schemeClr>
+    </dgm:fillClrLst>
+    <dgm:linClrLst meth="repeat">
+      <a:schemeClr val="accent2">
+        <a:tint val="40000"/>
+        <a:alpha val="90000"/>
+      </a:schemeClr>
+      <a:schemeClr val="accent3">
+        <a:tint val="40000"/>
+        <a:alpha val="90000"/>
+      </a:schemeClr>
+      <a:schemeClr val="accent4">
+        <a:tint val="40000"/>
+        <a:alpha val="90000"/>
+      </a:schemeClr>
+      <a:schemeClr val="accent5">
+        <a:tint val="40000"/>
+        <a:alpha val="90000"/>
+      </a:schemeClr>
+      <a:schemeClr val="accent6">
+        <a:tint val="40000"/>
+        <a:alpha val="90000"/>
+      </a:schemeClr>
+    </dgm:linClrLst>
+    <dgm:effectClrLst/>
+    <dgm:txLinClrLst/>
+    <dgm:txFillClrLst meth="repeat">
+      <a:schemeClr val="dk1"/>
+    </dgm:txFillClrLst>
+    <dgm:txEffectClrLst/>
+  </dgm:styleLbl>
+  <dgm:styleLbl name="alignAccFollowNode1">
+    <dgm:fillClrLst meth="repeat">
+      <a:schemeClr val="accent2">
+        <a:tint val="40000"/>
+        <a:alpha val="90000"/>
+      </a:schemeClr>
+      <a:schemeClr val="accent3">
+        <a:tint val="40000"/>
+        <a:alpha val="90000"/>
+      </a:schemeClr>
+      <a:schemeClr val="accent4">
+        <a:tint val="40000"/>
+        <a:alpha val="90000"/>
+      </a:schemeClr>
+      <a:schemeClr val="accent5">
+        <a:tint val="40000"/>
+        <a:alpha val="90000"/>
+      </a:schemeClr>
+      <a:schemeClr val="accent6">
+        <a:tint val="40000"/>
+        <a:alpha val="90000"/>
+      </a:schemeClr>
+    </dgm:fillClrLst>
+    <dgm:linClrLst meth="repeat">
+      <a:schemeClr val="accent2">
+        <a:tint val="40000"/>
+        <a:alpha val="90000"/>
+      </a:schemeClr>
+      <a:schemeClr val="accent3">
+        <a:tint val="40000"/>
+        <a:alpha val="90000"/>
+      </a:schemeClr>
+      <a:schemeClr val="accent4">
+        <a:tint val="40000"/>
+        <a:alpha val="90000"/>
+      </a:schemeClr>
+      <a:schemeClr val="accent5">
+        <a:tint val="40000"/>
+        <a:alpha val="90000"/>
+      </a:schemeClr>
+      <a:schemeClr val="accent6">
+        <a:tint val="40000"/>
+        <a:alpha val="90000"/>
+      </a:schemeClr>
+    </dgm:linClrLst>
+    <dgm:effectClrLst/>
+    <dgm:txLinClrLst/>
+    <dgm:txFillClrLst meth="repeat">
+      <a:schemeClr val="dk1"/>
+    </dgm:txFillClrLst>
+    <dgm:txEffectClrLst/>
+  </dgm:styleLbl>
+  <dgm:styleLbl name="bgAccFollowNode1">
+    <dgm:fillClrLst meth="repeat">
+      <a:schemeClr val="accent2">
+        <a:tint val="40000"/>
+        <a:alpha val="90000"/>
+      </a:schemeClr>
+      <a:schemeClr val="accent3">
+        <a:tint val="40000"/>
+        <a:alpha val="90000"/>
+      </a:schemeClr>
+      <a:schemeClr val="accent4">
+        <a:tint val="40000"/>
+        <a:alpha val="90000"/>
+      </a:schemeClr>
+      <a:schemeClr val="accent5">
+        <a:tint val="40000"/>
+        <a:alpha val="90000"/>
+      </a:schemeClr>
+      <a:schemeClr val="accent6">
+        <a:tint val="40000"/>
+        <a:alpha val="90000"/>
+      </a:schemeClr>
+    </dgm:fillClrLst>
+    <dgm:linClrLst meth="repeat">
+      <a:schemeClr val="accent2">
+        <a:tint val="40000"/>
+        <a:alpha val="90000"/>
+      </a:schemeClr>
+      <a:schemeClr val="accent3">
+        <a:tint val="40000"/>
+        <a:alpha val="90000"/>
+      </a:schemeClr>
+      <a:schemeClr val="accent4">
+        <a:tint val="40000"/>
+        <a:alpha val="90000"/>
+      </a:schemeClr>
+      <a:schemeClr val="accent5">
+        <a:tint val="40000"/>
+        <a:alpha val="90000"/>
+      </a:schemeClr>
+      <a:schemeClr val="accent6">
+        <a:tint val="40000"/>
+        <a:alpha val="90000"/>
+      </a:schemeClr>
+    </dgm:linClrLst>
+    <dgm:effectClrLst/>
+    <dgm:txLinClrLst/>
+    <dgm:txFillClrLst meth="repeat">
+      <a:schemeClr val="dk1"/>
+    </dgm:txFillClrLst>
+    <dgm:txEffectClrLst/>
+  </dgm:styleLbl>
+  <dgm:styleLbl name="fgAcc0">
+    <dgm:fillClrLst meth="repeat">
+      <a:schemeClr val="lt1">
+        <a:alpha val="90000"/>
+      </a:schemeClr>
+    </dgm:fillClrLst>
+    <dgm:linClrLst>
+      <a:schemeClr val="accent1"/>
+    </dgm:linClrLst>
+    <dgm:effectClrLst/>
+    <dgm:txLinClrLst/>
+    <dgm:txFillClrLst meth="repeat">
+      <a:schemeClr val="dk1"/>
+    </dgm:txFillClrLst>
+    <dgm:txEffectClrLst/>
+  </dgm:styleLbl>
+  <dgm:styleLbl name="fgAcc2">
+    <dgm:fillClrLst meth="repeat">
+      <a:schemeClr val="lt1">
+        <a:alpha val="90000"/>
+      </a:schemeClr>
+    </dgm:fillClrLst>
+    <dgm:linClrLst>
+      <a:schemeClr val="accent2"/>
+    </dgm:linClrLst>
+    <dgm:effectClrLst/>
+    <dgm:txLinClrLst/>
+    <dgm:txFillClrLst meth="repeat">
+      <a:schemeClr val="dk1"/>
+    </dgm:txFillClrLst>
+    <dgm:txEffectClrLst/>
+  </dgm:styleLbl>
+  <dgm:styleLbl name="fgAcc3">
+    <dgm:fillClrLst meth="repeat">
+      <a:schemeClr val="lt1">
+        <a:alpha val="90000"/>
+      </a:schemeClr>
+    </dgm:fillClrLst>
+    <dgm:linClrLst>
+      <a:schemeClr val="accent3"/>
+    </dgm:linClrLst>
+    <dgm:effectClrLst/>
+    <dgm:txLinClrLst/>
+    <dgm:txFillClrLst meth="repeat">
+      <a:schemeClr val="dk1"/>
+    </dgm:txFillClrLst>
+    <dgm:txEffectClrLst/>
+  </dgm:styleLbl>
+  <dgm:styleLbl name="fgAcc4">
+    <dgm:fillClrLst meth="repeat">
+      <a:schemeClr val="lt1">
+        <a:alpha val="90000"/>
+      </a:schemeClr>
+    </dgm:fillClrLst>
+    <dgm:linClrLst>
+      <a:schemeClr val="accent4"/>
+    </dgm:linClrLst>
+    <dgm:effectClrLst/>
+    <dgm:txLinClrLst/>
+    <dgm:txFillClrLst meth="repeat">
+      <a:schemeClr val="dk1"/>
+    </dgm:txFillClrLst>
+    <dgm:txEffectClrLst/>
+  </dgm:styleLbl>
+  <dgm:styleLbl name="bgShp">
+    <dgm:fillClrLst meth="repeat">
+      <a:schemeClr val="accent2"/>
+      <a:schemeClr val="accent3"/>
+      <a:schemeClr val="accent4"/>
+      <a:schemeClr val="accent5"/>
+      <a:schemeClr val="accent6"/>
+    </dgm:fillClrLst>
+    <dgm:linClrLst meth="repeat">
+      <a:schemeClr val="lt1">
+        <a:alpha val="0"/>
+      </a:schemeClr>
+    </dgm:linClrLst>
+    <dgm:effectClrLst/>
+    <dgm:txLinClrLst/>
+    <dgm:txFillClrLst/>
+    <dgm:txEffectClrLst/>
+  </dgm:styleLbl>
+  <dgm:styleLbl name="dkBgShp">
+    <dgm:fillClrLst meth="repeat">
+      <a:schemeClr val="accent2">
+        <a:shade val="90000"/>
+      </a:schemeClr>
+    </dgm:fillClrLst>
+    <dgm:linClrLst meth="repeat">
+      <a:schemeClr val="dk1"/>
+    </dgm:linClrLst>
+    <dgm:effectClrLst/>
+    <dgm:txLinClrLst/>
+    <dgm:txFillClrLst meth="repeat">
+      <a:schemeClr val="lt1"/>
+    </dgm:txFillClrLst>
+    <dgm:txEffectClrLst/>
+  </dgm:styleLbl>
+  <dgm:styleLbl name="trBgShp">
+    <dgm:fillClrLst meth="repeat">
+      <a:schemeClr val="accent1">
+        <a:tint val="50000"/>
+        <a:alpha val="40000"/>
+      </a:schemeClr>
+    </dgm:fillClrLst>
+    <dgm:linClrLst meth="repeat">
+      <a:schemeClr val="accent2"/>
+    </dgm:linClrLst>
+    <dgm:effectClrLst/>
+    <dgm:txLinClrLst/>
+    <dgm:txFillClrLst meth="repeat">
+      <a:schemeClr val="lt1"/>
+    </dgm:txFillClrLst>
+    <dgm:txEffectClrLst/>
+  </dgm:styleLbl>
+  <dgm:styleLbl name="fgShp">
+    <dgm:fillClrLst meth="repeat">
+      <a:schemeClr val="accent2">
+        <a:tint val="40000"/>
+      </a:schemeClr>
+    </dgm:fillClrLst>
+    <dgm:linClrLst meth="repeat">
+      <a:schemeClr val="lt1"/>
+    </dgm:linClrLst>
+    <dgm:effectClrLst/>
+    <dgm:txLinClrLst/>
+    <dgm:txFillClrLst meth="repeat">
+      <a:schemeClr val="dk1"/>
+    </dgm:txFillClrLst>
+    <dgm:txEffectClrLst/>
+  </dgm:styleLbl>
+  <dgm:styleLbl name="revTx">
+    <dgm:fillClrLst meth="repeat">
+      <a:schemeClr val="lt1">
+        <a:alpha val="0"/>
+      </a:schemeClr>
+    </dgm:fillClrLst>
+    <dgm:linClrLst meth="repeat">
+      <a:schemeClr val="dk1">
+        <a:alpha val="0"/>
+      </a:schemeClr>
+    </dgm:linClrLst>
+    <dgm:effectClrLst/>
+    <dgm:txLinClrLst/>
+    <dgm:txFillClrLst meth="repeat">
+      <a:schemeClr val="tx1"/>
+    </dgm:txFillClrLst>
+    <dgm:txEffectClrLst/>
+  </dgm:styleLbl>
+</dgm:colorsDef>
+</file>
+
 <file path=ppt/diagrams/data1.xml><?xml version="1.0" encoding="utf-8"?>
 <dgm:dataModel xmlns:dgm="http://schemas.openxmlformats.org/drawingml/2006/diagram" xmlns:a="http://schemas.openxmlformats.org/drawingml/2006/main">
   <dgm:ptLst>
@@ -3211,7 +4133,7 @@
 <dgm:dataModel xmlns:dgm="http://schemas.openxmlformats.org/drawingml/2006/diagram" xmlns:a="http://schemas.openxmlformats.org/drawingml/2006/main">
   <dgm:ptLst>
     <dgm:pt modelId="{69FB414D-F4FE-4D19-BC69-31114E246949}" type="doc">
-      <dgm:prSet loTypeId="urn:microsoft.com/office/officeart/2005/8/layout/vList2" loCatId="list" qsTypeId="urn:microsoft.com/office/officeart/2005/8/quickstyle/simple1" qsCatId="simple" csTypeId="urn:microsoft.com/office/officeart/2005/8/colors/colorful5" csCatId="colorful"/>
+      <dgm:prSet loTypeId="urn:microsoft.com/office/officeart/2005/8/layout/vList2" loCatId="list" qsTypeId="urn:microsoft.com/office/officeart/2005/8/quickstyle/simple1" qsCatId="simple" csTypeId="urn:microsoft.com/office/officeart/2005/8/colors/colorful5" csCatId="colorful" phldr="1"/>
       <dgm:spPr/>
       <dgm:t>
         <a:bodyPr/>
@@ -3373,8 +4295,8 @@
         <a:lstStyle/>
         <a:p>
           <a:r>
-            <a:rPr lang="en-US"/>
-            <a:t>The Management Point will throttle the requests (Default is 42clients each second)</a:t>
+            <a:rPr lang="en-US" dirty="0"/>
+            <a:t>The Management Point will throttle the requests (Default is 42 clients each second)</a:t>
           </a:r>
         </a:p>
       </dgm:t>
@@ -4017,6 +4939,347 @@
     <dgm:cxn modelId="{424153A1-D281-4384-AE28-DB3D3597A323}" type="presParOf" srcId="{2F83FCF2-10A0-4860-954C-F70176725063}" destId="{7BA7ED95-5460-4DC3-8CFE-D502715E6486}" srcOrd="2" destOrd="0" presId="urn:microsoft.com/office/officeart/2018/2/layout/IconVerticalSolidList"/>
     <dgm:cxn modelId="{7AAA75CB-8C13-402D-A897-5A5F55430001}" type="presParOf" srcId="{2F83FCF2-10A0-4860-954C-F70176725063}" destId="{18D2509D-CB11-49D4-9483-9632AA3F55B2}" srcOrd="3" destOrd="0" presId="urn:microsoft.com/office/officeart/2018/2/layout/IconVerticalSolidList"/>
     <dgm:cxn modelId="{25BB3375-0A28-4643-9106-72D06F36ABDA}" type="presParOf" srcId="{2F83FCF2-10A0-4860-954C-F70176725063}" destId="{71A60E9A-4A80-4307-911D-C83237314352}" srcOrd="4" destOrd="0" presId="urn:microsoft.com/office/officeart/2018/2/layout/IconVerticalSolidList"/>
+  </dgm:cxnLst>
+  <dgm:bg/>
+  <dgm:whole/>
+  <dgm:extLst>
+    <a:ext uri="http://schemas.microsoft.com/office/drawing/2008/diagram">
+      <dsp:dataModelExt xmlns:dsp="http://schemas.microsoft.com/office/drawing/2008/diagram" relId="rId7" minVer="http://schemas.openxmlformats.org/drawingml/2006/diagram"/>
+    </a:ext>
+  </dgm:extLst>
+</dgm:dataModel>
+</file>
+
+<file path=ppt/diagrams/data4.xml><?xml version="1.0" encoding="utf-8"?>
+<dgm:dataModel xmlns:dgm="http://schemas.openxmlformats.org/drawingml/2006/diagram" xmlns:a="http://schemas.openxmlformats.org/drawingml/2006/main">
+  <dgm:ptLst>
+    <dgm:pt modelId="{DB6E0834-4762-462F-BE1A-9BEEAE12280A}" type="doc">
+      <dgm:prSet loTypeId="urn:microsoft.com/office/officeart/2018/5/layout/IconCircleLabelList" loCatId="icon" qsTypeId="urn:microsoft.com/office/officeart/2005/8/quickstyle/simple1" qsCatId="simple" csTypeId="urn:microsoft.com/office/officeart/2018/5/colors/Iconchunking_neutralicon_colorful1" csCatId="colorful" phldr="1"/>
+      <dgm:spPr/>
+      <dgm:t>
+        <a:bodyPr/>
+        <a:lstStyle/>
+        <a:p>
+          <a:endParaRPr lang="en-US"/>
+        </a:p>
+      </dgm:t>
+    </dgm:pt>
+    <dgm:pt modelId="{4689EB78-92F1-4512-899E-83034DA17902}">
+      <dgm:prSet/>
+      <dgm:spPr/>
+      <dgm:t>
+        <a:bodyPr/>
+        <a:lstStyle/>
+        <a:p>
+          <a:pPr>
+            <a:lnSpc>
+              <a:spcPct val="100000"/>
+            </a:lnSpc>
+            <a:defRPr cap="all"/>
+          </a:pPr>
+          <a:r>
+            <a:rPr lang="en-US"/>
+            <a:t>Realtime query</a:t>
+          </a:r>
+        </a:p>
+      </dgm:t>
+    </dgm:pt>
+    <dgm:pt modelId="{ED0AE7FD-A47F-4A0F-A3A5-1E759ADE5CC4}" type="parTrans" cxnId="{F52B3E0B-05D1-45C2-825E-F001154A81C6}">
+      <dgm:prSet/>
+      <dgm:spPr/>
+      <dgm:t>
+        <a:bodyPr/>
+        <a:lstStyle/>
+        <a:p>
+          <a:endParaRPr lang="en-US"/>
+        </a:p>
+      </dgm:t>
+    </dgm:pt>
+    <dgm:pt modelId="{04B1E19A-6D2B-4FF3-B4CE-38EEA1841C52}" type="sibTrans" cxnId="{F52B3E0B-05D1-45C2-825E-F001154A81C6}">
+      <dgm:prSet/>
+      <dgm:spPr/>
+      <dgm:t>
+        <a:bodyPr/>
+        <a:lstStyle/>
+        <a:p>
+          <a:endParaRPr lang="en-US"/>
+        </a:p>
+      </dgm:t>
+    </dgm:pt>
+    <dgm:pt modelId="{275CBBEE-C317-474A-9C10-82B25B32B859}">
+      <dgm:prSet/>
+      <dgm:spPr/>
+      <dgm:t>
+        <a:bodyPr/>
+        <a:lstStyle/>
+        <a:p>
+          <a:pPr>
+            <a:lnSpc>
+              <a:spcPct val="100000"/>
+            </a:lnSpc>
+            <a:defRPr cap="all"/>
+          </a:pPr>
+          <a:r>
+            <a:rPr lang="en-US"/>
+            <a:t>All queries are read only </a:t>
+          </a:r>
+        </a:p>
+      </dgm:t>
+    </dgm:pt>
+    <dgm:pt modelId="{F9458189-4C89-4472-9260-75CFB62035FB}" type="parTrans" cxnId="{07CBAE58-76E7-4F5A-BDF0-A20067C37AD8}">
+      <dgm:prSet/>
+      <dgm:spPr/>
+      <dgm:t>
+        <a:bodyPr/>
+        <a:lstStyle/>
+        <a:p>
+          <a:endParaRPr lang="en-US"/>
+        </a:p>
+      </dgm:t>
+    </dgm:pt>
+    <dgm:pt modelId="{D7D1BB46-8E21-4AF4-A2BF-7499B95EC329}" type="sibTrans" cxnId="{07CBAE58-76E7-4F5A-BDF0-A20067C37AD8}">
+      <dgm:prSet/>
+      <dgm:spPr/>
+      <dgm:t>
+        <a:bodyPr/>
+        <a:lstStyle/>
+        <a:p>
+          <a:endParaRPr lang="en-US"/>
+        </a:p>
+      </dgm:t>
+    </dgm:pt>
+    <dgm:pt modelId="{5233609D-A35C-4DFB-ABD0-ADE151BA04A3}">
+      <dgm:prSet/>
+      <dgm:spPr/>
+      <dgm:t>
+        <a:bodyPr/>
+        <a:lstStyle/>
+        <a:p>
+          <a:pPr>
+            <a:lnSpc>
+              <a:spcPct val="100000"/>
+            </a:lnSpc>
+            <a:defRPr cap="all"/>
+          </a:pPr>
+          <a:r>
+            <a:rPr lang="en-US"/>
+            <a:t>Scalable </a:t>
+          </a:r>
+        </a:p>
+      </dgm:t>
+    </dgm:pt>
+    <dgm:pt modelId="{502033CC-D3A0-4FA8-A852-4536588A5FA5}" type="parTrans" cxnId="{106BFDC0-0804-4AC6-BCAF-A8B861D7BBA7}">
+      <dgm:prSet/>
+      <dgm:spPr/>
+      <dgm:t>
+        <a:bodyPr/>
+        <a:lstStyle/>
+        <a:p>
+          <a:endParaRPr lang="en-US"/>
+        </a:p>
+      </dgm:t>
+    </dgm:pt>
+    <dgm:pt modelId="{320247A8-050E-4220-904F-893D19B33876}" type="sibTrans" cxnId="{106BFDC0-0804-4AC6-BCAF-A8B861D7BBA7}">
+      <dgm:prSet/>
+      <dgm:spPr/>
+      <dgm:t>
+        <a:bodyPr/>
+        <a:lstStyle/>
+        <a:p>
+          <a:endParaRPr lang="en-US"/>
+        </a:p>
+      </dgm:t>
+    </dgm:pt>
+    <dgm:pt modelId="{B6700D72-9753-4A30-B0DA-40D0A82C7059}" type="pres">
+      <dgm:prSet presAssocID="{DB6E0834-4762-462F-BE1A-9BEEAE12280A}" presName="root" presStyleCnt="0">
+        <dgm:presLayoutVars>
+          <dgm:dir/>
+          <dgm:resizeHandles val="exact"/>
+        </dgm:presLayoutVars>
+      </dgm:prSet>
+      <dgm:spPr/>
+    </dgm:pt>
+    <dgm:pt modelId="{91741D0C-4C87-462B-9D61-3A54E9A19BD1}" type="pres">
+      <dgm:prSet presAssocID="{4689EB78-92F1-4512-899E-83034DA17902}" presName="compNode" presStyleCnt="0"/>
+      <dgm:spPr/>
+    </dgm:pt>
+    <dgm:pt modelId="{E85BF76D-B020-421A-BE72-92782B798C3E}" type="pres">
+      <dgm:prSet presAssocID="{4689EB78-92F1-4512-899E-83034DA17902}" presName="iconBgRect" presStyleLbl="bgShp" presStyleIdx="0" presStyleCnt="3"/>
+      <dgm:spPr/>
+    </dgm:pt>
+    <dgm:pt modelId="{3ACC0A26-6D94-476A-BEB6-54DA42BFAE55}" type="pres">
+      <dgm:prSet presAssocID="{4689EB78-92F1-4512-899E-83034DA17902}" presName="iconRect" presStyleLbl="node1" presStyleIdx="0" presStyleCnt="3"/>
+      <dgm:spPr>
+        <a:blipFill>
+          <a:blip xmlns:r="http://schemas.openxmlformats.org/officeDocument/2006/relationships" r:embed="rId1">
+            <a:extLst>
+              <a:ext uri="{28A0092B-C50C-407E-A947-70E740481C1C}">
+                <a14:useLocalDpi xmlns:a14="http://schemas.microsoft.com/office/drawing/2010/main" val="0"/>
+              </a:ext>
+              <a:ext uri="{96DAC541-7B7A-43D3-8B79-37D633B846F1}">
+                <asvg:svgBlip xmlns:asvg="http://schemas.microsoft.com/office/drawing/2016/SVG/main" r:embed="rId2"/>
+              </a:ext>
+            </a:extLst>
+          </a:blip>
+          <a:stretch>
+            <a:fillRect/>
+          </a:stretch>
+        </a:blipFill>
+        <a:ln>
+          <a:noFill/>
+        </a:ln>
+      </dgm:spPr>
+      <dgm:extLst>
+        <a:ext uri="{E40237B7-FDA0-4F09-8148-C483321AD2D9}">
+          <dgm14:cNvPr xmlns:dgm14="http://schemas.microsoft.com/office/drawing/2010/diagram" id="0" name="" descr="Database"/>
+        </a:ext>
+      </dgm:extLst>
+    </dgm:pt>
+    <dgm:pt modelId="{E4B7D222-0610-4DB4-91C7-CE695FD31AA7}" type="pres">
+      <dgm:prSet presAssocID="{4689EB78-92F1-4512-899E-83034DA17902}" presName="spaceRect" presStyleCnt="0"/>
+      <dgm:spPr/>
+    </dgm:pt>
+    <dgm:pt modelId="{8E32A482-5666-47EB-B626-23D35384BA7B}" type="pres">
+      <dgm:prSet presAssocID="{4689EB78-92F1-4512-899E-83034DA17902}" presName="textRect" presStyleLbl="revTx" presStyleIdx="0" presStyleCnt="3">
+        <dgm:presLayoutVars>
+          <dgm:chMax val="1"/>
+          <dgm:chPref val="1"/>
+        </dgm:presLayoutVars>
+      </dgm:prSet>
+      <dgm:spPr/>
+    </dgm:pt>
+    <dgm:pt modelId="{517A7FFA-B0A0-4709-88A4-08848B4319B1}" type="pres">
+      <dgm:prSet presAssocID="{04B1E19A-6D2B-4FF3-B4CE-38EEA1841C52}" presName="sibTrans" presStyleCnt="0"/>
+      <dgm:spPr/>
+    </dgm:pt>
+    <dgm:pt modelId="{B3142C52-719A-4566-A321-8BF2F5107162}" type="pres">
+      <dgm:prSet presAssocID="{275CBBEE-C317-474A-9C10-82B25B32B859}" presName="compNode" presStyleCnt="0"/>
+      <dgm:spPr/>
+    </dgm:pt>
+    <dgm:pt modelId="{383B9F29-E11E-4D1B-8A8F-A9FDD9A966D5}" type="pres">
+      <dgm:prSet presAssocID="{275CBBEE-C317-474A-9C10-82B25B32B859}" presName="iconBgRect" presStyleLbl="bgShp" presStyleIdx="1" presStyleCnt="3"/>
+      <dgm:spPr/>
+    </dgm:pt>
+    <dgm:pt modelId="{682881E4-4465-40D9-BF79-2C7CB28E180B}" type="pres">
+      <dgm:prSet presAssocID="{275CBBEE-C317-474A-9C10-82B25B32B859}" presName="iconRect" presStyleLbl="node1" presStyleIdx="1" presStyleCnt="3"/>
+      <dgm:spPr>
+        <a:blipFill>
+          <a:blip xmlns:r="http://schemas.openxmlformats.org/officeDocument/2006/relationships" r:embed="rId3">
+            <a:extLst>
+              <a:ext uri="{28A0092B-C50C-407E-A947-70E740481C1C}">
+                <a14:useLocalDpi xmlns:a14="http://schemas.microsoft.com/office/drawing/2010/main" val="0"/>
+              </a:ext>
+              <a:ext uri="{96DAC541-7B7A-43D3-8B79-37D633B846F1}">
+                <asvg:svgBlip xmlns:asvg="http://schemas.microsoft.com/office/drawing/2016/SVG/main" r:embed="rId4"/>
+              </a:ext>
+            </a:extLst>
+          </a:blip>
+          <a:stretch>
+            <a:fillRect/>
+          </a:stretch>
+        </a:blipFill>
+        <a:ln>
+          <a:noFill/>
+        </a:ln>
+      </dgm:spPr>
+      <dgm:extLst>
+        <a:ext uri="{E40237B7-FDA0-4F09-8148-C483321AD2D9}">
+          <dgm14:cNvPr xmlns:dgm14="http://schemas.microsoft.com/office/drawing/2010/diagram" id="0" name="" descr="Open Book"/>
+        </a:ext>
+      </dgm:extLst>
+    </dgm:pt>
+    <dgm:pt modelId="{FD83F81C-1A7B-40C9-8283-20C545AEE951}" type="pres">
+      <dgm:prSet presAssocID="{275CBBEE-C317-474A-9C10-82B25B32B859}" presName="spaceRect" presStyleCnt="0"/>
+      <dgm:spPr/>
+    </dgm:pt>
+    <dgm:pt modelId="{1B90578C-6172-4362-9647-B024AFC805B9}" type="pres">
+      <dgm:prSet presAssocID="{275CBBEE-C317-474A-9C10-82B25B32B859}" presName="textRect" presStyleLbl="revTx" presStyleIdx="1" presStyleCnt="3">
+        <dgm:presLayoutVars>
+          <dgm:chMax val="1"/>
+          <dgm:chPref val="1"/>
+        </dgm:presLayoutVars>
+      </dgm:prSet>
+      <dgm:spPr/>
+    </dgm:pt>
+    <dgm:pt modelId="{9C311FF9-5A2E-446D-A66A-7F20A3BA5736}" type="pres">
+      <dgm:prSet presAssocID="{D7D1BB46-8E21-4AF4-A2BF-7499B95EC329}" presName="sibTrans" presStyleCnt="0"/>
+      <dgm:spPr/>
+    </dgm:pt>
+    <dgm:pt modelId="{54688DED-C0DE-4D1B-B2E8-E1900D2BAB60}" type="pres">
+      <dgm:prSet presAssocID="{5233609D-A35C-4DFB-ABD0-ADE151BA04A3}" presName="compNode" presStyleCnt="0"/>
+      <dgm:spPr/>
+    </dgm:pt>
+    <dgm:pt modelId="{2BD2C23A-7D65-469D-A2F2-6FBB26407249}" type="pres">
+      <dgm:prSet presAssocID="{5233609D-A35C-4DFB-ABD0-ADE151BA04A3}" presName="iconBgRect" presStyleLbl="bgShp" presStyleIdx="2" presStyleCnt="3"/>
+      <dgm:spPr/>
+    </dgm:pt>
+    <dgm:pt modelId="{782F0FFE-85F1-4D30-A8CE-4C238770105A}" type="pres">
+      <dgm:prSet presAssocID="{5233609D-A35C-4DFB-ABD0-ADE151BA04A3}" presName="iconRect" presStyleLbl="node1" presStyleIdx="2" presStyleCnt="3"/>
+      <dgm:spPr>
+        <a:blipFill>
+          <a:blip xmlns:r="http://schemas.openxmlformats.org/officeDocument/2006/relationships" r:embed="rId5">
+            <a:extLst>
+              <a:ext uri="{28A0092B-C50C-407E-A947-70E740481C1C}">
+                <a14:useLocalDpi xmlns:a14="http://schemas.microsoft.com/office/drawing/2010/main" val="0"/>
+              </a:ext>
+              <a:ext uri="{96DAC541-7B7A-43D3-8B79-37D633B846F1}">
+                <asvg:svgBlip xmlns:asvg="http://schemas.microsoft.com/office/drawing/2016/SVG/main" r:embed="rId6"/>
+              </a:ext>
+            </a:extLst>
+          </a:blip>
+          <a:stretch>
+            <a:fillRect/>
+          </a:stretch>
+        </a:blipFill>
+        <a:ln>
+          <a:noFill/>
+        </a:ln>
+      </dgm:spPr>
+      <dgm:extLst>
+        <a:ext uri="{E40237B7-FDA0-4F09-8148-C483321AD2D9}">
+          <dgm14:cNvPr xmlns:dgm14="http://schemas.microsoft.com/office/drawing/2010/diagram" id="0" name="" descr="Upward trend"/>
+        </a:ext>
+      </dgm:extLst>
+    </dgm:pt>
+    <dgm:pt modelId="{5AE68F57-457A-460A-BC7A-4157C3E8D471}" type="pres">
+      <dgm:prSet presAssocID="{5233609D-A35C-4DFB-ABD0-ADE151BA04A3}" presName="spaceRect" presStyleCnt="0"/>
+      <dgm:spPr/>
+    </dgm:pt>
+    <dgm:pt modelId="{08694DCA-522E-442F-B787-CC35C68896A6}" type="pres">
+      <dgm:prSet presAssocID="{5233609D-A35C-4DFB-ABD0-ADE151BA04A3}" presName="textRect" presStyleLbl="revTx" presStyleIdx="2" presStyleCnt="3">
+        <dgm:presLayoutVars>
+          <dgm:chMax val="1"/>
+          <dgm:chPref val="1"/>
+        </dgm:presLayoutVars>
+      </dgm:prSet>
+      <dgm:spPr/>
+    </dgm:pt>
+  </dgm:ptLst>
+  <dgm:cxnLst>
+    <dgm:cxn modelId="{F52B3E0B-05D1-45C2-825E-F001154A81C6}" srcId="{DB6E0834-4762-462F-BE1A-9BEEAE12280A}" destId="{4689EB78-92F1-4512-899E-83034DA17902}" srcOrd="0" destOrd="0" parTransId="{ED0AE7FD-A47F-4A0F-A3A5-1E759ADE5CC4}" sibTransId="{04B1E19A-6D2B-4FF3-B4CE-38EEA1841C52}"/>
+    <dgm:cxn modelId="{0A9A690D-8708-4510-983E-ED3052B7F986}" type="presOf" srcId="{4689EB78-92F1-4512-899E-83034DA17902}" destId="{8E32A482-5666-47EB-B626-23D35384BA7B}" srcOrd="0" destOrd="0" presId="urn:microsoft.com/office/officeart/2018/5/layout/IconCircleLabelList"/>
+    <dgm:cxn modelId="{07CBAE58-76E7-4F5A-BDF0-A20067C37AD8}" srcId="{DB6E0834-4762-462F-BE1A-9BEEAE12280A}" destId="{275CBBEE-C317-474A-9C10-82B25B32B859}" srcOrd="1" destOrd="0" parTransId="{F9458189-4C89-4472-9260-75CFB62035FB}" sibTransId="{D7D1BB46-8E21-4AF4-A2BF-7499B95EC329}"/>
+    <dgm:cxn modelId="{DBF38EB6-C840-4D88-84B7-2C25738CD6D5}" type="presOf" srcId="{275CBBEE-C317-474A-9C10-82B25B32B859}" destId="{1B90578C-6172-4362-9647-B024AFC805B9}" srcOrd="0" destOrd="0" presId="urn:microsoft.com/office/officeart/2018/5/layout/IconCircleLabelList"/>
+    <dgm:cxn modelId="{106BFDC0-0804-4AC6-BCAF-A8B861D7BBA7}" srcId="{DB6E0834-4762-462F-BE1A-9BEEAE12280A}" destId="{5233609D-A35C-4DFB-ABD0-ADE151BA04A3}" srcOrd="2" destOrd="0" parTransId="{502033CC-D3A0-4FA8-A852-4536588A5FA5}" sibTransId="{320247A8-050E-4220-904F-893D19B33876}"/>
+    <dgm:cxn modelId="{321405E0-8FC6-4037-B40D-146F452950E9}" type="presOf" srcId="{5233609D-A35C-4DFB-ABD0-ADE151BA04A3}" destId="{08694DCA-522E-442F-B787-CC35C68896A6}" srcOrd="0" destOrd="0" presId="urn:microsoft.com/office/officeart/2018/5/layout/IconCircleLabelList"/>
+    <dgm:cxn modelId="{738BB0EE-D0DD-436B-920B-4B8FA08F1810}" type="presOf" srcId="{DB6E0834-4762-462F-BE1A-9BEEAE12280A}" destId="{B6700D72-9753-4A30-B0DA-40D0A82C7059}" srcOrd="0" destOrd="0" presId="urn:microsoft.com/office/officeart/2018/5/layout/IconCircleLabelList"/>
+    <dgm:cxn modelId="{B2A5035E-C73E-4E2C-AA4A-D1F6AFD4BD6A}" type="presParOf" srcId="{B6700D72-9753-4A30-B0DA-40D0A82C7059}" destId="{91741D0C-4C87-462B-9D61-3A54E9A19BD1}" srcOrd="0" destOrd="0" presId="urn:microsoft.com/office/officeart/2018/5/layout/IconCircleLabelList"/>
+    <dgm:cxn modelId="{069C55D4-290F-427E-81CE-FD910E2FC9EE}" type="presParOf" srcId="{91741D0C-4C87-462B-9D61-3A54E9A19BD1}" destId="{E85BF76D-B020-421A-BE72-92782B798C3E}" srcOrd="0" destOrd="0" presId="urn:microsoft.com/office/officeart/2018/5/layout/IconCircleLabelList"/>
+    <dgm:cxn modelId="{349AF761-51EF-4E75-ACDE-2863E72CAF37}" type="presParOf" srcId="{91741D0C-4C87-462B-9D61-3A54E9A19BD1}" destId="{3ACC0A26-6D94-476A-BEB6-54DA42BFAE55}" srcOrd="1" destOrd="0" presId="urn:microsoft.com/office/officeart/2018/5/layout/IconCircleLabelList"/>
+    <dgm:cxn modelId="{2CF61029-8352-4D2C-8351-872F5FBECCEB}" type="presParOf" srcId="{91741D0C-4C87-462B-9D61-3A54E9A19BD1}" destId="{E4B7D222-0610-4DB4-91C7-CE695FD31AA7}" srcOrd="2" destOrd="0" presId="urn:microsoft.com/office/officeart/2018/5/layout/IconCircleLabelList"/>
+    <dgm:cxn modelId="{41DCB94D-1C3E-41B0-BF4C-919E0D7E3863}" type="presParOf" srcId="{91741D0C-4C87-462B-9D61-3A54E9A19BD1}" destId="{8E32A482-5666-47EB-B626-23D35384BA7B}" srcOrd="3" destOrd="0" presId="urn:microsoft.com/office/officeart/2018/5/layout/IconCircleLabelList"/>
+    <dgm:cxn modelId="{CA28EE7C-257F-4377-93A4-2441C37826D4}" type="presParOf" srcId="{B6700D72-9753-4A30-B0DA-40D0A82C7059}" destId="{517A7FFA-B0A0-4709-88A4-08848B4319B1}" srcOrd="1" destOrd="0" presId="urn:microsoft.com/office/officeart/2018/5/layout/IconCircleLabelList"/>
+    <dgm:cxn modelId="{5FC8EBE5-4F78-4E22-8094-974C66675367}" type="presParOf" srcId="{B6700D72-9753-4A30-B0DA-40D0A82C7059}" destId="{B3142C52-719A-4566-A321-8BF2F5107162}" srcOrd="2" destOrd="0" presId="urn:microsoft.com/office/officeart/2018/5/layout/IconCircleLabelList"/>
+    <dgm:cxn modelId="{76E03855-1F00-4A43-B73E-E506639AE847}" type="presParOf" srcId="{B3142C52-719A-4566-A321-8BF2F5107162}" destId="{383B9F29-E11E-4D1B-8A8F-A9FDD9A966D5}" srcOrd="0" destOrd="0" presId="urn:microsoft.com/office/officeart/2018/5/layout/IconCircleLabelList"/>
+    <dgm:cxn modelId="{D5CA5FC8-F941-4F05-99D8-0DA61565C64E}" type="presParOf" srcId="{B3142C52-719A-4566-A321-8BF2F5107162}" destId="{682881E4-4465-40D9-BF79-2C7CB28E180B}" srcOrd="1" destOrd="0" presId="urn:microsoft.com/office/officeart/2018/5/layout/IconCircleLabelList"/>
+    <dgm:cxn modelId="{09D47C66-3E5D-4672-87AB-1F393EAC7ADA}" type="presParOf" srcId="{B3142C52-719A-4566-A321-8BF2F5107162}" destId="{FD83F81C-1A7B-40C9-8283-20C545AEE951}" srcOrd="2" destOrd="0" presId="urn:microsoft.com/office/officeart/2018/5/layout/IconCircleLabelList"/>
+    <dgm:cxn modelId="{FF508F6D-1B71-4568-A187-3CA5E0EA5A60}" type="presParOf" srcId="{B3142C52-719A-4566-A321-8BF2F5107162}" destId="{1B90578C-6172-4362-9647-B024AFC805B9}" srcOrd="3" destOrd="0" presId="urn:microsoft.com/office/officeart/2018/5/layout/IconCircleLabelList"/>
+    <dgm:cxn modelId="{96B63284-4AE4-41A9-BA18-1D4BEEA49747}" type="presParOf" srcId="{B6700D72-9753-4A30-B0DA-40D0A82C7059}" destId="{9C311FF9-5A2E-446D-A66A-7F20A3BA5736}" srcOrd="3" destOrd="0" presId="urn:microsoft.com/office/officeart/2018/5/layout/IconCircleLabelList"/>
+    <dgm:cxn modelId="{D3CC9FB7-E32F-4C22-8DC2-63F35256F60C}" type="presParOf" srcId="{B6700D72-9753-4A30-B0DA-40D0A82C7059}" destId="{54688DED-C0DE-4D1B-B2E8-E1900D2BAB60}" srcOrd="4" destOrd="0" presId="urn:microsoft.com/office/officeart/2018/5/layout/IconCircleLabelList"/>
+    <dgm:cxn modelId="{917E8FBE-2138-4C6F-B6AC-9DAC33C275D4}" type="presParOf" srcId="{54688DED-C0DE-4D1B-B2E8-E1900D2BAB60}" destId="{2BD2C23A-7D65-469D-A2F2-6FBB26407249}" srcOrd="0" destOrd="0" presId="urn:microsoft.com/office/officeart/2018/5/layout/IconCircleLabelList"/>
+    <dgm:cxn modelId="{A64A090D-B4C5-456B-96E9-F7ADDA607086}" type="presParOf" srcId="{54688DED-C0DE-4D1B-B2E8-E1900D2BAB60}" destId="{782F0FFE-85F1-4D30-A8CE-4C238770105A}" srcOrd="1" destOrd="0" presId="urn:microsoft.com/office/officeart/2018/5/layout/IconCircleLabelList"/>
+    <dgm:cxn modelId="{ADDE4711-EE92-4C3F-912B-8D84710473FC}" type="presParOf" srcId="{54688DED-C0DE-4D1B-B2E8-E1900D2BAB60}" destId="{5AE68F57-457A-460A-BC7A-4157C3E8D471}" srcOrd="2" destOrd="0" presId="urn:microsoft.com/office/officeart/2018/5/layout/IconCircleLabelList"/>
+    <dgm:cxn modelId="{534C6B09-E74B-48E6-A114-61B405492E59}" type="presParOf" srcId="{54688DED-C0DE-4D1B-B2E8-E1900D2BAB60}" destId="{08694DCA-522E-442F-B787-CC35C68896A6}" srcOrd="3" destOrd="0" presId="urn:microsoft.com/office/officeart/2018/5/layout/IconCircleLabelList"/>
   </dgm:cxnLst>
   <dgm:bg/>
   <dgm:whole/>
@@ -4744,8 +6007,8 @@
             <a:buChar char="•"/>
           </a:pPr>
           <a:r>
-            <a:rPr lang="en-US" sz="1600" kern="1200"/>
-            <a:t>The Management Point will throttle the requests (Default is 42clients each second)</a:t>
+            <a:rPr lang="en-US" sz="1600" kern="1200" dirty="0"/>
+            <a:t>The Management Point will throttle the requests (Default is 42 clients each second)</a:t>
           </a:r>
         </a:p>
         <a:p>
@@ -5470,6 +6733,468 @@
 </dsp:drawing>
 </file>
 
+<file path=ppt/diagrams/drawing4.xml><?xml version="1.0" encoding="utf-8"?>
+<dsp:drawing xmlns:dgm="http://schemas.openxmlformats.org/drawingml/2006/diagram" xmlns:dsp="http://schemas.microsoft.com/office/drawing/2008/diagram" xmlns:a="http://schemas.openxmlformats.org/drawingml/2006/main">
+  <dsp:spTree>
+    <dsp:nvGrpSpPr>
+      <dsp:cNvPr id="0" name=""/>
+      <dsp:cNvGrpSpPr/>
+    </dsp:nvGrpSpPr>
+    <dsp:grpSpPr/>
+    <dsp:sp modelId="{E85BF76D-B020-421A-BE72-92782B798C3E}">
+      <dsp:nvSpPr>
+        <dsp:cNvPr id="0" name=""/>
+        <dsp:cNvSpPr/>
+      </dsp:nvSpPr>
+      <dsp:spPr>
+        <a:xfrm>
+          <a:off x="599625" y="233922"/>
+          <a:ext cx="1852875" cy="1852875"/>
+        </a:xfrm>
+        <a:prstGeom prst="ellipse">
+          <a:avLst/>
+        </a:prstGeom>
+        <a:solidFill>
+          <a:schemeClr val="accent2">
+            <a:hueOff val="0"/>
+            <a:satOff val="0"/>
+            <a:lumOff val="0"/>
+            <a:alphaOff val="0"/>
+          </a:schemeClr>
+        </a:solidFill>
+        <a:ln>
+          <a:noFill/>
+        </a:ln>
+        <a:effectLst/>
+      </dsp:spPr>
+      <dsp:style>
+        <a:lnRef idx="0">
+          <a:scrgbClr r="0" g="0" b="0"/>
+        </a:lnRef>
+        <a:fillRef idx="1">
+          <a:scrgbClr r="0" g="0" b="0"/>
+        </a:fillRef>
+        <a:effectRef idx="0">
+          <a:scrgbClr r="0" g="0" b="0"/>
+        </a:effectRef>
+        <a:fontRef idx="minor"/>
+      </dsp:style>
+    </dsp:sp>
+    <dsp:sp modelId="{3ACC0A26-6D94-476A-BEB6-54DA42BFAE55}">
+      <dsp:nvSpPr>
+        <dsp:cNvPr id="0" name=""/>
+        <dsp:cNvSpPr/>
+      </dsp:nvSpPr>
+      <dsp:spPr>
+        <a:xfrm>
+          <a:off x="994500" y="628797"/>
+          <a:ext cx="1063125" cy="1063125"/>
+        </a:xfrm>
+        <a:prstGeom prst="rect">
+          <a:avLst/>
+        </a:prstGeom>
+        <a:blipFill>
+          <a:blip xmlns:r="http://schemas.openxmlformats.org/officeDocument/2006/relationships" r:embed="rId1">
+            <a:extLst>
+              <a:ext uri="{28A0092B-C50C-407E-A947-70E740481C1C}">
+                <a14:useLocalDpi xmlns:a14="http://schemas.microsoft.com/office/drawing/2010/main" val="0"/>
+              </a:ext>
+              <a:ext uri="{96DAC541-7B7A-43D3-8B79-37D633B846F1}">
+                <asvg:svgBlip xmlns:asvg="http://schemas.microsoft.com/office/drawing/2016/SVG/main" r:embed="rId2"/>
+              </a:ext>
+            </a:extLst>
+          </a:blip>
+          <a:stretch>
+            <a:fillRect/>
+          </a:stretch>
+        </a:blipFill>
+        <a:ln w="12700" cap="flat" cmpd="sng" algn="ctr">
+          <a:noFill/>
+          <a:prstDash val="solid"/>
+          <a:miter lim="800000"/>
+        </a:ln>
+        <a:effectLst/>
+      </dsp:spPr>
+      <dsp:style>
+        <a:lnRef idx="2">
+          <a:scrgbClr r="0" g="0" b="0"/>
+        </a:lnRef>
+        <a:fillRef idx="1">
+          <a:scrgbClr r="0" g="0" b="0"/>
+        </a:fillRef>
+        <a:effectRef idx="0">
+          <a:scrgbClr r="0" g="0" b="0"/>
+        </a:effectRef>
+        <a:fontRef idx="minor">
+          <a:schemeClr val="lt1"/>
+        </a:fontRef>
+      </dsp:style>
+    </dsp:sp>
+    <dsp:sp modelId="{8E32A482-5666-47EB-B626-23D35384BA7B}">
+      <dsp:nvSpPr>
+        <dsp:cNvPr id="0" name=""/>
+        <dsp:cNvSpPr/>
+      </dsp:nvSpPr>
+      <dsp:spPr>
+        <a:xfrm>
+          <a:off x="7313" y="2663922"/>
+          <a:ext cx="3037500" cy="720000"/>
+        </a:xfrm>
+        <a:prstGeom prst="rect">
+          <a:avLst/>
+        </a:prstGeom>
+        <a:noFill/>
+        <a:ln>
+          <a:noFill/>
+        </a:ln>
+        <a:effectLst/>
+      </dsp:spPr>
+      <dsp:style>
+        <a:lnRef idx="0">
+          <a:scrgbClr r="0" g="0" b="0"/>
+        </a:lnRef>
+        <a:fillRef idx="0">
+          <a:scrgbClr r="0" g="0" b="0"/>
+        </a:fillRef>
+        <a:effectRef idx="0">
+          <a:scrgbClr r="0" g="0" b="0"/>
+        </a:effectRef>
+        <a:fontRef idx="minor"/>
+      </dsp:style>
+      <dsp:txBody>
+        <a:bodyPr spcFirstLastPara="0" vert="horz" wrap="square" lIns="0" tIns="0" rIns="0" bIns="0" numCol="1" spcCol="1270" anchor="t" anchorCtr="0">
+          <a:noAutofit/>
+        </a:bodyPr>
+        <a:lstStyle/>
+        <a:p>
+          <a:pPr marL="0" lvl="0" indent="0" algn="ctr" defTabSz="1022350">
+            <a:lnSpc>
+              <a:spcPct val="100000"/>
+            </a:lnSpc>
+            <a:spcBef>
+              <a:spcPct val="0"/>
+            </a:spcBef>
+            <a:spcAft>
+              <a:spcPct val="35000"/>
+            </a:spcAft>
+            <a:buNone/>
+            <a:defRPr cap="all"/>
+          </a:pPr>
+          <a:r>
+            <a:rPr lang="en-US" sz="2300" kern="1200"/>
+            <a:t>Realtime query</a:t>
+          </a:r>
+        </a:p>
+      </dsp:txBody>
+      <dsp:txXfrm>
+        <a:off x="7313" y="2663922"/>
+        <a:ext cx="3037500" cy="720000"/>
+      </dsp:txXfrm>
+    </dsp:sp>
+    <dsp:sp modelId="{383B9F29-E11E-4D1B-8A8F-A9FDD9A966D5}">
+      <dsp:nvSpPr>
+        <dsp:cNvPr id="0" name=""/>
+        <dsp:cNvSpPr/>
+      </dsp:nvSpPr>
+      <dsp:spPr>
+        <a:xfrm>
+          <a:off x="4168688" y="233922"/>
+          <a:ext cx="1852875" cy="1852875"/>
+        </a:xfrm>
+        <a:prstGeom prst="ellipse">
+          <a:avLst/>
+        </a:prstGeom>
+        <a:solidFill>
+          <a:schemeClr val="accent3">
+            <a:hueOff val="0"/>
+            <a:satOff val="0"/>
+            <a:lumOff val="0"/>
+            <a:alphaOff val="0"/>
+          </a:schemeClr>
+        </a:solidFill>
+        <a:ln>
+          <a:noFill/>
+        </a:ln>
+        <a:effectLst/>
+      </dsp:spPr>
+      <dsp:style>
+        <a:lnRef idx="0">
+          <a:scrgbClr r="0" g="0" b="0"/>
+        </a:lnRef>
+        <a:fillRef idx="1">
+          <a:scrgbClr r="0" g="0" b="0"/>
+        </a:fillRef>
+        <a:effectRef idx="0">
+          <a:scrgbClr r="0" g="0" b="0"/>
+        </a:effectRef>
+        <a:fontRef idx="minor"/>
+      </dsp:style>
+    </dsp:sp>
+    <dsp:sp modelId="{682881E4-4465-40D9-BF79-2C7CB28E180B}">
+      <dsp:nvSpPr>
+        <dsp:cNvPr id="0" name=""/>
+        <dsp:cNvSpPr/>
+      </dsp:nvSpPr>
+      <dsp:spPr>
+        <a:xfrm>
+          <a:off x="4563563" y="628797"/>
+          <a:ext cx="1063125" cy="1063125"/>
+        </a:xfrm>
+        <a:prstGeom prst="rect">
+          <a:avLst/>
+        </a:prstGeom>
+        <a:blipFill>
+          <a:blip xmlns:r="http://schemas.openxmlformats.org/officeDocument/2006/relationships" r:embed="rId3">
+            <a:extLst>
+              <a:ext uri="{28A0092B-C50C-407E-A947-70E740481C1C}">
+                <a14:useLocalDpi xmlns:a14="http://schemas.microsoft.com/office/drawing/2010/main" val="0"/>
+              </a:ext>
+              <a:ext uri="{96DAC541-7B7A-43D3-8B79-37D633B846F1}">
+                <asvg:svgBlip xmlns:asvg="http://schemas.microsoft.com/office/drawing/2016/SVG/main" r:embed="rId4"/>
+              </a:ext>
+            </a:extLst>
+          </a:blip>
+          <a:stretch>
+            <a:fillRect/>
+          </a:stretch>
+        </a:blipFill>
+        <a:ln w="12700" cap="flat" cmpd="sng" algn="ctr">
+          <a:noFill/>
+          <a:prstDash val="solid"/>
+          <a:miter lim="800000"/>
+        </a:ln>
+        <a:effectLst/>
+      </dsp:spPr>
+      <dsp:style>
+        <a:lnRef idx="2">
+          <a:scrgbClr r="0" g="0" b="0"/>
+        </a:lnRef>
+        <a:fillRef idx="1">
+          <a:scrgbClr r="0" g="0" b="0"/>
+        </a:fillRef>
+        <a:effectRef idx="0">
+          <a:scrgbClr r="0" g="0" b="0"/>
+        </a:effectRef>
+        <a:fontRef idx="minor">
+          <a:schemeClr val="lt1"/>
+        </a:fontRef>
+      </dsp:style>
+    </dsp:sp>
+    <dsp:sp modelId="{1B90578C-6172-4362-9647-B024AFC805B9}">
+      <dsp:nvSpPr>
+        <dsp:cNvPr id="0" name=""/>
+        <dsp:cNvSpPr/>
+      </dsp:nvSpPr>
+      <dsp:spPr>
+        <a:xfrm>
+          <a:off x="3576376" y="2663922"/>
+          <a:ext cx="3037500" cy="720000"/>
+        </a:xfrm>
+        <a:prstGeom prst="rect">
+          <a:avLst/>
+        </a:prstGeom>
+        <a:noFill/>
+        <a:ln>
+          <a:noFill/>
+        </a:ln>
+        <a:effectLst/>
+      </dsp:spPr>
+      <dsp:style>
+        <a:lnRef idx="0">
+          <a:scrgbClr r="0" g="0" b="0"/>
+        </a:lnRef>
+        <a:fillRef idx="0">
+          <a:scrgbClr r="0" g="0" b="0"/>
+        </a:fillRef>
+        <a:effectRef idx="0">
+          <a:scrgbClr r="0" g="0" b="0"/>
+        </a:effectRef>
+        <a:fontRef idx="minor"/>
+      </dsp:style>
+      <dsp:txBody>
+        <a:bodyPr spcFirstLastPara="0" vert="horz" wrap="square" lIns="0" tIns="0" rIns="0" bIns="0" numCol="1" spcCol="1270" anchor="t" anchorCtr="0">
+          <a:noAutofit/>
+        </a:bodyPr>
+        <a:lstStyle/>
+        <a:p>
+          <a:pPr marL="0" lvl="0" indent="0" algn="ctr" defTabSz="1022350">
+            <a:lnSpc>
+              <a:spcPct val="100000"/>
+            </a:lnSpc>
+            <a:spcBef>
+              <a:spcPct val="0"/>
+            </a:spcBef>
+            <a:spcAft>
+              <a:spcPct val="35000"/>
+            </a:spcAft>
+            <a:buNone/>
+            <a:defRPr cap="all"/>
+          </a:pPr>
+          <a:r>
+            <a:rPr lang="en-US" sz="2300" kern="1200"/>
+            <a:t>All queries are read only </a:t>
+          </a:r>
+        </a:p>
+      </dsp:txBody>
+      <dsp:txXfrm>
+        <a:off x="3576376" y="2663922"/>
+        <a:ext cx="3037500" cy="720000"/>
+      </dsp:txXfrm>
+    </dsp:sp>
+    <dsp:sp modelId="{2BD2C23A-7D65-469D-A2F2-6FBB26407249}">
+      <dsp:nvSpPr>
+        <dsp:cNvPr id="0" name=""/>
+        <dsp:cNvSpPr/>
+      </dsp:nvSpPr>
+      <dsp:spPr>
+        <a:xfrm>
+          <a:off x="7737751" y="233922"/>
+          <a:ext cx="1852875" cy="1852875"/>
+        </a:xfrm>
+        <a:prstGeom prst="ellipse">
+          <a:avLst/>
+        </a:prstGeom>
+        <a:solidFill>
+          <a:schemeClr val="accent4">
+            <a:hueOff val="0"/>
+            <a:satOff val="0"/>
+            <a:lumOff val="0"/>
+            <a:alphaOff val="0"/>
+          </a:schemeClr>
+        </a:solidFill>
+        <a:ln>
+          <a:noFill/>
+        </a:ln>
+        <a:effectLst/>
+      </dsp:spPr>
+      <dsp:style>
+        <a:lnRef idx="0">
+          <a:scrgbClr r="0" g="0" b="0"/>
+        </a:lnRef>
+        <a:fillRef idx="1">
+          <a:scrgbClr r="0" g="0" b="0"/>
+        </a:fillRef>
+        <a:effectRef idx="0">
+          <a:scrgbClr r="0" g="0" b="0"/>
+        </a:effectRef>
+        <a:fontRef idx="minor"/>
+      </dsp:style>
+    </dsp:sp>
+    <dsp:sp modelId="{782F0FFE-85F1-4D30-A8CE-4C238770105A}">
+      <dsp:nvSpPr>
+        <dsp:cNvPr id="0" name=""/>
+        <dsp:cNvSpPr/>
+      </dsp:nvSpPr>
+      <dsp:spPr>
+        <a:xfrm>
+          <a:off x="8132626" y="628797"/>
+          <a:ext cx="1063125" cy="1063125"/>
+        </a:xfrm>
+        <a:prstGeom prst="rect">
+          <a:avLst/>
+        </a:prstGeom>
+        <a:blipFill>
+          <a:blip xmlns:r="http://schemas.openxmlformats.org/officeDocument/2006/relationships" r:embed="rId5">
+            <a:extLst>
+              <a:ext uri="{28A0092B-C50C-407E-A947-70E740481C1C}">
+                <a14:useLocalDpi xmlns:a14="http://schemas.microsoft.com/office/drawing/2010/main" val="0"/>
+              </a:ext>
+              <a:ext uri="{96DAC541-7B7A-43D3-8B79-37D633B846F1}">
+                <asvg:svgBlip xmlns:asvg="http://schemas.microsoft.com/office/drawing/2016/SVG/main" r:embed="rId6"/>
+              </a:ext>
+            </a:extLst>
+          </a:blip>
+          <a:stretch>
+            <a:fillRect/>
+          </a:stretch>
+        </a:blipFill>
+        <a:ln w="12700" cap="flat" cmpd="sng" algn="ctr">
+          <a:noFill/>
+          <a:prstDash val="solid"/>
+          <a:miter lim="800000"/>
+        </a:ln>
+        <a:effectLst/>
+      </dsp:spPr>
+      <dsp:style>
+        <a:lnRef idx="2">
+          <a:scrgbClr r="0" g="0" b="0"/>
+        </a:lnRef>
+        <a:fillRef idx="1">
+          <a:scrgbClr r="0" g="0" b="0"/>
+        </a:fillRef>
+        <a:effectRef idx="0">
+          <a:scrgbClr r="0" g="0" b="0"/>
+        </a:effectRef>
+        <a:fontRef idx="minor">
+          <a:schemeClr val="lt1"/>
+        </a:fontRef>
+      </dsp:style>
+    </dsp:sp>
+    <dsp:sp modelId="{08694DCA-522E-442F-B787-CC35C68896A6}">
+      <dsp:nvSpPr>
+        <dsp:cNvPr id="0" name=""/>
+        <dsp:cNvSpPr/>
+      </dsp:nvSpPr>
+      <dsp:spPr>
+        <a:xfrm>
+          <a:off x="7145438" y="2663922"/>
+          <a:ext cx="3037500" cy="720000"/>
+        </a:xfrm>
+        <a:prstGeom prst="rect">
+          <a:avLst/>
+        </a:prstGeom>
+        <a:noFill/>
+        <a:ln>
+          <a:noFill/>
+        </a:ln>
+        <a:effectLst/>
+      </dsp:spPr>
+      <dsp:style>
+        <a:lnRef idx="0">
+          <a:scrgbClr r="0" g="0" b="0"/>
+        </a:lnRef>
+        <a:fillRef idx="0">
+          <a:scrgbClr r="0" g="0" b="0"/>
+        </a:fillRef>
+        <a:effectRef idx="0">
+          <a:scrgbClr r="0" g="0" b="0"/>
+        </a:effectRef>
+        <a:fontRef idx="minor"/>
+      </dsp:style>
+      <dsp:txBody>
+        <a:bodyPr spcFirstLastPara="0" vert="horz" wrap="square" lIns="0" tIns="0" rIns="0" bIns="0" numCol="1" spcCol="1270" anchor="t" anchorCtr="0">
+          <a:noAutofit/>
+        </a:bodyPr>
+        <a:lstStyle/>
+        <a:p>
+          <a:pPr marL="0" lvl="0" indent="0" algn="ctr" defTabSz="1022350">
+            <a:lnSpc>
+              <a:spcPct val="100000"/>
+            </a:lnSpc>
+            <a:spcBef>
+              <a:spcPct val="0"/>
+            </a:spcBef>
+            <a:spcAft>
+              <a:spcPct val="35000"/>
+            </a:spcAft>
+            <a:buNone/>
+            <a:defRPr cap="all"/>
+          </a:pPr>
+          <a:r>
+            <a:rPr lang="en-US" sz="2300" kern="1200"/>
+            <a:t>Scalable </a:t>
+          </a:r>
+        </a:p>
+      </dsp:txBody>
+      <dsp:txXfrm>
+        <a:off x="7145438" y="2663922"/>
+        <a:ext cx="3037500" cy="720000"/>
+      </dsp:txXfrm>
+    </dsp:sp>
+  </dsp:spTree>
+</dsp:drawing>
+</file>
+
 <file path=ppt/diagrams/layout1.xml><?xml version="1.0" encoding="utf-8"?>
 <dgm:layoutDef xmlns:dgm="http://schemas.openxmlformats.org/drawingml/2006/diagram" xmlns:a="http://schemas.openxmlformats.org/drawingml/2006/main" uniqueId="urn:microsoft.com/office/officeart/2005/8/layout/matrix3">
   <dgm:title val=""/>
@@ -6150,6 +7875,221 @@
 </dgm:layoutDef>
 </file>
 
+<file path=ppt/diagrams/layout4.xml><?xml version="1.0" encoding="utf-8"?>
+<dgm:layoutDef xmlns:dgm="http://schemas.openxmlformats.org/drawingml/2006/diagram" xmlns:a="http://schemas.openxmlformats.org/drawingml/2006/main" uniqueId="urn:microsoft.com/office/officeart/2018/5/layout/IconCircleLabelList">
+  <dgm:title val="Icon Circle Label List"/>
+  <dgm:desc val="Use to show non-sequential or grouped chunks of information accompanied by a related visuals. Works best with icons or small pictures with short text captions."/>
+  <dgm:catLst>
+    <dgm:cat type="icon" pri="500"/>
+  </dgm:catLst>
+  <dgm:sampData useDef="1">
+    <dgm:dataModel>
+      <dgm:ptLst/>
+      <dgm:bg/>
+      <dgm:whole/>
+    </dgm:dataModel>
+  </dgm:sampData>
+  <dgm:styleData useDef="1">
+    <dgm:dataModel>
+      <dgm:ptLst/>
+      <dgm:bg/>
+      <dgm:whole/>
+    </dgm:dataModel>
+  </dgm:styleData>
+  <dgm:clrData useDef="1">
+    <dgm:dataModel>
+      <dgm:ptLst/>
+      <dgm:bg/>
+      <dgm:whole/>
+    </dgm:dataModel>
+  </dgm:clrData>
+  <dgm:layoutNode name="root">
+    <dgm:varLst>
+      <dgm:dir/>
+      <dgm:resizeHandles val="exact"/>
+    </dgm:varLst>
+    <dgm:choose name="Name0">
+      <dgm:if name="Name1" axis="self" func="var" arg="dir" op="equ" val="norm">
+        <dgm:alg type="snake">
+          <dgm:param type="grDir" val="tL"/>
+          <dgm:param type="flowDir" val="row"/>
+          <dgm:param type="contDir" val="sameDir"/>
+          <dgm:param type="off" val="ctr"/>
+          <dgm:param type="vertAlign" val="mid"/>
+          <dgm:param type="horzAlign" val="ctr"/>
+        </dgm:alg>
+      </dgm:if>
+      <dgm:else name="Name2">
+        <dgm:alg type="snake">
+          <dgm:param type="grDir" val="tR"/>
+          <dgm:param type="flowDir" val="row"/>
+          <dgm:param type="contDir" val="sameDir"/>
+          <dgm:param type="off" val="ctr"/>
+          <dgm:param type="vertAlign" val="mid"/>
+          <dgm:param type="horzAlign" val="ctr"/>
+        </dgm:alg>
+      </dgm:else>
+    </dgm:choose>
+    <dgm:shape xmlns:r="http://schemas.openxmlformats.org/officeDocument/2006/relationships" r:blip="">
+      <dgm:adjLst/>
+    </dgm:shape>
+    <dgm:presOf/>
+    <dgm:choose name="Name3">
+      <dgm:if name="Name4" axis="ch" ptType="node" func="cnt" op="lte" val="2">
+        <dgm:constrLst>
+          <dgm:constr type="h" for="ch" forName="compNode" refType="h" fact="0.4"/>
+          <dgm:constr type="w" for="ch" forName="compNode" val="100"/>
+          <dgm:constr type="w" for="ch" forName="sibTrans" refType="w" refFor="ch" refForName="compNode" fact="0.175"/>
+          <dgm:constr type="sp" refType="w" refFor="ch" refForName="compNode" op="equ" fact="0.25"/>
+          <dgm:constr type="primFontSz" for="des" ptType="node" op="equ" val="44"/>
+          <dgm:constr type="h" for="des" forName="compNode" op="equ"/>
+          <dgm:constr type="h" for="des" forName="textRect" op="equ"/>
+        </dgm:constrLst>
+      </dgm:if>
+      <dgm:if name="Name5" axis="ch" ptType="node" func="cnt" op="lte" val="3">
+        <dgm:constrLst>
+          <dgm:constr type="h" for="ch" forName="compNode" refType="h" fact="0.4"/>
+          <dgm:constr type="w" for="ch" forName="compNode" val="100"/>
+          <dgm:constr type="w" for="ch" forName="sibTrans" refType="w" refFor="ch" refForName="compNode" fact="0.175"/>
+          <dgm:constr type="sp" refType="w" refFor="ch" refForName="compNode" op="equ" fact="0.25"/>
+          <dgm:constr type="primFontSz" for="des" ptType="node" op="equ" val="40"/>
+          <dgm:constr type="h" for="des" forName="compNode" op="equ"/>
+          <dgm:constr type="h" for="des" forName="textRect" op="equ"/>
+        </dgm:constrLst>
+      </dgm:if>
+      <dgm:if name="Name6" axis="ch" ptType="node" func="cnt" op="lte" val="4">
+        <dgm:constrLst>
+          <dgm:constr type="h" for="ch" forName="compNode" refType="h" fact="0.4"/>
+          <dgm:constr type="w" for="ch" forName="compNode" refType="w"/>
+          <dgm:constr type="w" for="ch" forName="sibTrans" refType="w" refFor="ch" refForName="compNode" fact="0.175"/>
+          <dgm:constr type="sp" refType="w" refFor="ch" refForName="compNode" op="equ" fact="0.25"/>
+          <dgm:constr type="primFontSz" for="des" ptType="node" op="equ" val="32"/>
+          <dgm:constr type="h" for="des" forName="compNode" op="equ"/>
+          <dgm:constr type="h" for="des" forName="textRect" op="equ"/>
+        </dgm:constrLst>
+      </dgm:if>
+      <dgm:else name="Name7">
+        <dgm:constrLst>
+          <dgm:constr type="h" for="ch" forName="compNode" refType="h" fact="0.4"/>
+          <dgm:constr type="w" for="ch" forName="compNode" refType="w"/>
+          <dgm:constr type="w" for="ch" forName="sibTrans" refType="w" refFor="ch" refForName="compNode" fact="0.175"/>
+          <dgm:constr type="sp" refType="w" refFor="ch" refForName="compNode" op="equ" fact="0.25"/>
+          <dgm:constr type="primFontSz" for="des" ptType="node" op="equ" val="24"/>
+          <dgm:constr type="h" for="des" forName="compNode" op="equ"/>
+          <dgm:constr type="h" for="des" forName="textRect" op="equ"/>
+        </dgm:constrLst>
+      </dgm:else>
+    </dgm:choose>
+    <dgm:ruleLst>
+      <dgm:rule type="w" for="ch" forName="compNode" val="50" fact="NaN" max="NaN"/>
+    </dgm:ruleLst>
+    <dgm:forEach name="Name8" axis="ch" ptType="node">
+      <dgm:layoutNode name="compNode">
+        <dgm:alg type="composite"/>
+        <dgm:shape xmlns:r="http://schemas.openxmlformats.org/officeDocument/2006/relationships" r:blip="">
+          <dgm:adjLst/>
+        </dgm:shape>
+        <dgm:presOf axis="self"/>
+        <dgm:constrLst>
+          <dgm:constr type="w" for="ch" forName="iconBgRect" refType="w" fact="0.61"/>
+          <dgm:constr type="h" for="ch" forName="iconBgRect" refType="w" refFor="ch" refForName="iconBgRect"/>
+          <dgm:constr type="t" for="ch" forName="iconBgRect"/>
+          <dgm:constr type="ctrX" for="ch" forName="iconBgRect" refType="w" fact="0.5"/>
+          <dgm:constr type="w" for="ch" forName="iconRect" refType="w" fact="0.35"/>
+          <dgm:constr type="h" for="ch" forName="iconRect" refType="w" refFor="ch" refForName="iconRect"/>
+          <dgm:constr type="ctrX" for="ch" forName="iconRect" refType="ctrX" refFor="ch" refForName="iconBgRect"/>
+          <dgm:constr type="ctrY" for="ch" forName="iconRect" refType="ctrY" refFor="ch" refForName="iconBgRect"/>
+          <dgm:constr type="h" for="ch" forName="spaceRect" refType="w" fact="0.19"/>
+          <dgm:constr type="w" for="ch" forName="spaceRect" refType="w"/>
+          <dgm:constr type="l" for="ch" forName="spaceRect"/>
+          <dgm:constr type="t" for="ch" forName="spaceRect" refType="b" refFor="ch" refForName="iconBgRect"/>
+          <dgm:constr type="h" for="ch" forName="textRect" val="20"/>
+          <dgm:constr type="w" for="ch" forName="textRect" refType="w"/>
+          <dgm:constr type="l" for="ch" forName="textRect"/>
+          <dgm:constr type="t" for="ch" forName="textRect" refType="b" refFor="ch" refForName="spaceRect"/>
+        </dgm:constrLst>
+        <dgm:ruleLst>
+          <dgm:rule type="h" val="INF" fact="NaN" max="NaN"/>
+        </dgm:ruleLst>
+        <dgm:layoutNode name="iconBgRect" styleLbl="bgShp">
+          <dgm:alg type="sp"/>
+          <dgm:shape xmlns:r="http://schemas.openxmlformats.org/officeDocument/2006/relationships" type="ellipse" r:blip="">
+            <dgm:adjLst/>
+          </dgm:shape>
+          <dgm:presOf/>
+          <dgm:constrLst/>
+          <dgm:ruleLst/>
+        </dgm:layoutNode>
+        <dgm:layoutNode name="iconRect" styleLbl="node1">
+          <dgm:alg type="sp"/>
+          <dgm:shape xmlns:r="http://schemas.openxmlformats.org/officeDocument/2006/relationships" type="rect" r:blip="" blipPhldr="1">
+            <dgm:adjLst/>
+          </dgm:shape>
+          <dgm:presOf/>
+          <dgm:constrLst/>
+          <dgm:ruleLst/>
+        </dgm:layoutNode>
+        <dgm:layoutNode name="spaceRect">
+          <dgm:alg type="sp"/>
+          <dgm:shape xmlns:r="http://schemas.openxmlformats.org/officeDocument/2006/relationships" r:blip="">
+            <dgm:adjLst/>
+          </dgm:shape>
+          <dgm:presOf/>
+          <dgm:constrLst/>
+          <dgm:ruleLst/>
+        </dgm:layoutNode>
+        <dgm:layoutNode name="textRect" styleLbl="revTx">
+          <dgm:varLst>
+            <dgm:chMax val="1"/>
+            <dgm:chPref val="1"/>
+          </dgm:varLst>
+          <dgm:alg type="tx">
+            <dgm:param type="txAnchorVert" val="t"/>
+          </dgm:alg>
+          <dgm:shape xmlns:r="http://schemas.openxmlformats.org/officeDocument/2006/relationships" type="rect" r:blip="">
+            <dgm:adjLst/>
+          </dgm:shape>
+          <dgm:presOf axis="self" ptType="node"/>
+          <dgm:constrLst>
+            <dgm:constr type="lMarg"/>
+            <dgm:constr type="rMarg"/>
+            <dgm:constr type="tMarg"/>
+            <dgm:constr type="bMarg"/>
+          </dgm:constrLst>
+          <dgm:ruleLst>
+            <dgm:rule type="primFontSz" val="11" fact="NaN" max="NaN"/>
+            <dgm:rule type="h" val="INF" fact="NaN" max="NaN"/>
+          </dgm:ruleLst>
+        </dgm:layoutNode>
+      </dgm:layoutNode>
+      <dgm:forEach name="Name9" axis="followSib" ptType="sibTrans" cnt="1">
+        <dgm:layoutNode name="sibTrans">
+          <dgm:alg type="sp"/>
+          <dgm:shape xmlns:r="http://schemas.openxmlformats.org/officeDocument/2006/relationships" r:blip="">
+            <dgm:adjLst/>
+          </dgm:shape>
+          <dgm:presOf axis="self"/>
+          <dgm:constrLst/>
+          <dgm:ruleLst/>
+        </dgm:layoutNode>
+      </dgm:forEach>
+    </dgm:forEach>
+  </dgm:layoutNode>
+  <dgm:extLst>
+    <a:ext uri="{68A01E43-0DF5-4B5B-8FA6-DAF915123BFB}">
+      <dgm1612:lstStyle xmlns:dgm1612="http://schemas.microsoft.com/office/drawing/2016/12/diagram">
+        <a:lvl1pPr>
+          <a:lnSpc>
+            <a:spcPct val="100000"/>
+          </a:lnSpc>
+          <a:defRPr cap="all"/>
+        </a:lvl1pPr>
+      </dgm1612:lstStyle>
+    </a:ext>
+  </dgm:extLst>
+</dgm:layoutDef>
+</file>
+
 <file path=ppt/diagrams/quickStyle1.xml><?xml version="1.0" encoding="utf-8"?>
 <dgm:styleDef xmlns:dgm="http://schemas.openxmlformats.org/drawingml/2006/diagram" xmlns:a="http://schemas.openxmlformats.org/drawingml/2006/main" uniqueId="urn:microsoft.com/office/officeart/2005/8/quickstyle/simple1">
   <dgm:title val=""/>
@@ -8219,6 +10159,1040 @@
 </file>
 
 <file path=ppt/diagrams/quickStyle3.xml><?xml version="1.0" encoding="utf-8"?>
+<dgm:styleDef xmlns:dgm="http://schemas.openxmlformats.org/drawingml/2006/diagram" xmlns:a="http://schemas.openxmlformats.org/drawingml/2006/main" uniqueId="urn:microsoft.com/office/officeart/2005/8/quickstyle/simple1">
+  <dgm:title val=""/>
+  <dgm:desc val=""/>
+  <dgm:catLst>
+    <dgm:cat type="simple" pri="10100"/>
+  </dgm:catLst>
+  <dgm:scene3d>
+    <a:camera prst="orthographicFront"/>
+    <a:lightRig rig="threePt" dir="t"/>
+  </dgm:scene3d>
+  <dgm:styleLbl name="node0">
+    <dgm:scene3d>
+      <a:camera prst="orthographicFront"/>
+      <a:lightRig rig="threePt" dir="t"/>
+    </dgm:scene3d>
+    <dgm:sp3d/>
+    <dgm:txPr/>
+    <dgm:style>
+      <a:lnRef idx="2">
+        <a:scrgbClr r="0" g="0" b="0"/>
+      </a:lnRef>
+      <a:fillRef idx="1">
+        <a:scrgbClr r="0" g="0" b="0"/>
+      </a:fillRef>
+      <a:effectRef idx="0">
+        <a:scrgbClr r="0" g="0" b="0"/>
+      </a:effectRef>
+      <a:fontRef idx="minor">
+        <a:schemeClr val="lt1"/>
+      </a:fontRef>
+    </dgm:style>
+  </dgm:styleLbl>
+  <dgm:styleLbl name="lnNode1">
+    <dgm:scene3d>
+      <a:camera prst="orthographicFront"/>
+      <a:lightRig rig="threePt" dir="t"/>
+    </dgm:scene3d>
+    <dgm:sp3d/>
+    <dgm:txPr/>
+    <dgm:style>
+      <a:lnRef idx="2">
+        <a:scrgbClr r="0" g="0" b="0"/>
+      </a:lnRef>
+      <a:fillRef idx="1">
+        <a:scrgbClr r="0" g="0" b="0"/>
+      </a:fillRef>
+      <a:effectRef idx="0">
+        <a:scrgbClr r="0" g="0" b="0"/>
+      </a:effectRef>
+      <a:fontRef idx="minor">
+        <a:schemeClr val="lt1"/>
+      </a:fontRef>
+    </dgm:style>
+  </dgm:styleLbl>
+  <dgm:styleLbl name="vennNode1">
+    <dgm:scene3d>
+      <a:camera prst="orthographicFront"/>
+      <a:lightRig rig="threePt" dir="t"/>
+    </dgm:scene3d>
+    <dgm:sp3d/>
+    <dgm:txPr/>
+    <dgm:style>
+      <a:lnRef idx="2">
+        <a:scrgbClr r="0" g="0" b="0"/>
+      </a:lnRef>
+      <a:fillRef idx="1">
+        <a:scrgbClr r="0" g="0" b="0"/>
+      </a:fillRef>
+      <a:effectRef idx="0">
+        <a:scrgbClr r="0" g="0" b="0"/>
+      </a:effectRef>
+      <a:fontRef idx="minor">
+        <a:schemeClr val="tx1"/>
+      </a:fontRef>
+    </dgm:style>
+  </dgm:styleLbl>
+  <dgm:styleLbl name="alignNode1">
+    <dgm:scene3d>
+      <a:camera prst="orthographicFront"/>
+      <a:lightRig rig="threePt" dir="t"/>
+    </dgm:scene3d>
+    <dgm:sp3d/>
+    <dgm:txPr/>
+    <dgm:style>
+      <a:lnRef idx="2">
+        <a:scrgbClr r="0" g="0" b="0"/>
+      </a:lnRef>
+      <a:fillRef idx="1">
+        <a:scrgbClr r="0" g="0" b="0"/>
+      </a:fillRef>
+      <a:effectRef idx="0">
+        <a:scrgbClr r="0" g="0" b="0"/>
+      </a:effectRef>
+      <a:fontRef idx="minor">
+        <a:schemeClr val="lt1"/>
+      </a:fontRef>
+    </dgm:style>
+  </dgm:styleLbl>
+  <dgm:styleLbl name="node1">
+    <dgm:scene3d>
+      <a:camera prst="orthographicFront"/>
+      <a:lightRig rig="threePt" dir="t"/>
+    </dgm:scene3d>
+    <dgm:sp3d/>
+    <dgm:txPr/>
+    <dgm:style>
+      <a:lnRef idx="2">
+        <a:scrgbClr r="0" g="0" b="0"/>
+      </a:lnRef>
+      <a:fillRef idx="1">
+        <a:scrgbClr r="0" g="0" b="0"/>
+      </a:fillRef>
+      <a:effectRef idx="0">
+        <a:scrgbClr r="0" g="0" b="0"/>
+      </a:effectRef>
+      <a:fontRef idx="minor">
+        <a:schemeClr val="lt1"/>
+      </a:fontRef>
+    </dgm:style>
+  </dgm:styleLbl>
+  <dgm:styleLbl name="node2">
+    <dgm:scene3d>
+      <a:camera prst="orthographicFront"/>
+      <a:lightRig rig="threePt" dir="t"/>
+    </dgm:scene3d>
+    <dgm:sp3d/>
+    <dgm:txPr/>
+    <dgm:style>
+      <a:lnRef idx="2">
+        <a:scrgbClr r="0" g="0" b="0"/>
+      </a:lnRef>
+      <a:fillRef idx="1">
+        <a:scrgbClr r="0" g="0" b="0"/>
+      </a:fillRef>
+      <a:effectRef idx="0">
+        <a:scrgbClr r="0" g="0" b="0"/>
+      </a:effectRef>
+      <a:fontRef idx="minor">
+        <a:schemeClr val="lt1"/>
+      </a:fontRef>
+    </dgm:style>
+  </dgm:styleLbl>
+  <dgm:styleLbl name="node3">
+    <dgm:scene3d>
+      <a:camera prst="orthographicFront"/>
+      <a:lightRig rig="threePt" dir="t"/>
+    </dgm:scene3d>
+    <dgm:sp3d/>
+    <dgm:txPr/>
+    <dgm:style>
+      <a:lnRef idx="2">
+        <a:scrgbClr r="0" g="0" b="0"/>
+      </a:lnRef>
+      <a:fillRef idx="1">
+        <a:scrgbClr r="0" g="0" b="0"/>
+      </a:fillRef>
+      <a:effectRef idx="0">
+        <a:scrgbClr r="0" g="0" b="0"/>
+      </a:effectRef>
+      <a:fontRef idx="minor">
+        <a:schemeClr val="lt1"/>
+      </a:fontRef>
+    </dgm:style>
+  </dgm:styleLbl>
+  <dgm:styleLbl name="node4">
+    <dgm:scene3d>
+      <a:camera prst="orthographicFront"/>
+      <a:lightRig rig="threePt" dir="t"/>
+    </dgm:scene3d>
+    <dgm:sp3d/>
+    <dgm:txPr/>
+    <dgm:style>
+      <a:lnRef idx="2">
+        <a:scrgbClr r="0" g="0" b="0"/>
+      </a:lnRef>
+      <a:fillRef idx="1">
+        <a:scrgbClr r="0" g="0" b="0"/>
+      </a:fillRef>
+      <a:effectRef idx="0">
+        <a:scrgbClr r="0" g="0" b="0"/>
+      </a:effectRef>
+      <a:fontRef idx="minor">
+        <a:schemeClr val="lt1"/>
+      </a:fontRef>
+    </dgm:style>
+  </dgm:styleLbl>
+  <dgm:styleLbl name="fgImgPlace1">
+    <dgm:scene3d>
+      <a:camera prst="orthographicFront"/>
+      <a:lightRig rig="threePt" dir="t"/>
+    </dgm:scene3d>
+    <dgm:sp3d/>
+    <dgm:txPr/>
+    <dgm:style>
+      <a:lnRef idx="2">
+        <a:scrgbClr r="0" g="0" b="0"/>
+      </a:lnRef>
+      <a:fillRef idx="1">
+        <a:scrgbClr r="0" g="0" b="0"/>
+      </a:fillRef>
+      <a:effectRef idx="0">
+        <a:scrgbClr r="0" g="0" b="0"/>
+      </a:effectRef>
+      <a:fontRef idx="minor"/>
+    </dgm:style>
+  </dgm:styleLbl>
+  <dgm:styleLbl name="alignImgPlace1">
+    <dgm:scene3d>
+      <a:camera prst="orthographicFront"/>
+      <a:lightRig rig="threePt" dir="t"/>
+    </dgm:scene3d>
+    <dgm:sp3d/>
+    <dgm:txPr/>
+    <dgm:style>
+      <a:lnRef idx="2">
+        <a:scrgbClr r="0" g="0" b="0"/>
+      </a:lnRef>
+      <a:fillRef idx="1">
+        <a:scrgbClr r="0" g="0" b="0"/>
+      </a:fillRef>
+      <a:effectRef idx="0">
+        <a:scrgbClr r="0" g="0" b="0"/>
+      </a:effectRef>
+      <a:fontRef idx="minor"/>
+    </dgm:style>
+  </dgm:styleLbl>
+  <dgm:styleLbl name="bgImgPlace1">
+    <dgm:scene3d>
+      <a:camera prst="orthographicFront"/>
+      <a:lightRig rig="threePt" dir="t"/>
+    </dgm:scene3d>
+    <dgm:sp3d/>
+    <dgm:txPr/>
+    <dgm:style>
+      <a:lnRef idx="2">
+        <a:scrgbClr r="0" g="0" b="0"/>
+      </a:lnRef>
+      <a:fillRef idx="1">
+        <a:scrgbClr r="0" g="0" b="0"/>
+      </a:fillRef>
+      <a:effectRef idx="0">
+        <a:scrgbClr r="0" g="0" b="0"/>
+      </a:effectRef>
+      <a:fontRef idx="minor"/>
+    </dgm:style>
+  </dgm:styleLbl>
+  <dgm:styleLbl name="sibTrans2D1">
+    <dgm:scene3d>
+      <a:camera prst="orthographicFront"/>
+      <a:lightRig rig="threePt" dir="t"/>
+    </dgm:scene3d>
+    <dgm:sp3d/>
+    <dgm:txPr/>
+    <dgm:style>
+      <a:lnRef idx="0">
+        <a:scrgbClr r="0" g="0" b="0"/>
+      </a:lnRef>
+      <a:fillRef idx="1">
+        <a:scrgbClr r="0" g="0" b="0"/>
+      </a:fillRef>
+      <a:effectRef idx="0">
+        <a:scrgbClr r="0" g="0" b="0"/>
+      </a:effectRef>
+      <a:fontRef idx="minor">
+        <a:schemeClr val="lt1"/>
+      </a:fontRef>
+    </dgm:style>
+  </dgm:styleLbl>
+  <dgm:styleLbl name="fgSibTrans2D1">
+    <dgm:scene3d>
+      <a:camera prst="orthographicFront"/>
+      <a:lightRig rig="threePt" dir="t"/>
+    </dgm:scene3d>
+    <dgm:sp3d/>
+    <dgm:txPr/>
+    <dgm:style>
+      <a:lnRef idx="0">
+        <a:scrgbClr r="0" g="0" b="0"/>
+      </a:lnRef>
+      <a:fillRef idx="1">
+        <a:scrgbClr r="0" g="0" b="0"/>
+      </a:fillRef>
+      <a:effectRef idx="0">
+        <a:scrgbClr r="0" g="0" b="0"/>
+      </a:effectRef>
+      <a:fontRef idx="minor">
+        <a:schemeClr val="lt1"/>
+      </a:fontRef>
+    </dgm:style>
+  </dgm:styleLbl>
+  <dgm:styleLbl name="bgSibTrans2D1">
+    <dgm:scene3d>
+      <a:camera prst="orthographicFront"/>
+      <a:lightRig rig="threePt" dir="t"/>
+    </dgm:scene3d>
+    <dgm:sp3d/>
+    <dgm:txPr/>
+    <dgm:style>
+      <a:lnRef idx="0">
+        <a:scrgbClr r="0" g="0" b="0"/>
+      </a:lnRef>
+      <a:fillRef idx="1">
+        <a:scrgbClr r="0" g="0" b="0"/>
+      </a:fillRef>
+      <a:effectRef idx="0">
+        <a:scrgbClr r="0" g="0" b="0"/>
+      </a:effectRef>
+      <a:fontRef idx="minor">
+        <a:schemeClr val="lt1"/>
+      </a:fontRef>
+    </dgm:style>
+  </dgm:styleLbl>
+  <dgm:styleLbl name="sibTrans1D1">
+    <dgm:scene3d>
+      <a:camera prst="orthographicFront"/>
+      <a:lightRig rig="threePt" dir="t"/>
+    </dgm:scene3d>
+    <dgm:sp3d/>
+    <dgm:txPr/>
+    <dgm:style>
+      <a:lnRef idx="1">
+        <a:scrgbClr r="0" g="0" b="0"/>
+      </a:lnRef>
+      <a:fillRef idx="0">
+        <a:scrgbClr r="0" g="0" b="0"/>
+      </a:fillRef>
+      <a:effectRef idx="0">
+        <a:scrgbClr r="0" g="0" b="0"/>
+      </a:effectRef>
+      <a:fontRef idx="minor"/>
+    </dgm:style>
+  </dgm:styleLbl>
+  <dgm:styleLbl name="callout">
+    <dgm:scene3d>
+      <a:camera prst="orthographicFront"/>
+      <a:lightRig rig="threePt" dir="t"/>
+    </dgm:scene3d>
+    <dgm:sp3d/>
+    <dgm:txPr/>
+    <dgm:style>
+      <a:lnRef idx="2">
+        <a:scrgbClr r="0" g="0" b="0"/>
+      </a:lnRef>
+      <a:fillRef idx="1">
+        <a:scrgbClr r="0" g="0" b="0"/>
+      </a:fillRef>
+      <a:effectRef idx="0">
+        <a:scrgbClr r="0" g="0" b="0"/>
+      </a:effectRef>
+      <a:fontRef idx="minor"/>
+    </dgm:style>
+  </dgm:styleLbl>
+  <dgm:styleLbl name="asst0">
+    <dgm:scene3d>
+      <a:camera prst="orthographicFront"/>
+      <a:lightRig rig="threePt" dir="t"/>
+    </dgm:scene3d>
+    <dgm:sp3d/>
+    <dgm:txPr/>
+    <dgm:style>
+      <a:lnRef idx="2">
+        <a:scrgbClr r="0" g="0" b="0"/>
+      </a:lnRef>
+      <a:fillRef idx="1">
+        <a:scrgbClr r="0" g="0" b="0"/>
+      </a:fillRef>
+      <a:effectRef idx="0">
+        <a:scrgbClr r="0" g="0" b="0"/>
+      </a:effectRef>
+      <a:fontRef idx="minor">
+        <a:schemeClr val="lt1"/>
+      </a:fontRef>
+    </dgm:style>
+  </dgm:styleLbl>
+  <dgm:styleLbl name="asst1">
+    <dgm:scene3d>
+      <a:camera prst="orthographicFront"/>
+      <a:lightRig rig="threePt" dir="t"/>
+    </dgm:scene3d>
+    <dgm:sp3d/>
+    <dgm:txPr/>
+    <dgm:style>
+      <a:lnRef idx="2">
+        <a:scrgbClr r="0" g="0" b="0"/>
+      </a:lnRef>
+      <a:fillRef idx="1">
+        <a:scrgbClr r="0" g="0" b="0"/>
+      </a:fillRef>
+      <a:effectRef idx="0">
+        <a:scrgbClr r="0" g="0" b="0"/>
+      </a:effectRef>
+      <a:fontRef idx="minor">
+        <a:schemeClr val="lt1"/>
+      </a:fontRef>
+    </dgm:style>
+  </dgm:styleLbl>
+  <dgm:styleLbl name="asst2">
+    <dgm:scene3d>
+      <a:camera prst="orthographicFront"/>
+      <a:lightRig rig="threePt" dir="t"/>
+    </dgm:scene3d>
+    <dgm:sp3d/>
+    <dgm:txPr/>
+    <dgm:style>
+      <a:lnRef idx="2">
+        <a:scrgbClr r="0" g="0" b="0"/>
+      </a:lnRef>
+      <a:fillRef idx="1">
+        <a:scrgbClr r="0" g="0" b="0"/>
+      </a:fillRef>
+      <a:effectRef idx="0">
+        <a:scrgbClr r="0" g="0" b="0"/>
+      </a:effectRef>
+      <a:fontRef idx="minor">
+        <a:schemeClr val="lt1"/>
+      </a:fontRef>
+    </dgm:style>
+  </dgm:styleLbl>
+  <dgm:styleLbl name="asst3">
+    <dgm:scene3d>
+      <a:camera prst="orthographicFront"/>
+      <a:lightRig rig="threePt" dir="t"/>
+    </dgm:scene3d>
+    <dgm:sp3d/>
+    <dgm:txPr/>
+    <dgm:style>
+      <a:lnRef idx="2">
+        <a:scrgbClr r="0" g="0" b="0"/>
+      </a:lnRef>
+      <a:fillRef idx="1">
+        <a:scrgbClr r="0" g="0" b="0"/>
+      </a:fillRef>
+      <a:effectRef idx="0">
+        <a:scrgbClr r="0" g="0" b="0"/>
+      </a:effectRef>
+      <a:fontRef idx="minor">
+        <a:schemeClr val="lt1"/>
+      </a:fontRef>
+    </dgm:style>
+  </dgm:styleLbl>
+  <dgm:styleLbl name="asst4">
+    <dgm:scene3d>
+      <a:camera prst="orthographicFront"/>
+      <a:lightRig rig="threePt" dir="t"/>
+    </dgm:scene3d>
+    <dgm:sp3d/>
+    <dgm:txPr/>
+    <dgm:style>
+      <a:lnRef idx="2">
+        <a:scrgbClr r="0" g="0" b="0"/>
+      </a:lnRef>
+      <a:fillRef idx="1">
+        <a:scrgbClr r="0" g="0" b="0"/>
+      </a:fillRef>
+      <a:effectRef idx="0">
+        <a:scrgbClr r="0" g="0" b="0"/>
+      </a:effectRef>
+      <a:fontRef idx="minor">
+        <a:schemeClr val="lt1"/>
+      </a:fontRef>
+    </dgm:style>
+  </dgm:styleLbl>
+  <dgm:styleLbl name="parChTrans2D1">
+    <dgm:scene3d>
+      <a:camera prst="orthographicFront"/>
+      <a:lightRig rig="threePt" dir="t"/>
+    </dgm:scene3d>
+    <dgm:sp3d/>
+    <dgm:txPr/>
+    <dgm:style>
+      <a:lnRef idx="2">
+        <a:scrgbClr r="0" g="0" b="0"/>
+      </a:lnRef>
+      <a:fillRef idx="1">
+        <a:scrgbClr r="0" g="0" b="0"/>
+      </a:fillRef>
+      <a:effectRef idx="0">
+        <a:scrgbClr r="0" g="0" b="0"/>
+      </a:effectRef>
+      <a:fontRef idx="minor">
+        <a:schemeClr val="lt1"/>
+      </a:fontRef>
+    </dgm:style>
+  </dgm:styleLbl>
+  <dgm:styleLbl name="parChTrans2D2">
+    <dgm:scene3d>
+      <a:camera prst="orthographicFront"/>
+      <a:lightRig rig="threePt" dir="t"/>
+    </dgm:scene3d>
+    <dgm:sp3d/>
+    <dgm:txPr/>
+    <dgm:style>
+      <a:lnRef idx="2">
+        <a:scrgbClr r="0" g="0" b="0"/>
+      </a:lnRef>
+      <a:fillRef idx="1">
+        <a:scrgbClr r="0" g="0" b="0"/>
+      </a:fillRef>
+      <a:effectRef idx="0">
+        <a:scrgbClr r="0" g="0" b="0"/>
+      </a:effectRef>
+      <a:fontRef idx="minor">
+        <a:schemeClr val="lt1"/>
+      </a:fontRef>
+    </dgm:style>
+  </dgm:styleLbl>
+  <dgm:styleLbl name="parChTrans2D3">
+    <dgm:scene3d>
+      <a:camera prst="orthographicFront"/>
+      <a:lightRig rig="threePt" dir="t"/>
+    </dgm:scene3d>
+    <dgm:sp3d/>
+    <dgm:txPr/>
+    <dgm:style>
+      <a:lnRef idx="2">
+        <a:scrgbClr r="0" g="0" b="0"/>
+      </a:lnRef>
+      <a:fillRef idx="1">
+        <a:scrgbClr r="0" g="0" b="0"/>
+      </a:fillRef>
+      <a:effectRef idx="0">
+        <a:scrgbClr r="0" g="0" b="0"/>
+      </a:effectRef>
+      <a:fontRef idx="minor">
+        <a:schemeClr val="lt1"/>
+      </a:fontRef>
+    </dgm:style>
+  </dgm:styleLbl>
+  <dgm:styleLbl name="parChTrans2D4">
+    <dgm:scene3d>
+      <a:camera prst="orthographicFront"/>
+      <a:lightRig rig="threePt" dir="t"/>
+    </dgm:scene3d>
+    <dgm:sp3d/>
+    <dgm:txPr/>
+    <dgm:style>
+      <a:lnRef idx="2">
+        <a:scrgbClr r="0" g="0" b="0"/>
+      </a:lnRef>
+      <a:fillRef idx="1">
+        <a:scrgbClr r="0" g="0" b="0"/>
+      </a:fillRef>
+      <a:effectRef idx="0">
+        <a:scrgbClr r="0" g="0" b="0"/>
+      </a:effectRef>
+      <a:fontRef idx="minor">
+        <a:schemeClr val="lt1"/>
+      </a:fontRef>
+    </dgm:style>
+  </dgm:styleLbl>
+  <dgm:styleLbl name="parChTrans1D1">
+    <dgm:scene3d>
+      <a:camera prst="orthographicFront"/>
+      <a:lightRig rig="threePt" dir="t"/>
+    </dgm:scene3d>
+    <dgm:sp3d/>
+    <dgm:txPr/>
+    <dgm:style>
+      <a:lnRef idx="2">
+        <a:scrgbClr r="0" g="0" b="0"/>
+      </a:lnRef>
+      <a:fillRef idx="0">
+        <a:scrgbClr r="0" g="0" b="0"/>
+      </a:fillRef>
+      <a:effectRef idx="0">
+        <a:scrgbClr r="0" g="0" b="0"/>
+      </a:effectRef>
+      <a:fontRef idx="minor"/>
+    </dgm:style>
+  </dgm:styleLbl>
+  <dgm:styleLbl name="parChTrans1D2">
+    <dgm:scene3d>
+      <a:camera prst="orthographicFront"/>
+      <a:lightRig rig="threePt" dir="t"/>
+    </dgm:scene3d>
+    <dgm:sp3d/>
+    <dgm:txPr/>
+    <dgm:style>
+      <a:lnRef idx="2">
+        <a:scrgbClr r="0" g="0" b="0"/>
+      </a:lnRef>
+      <a:fillRef idx="0">
+        <a:scrgbClr r="0" g="0" b="0"/>
+      </a:fillRef>
+      <a:effectRef idx="0">
+        <a:scrgbClr r="0" g="0" b="0"/>
+      </a:effectRef>
+      <a:fontRef idx="minor"/>
+    </dgm:style>
+  </dgm:styleLbl>
+  <dgm:styleLbl name="parChTrans1D3">
+    <dgm:scene3d>
+      <a:camera prst="orthographicFront"/>
+      <a:lightRig rig="threePt" dir="t"/>
+    </dgm:scene3d>
+    <dgm:sp3d/>
+    <dgm:txPr/>
+    <dgm:style>
+      <a:lnRef idx="2">
+        <a:scrgbClr r="0" g="0" b="0"/>
+      </a:lnRef>
+      <a:fillRef idx="0">
+        <a:scrgbClr r="0" g="0" b="0"/>
+      </a:fillRef>
+      <a:effectRef idx="0">
+        <a:scrgbClr r="0" g="0" b="0"/>
+      </a:effectRef>
+      <a:fontRef idx="minor"/>
+    </dgm:style>
+  </dgm:styleLbl>
+  <dgm:styleLbl name="parChTrans1D4">
+    <dgm:scene3d>
+      <a:camera prst="orthographicFront"/>
+      <a:lightRig rig="threePt" dir="t"/>
+    </dgm:scene3d>
+    <dgm:sp3d/>
+    <dgm:txPr/>
+    <dgm:style>
+      <a:lnRef idx="2">
+        <a:scrgbClr r="0" g="0" b="0"/>
+      </a:lnRef>
+      <a:fillRef idx="0">
+        <a:scrgbClr r="0" g="0" b="0"/>
+      </a:fillRef>
+      <a:effectRef idx="0">
+        <a:scrgbClr r="0" g="0" b="0"/>
+      </a:effectRef>
+      <a:fontRef idx="minor"/>
+    </dgm:style>
+  </dgm:styleLbl>
+  <dgm:styleLbl name="fgAcc1">
+    <dgm:scene3d>
+      <a:camera prst="orthographicFront"/>
+      <a:lightRig rig="threePt" dir="t"/>
+    </dgm:scene3d>
+    <dgm:sp3d/>
+    <dgm:txPr/>
+    <dgm:style>
+      <a:lnRef idx="2">
+        <a:scrgbClr r="0" g="0" b="0"/>
+      </a:lnRef>
+      <a:fillRef idx="1">
+        <a:scrgbClr r="0" g="0" b="0"/>
+      </a:fillRef>
+      <a:effectRef idx="0">
+        <a:scrgbClr r="0" g="0" b="0"/>
+      </a:effectRef>
+      <a:fontRef idx="minor"/>
+    </dgm:style>
+  </dgm:styleLbl>
+  <dgm:styleLbl name="conFgAcc1">
+    <dgm:scene3d>
+      <a:camera prst="orthographicFront"/>
+      <a:lightRig rig="threePt" dir="t"/>
+    </dgm:scene3d>
+    <dgm:sp3d/>
+    <dgm:txPr/>
+    <dgm:style>
+      <a:lnRef idx="2">
+        <a:scrgbClr r="0" g="0" b="0"/>
+      </a:lnRef>
+      <a:fillRef idx="1">
+        <a:scrgbClr r="0" g="0" b="0"/>
+      </a:fillRef>
+      <a:effectRef idx="0">
+        <a:scrgbClr r="0" g="0" b="0"/>
+      </a:effectRef>
+      <a:fontRef idx="minor"/>
+    </dgm:style>
+  </dgm:styleLbl>
+  <dgm:styleLbl name="alignAcc1">
+    <dgm:scene3d>
+      <a:camera prst="orthographicFront"/>
+      <a:lightRig rig="threePt" dir="t"/>
+    </dgm:scene3d>
+    <dgm:sp3d/>
+    <dgm:txPr/>
+    <dgm:style>
+      <a:lnRef idx="2">
+        <a:scrgbClr r="0" g="0" b="0"/>
+      </a:lnRef>
+      <a:fillRef idx="1">
+        <a:scrgbClr r="0" g="0" b="0"/>
+      </a:fillRef>
+      <a:effectRef idx="0">
+        <a:scrgbClr r="0" g="0" b="0"/>
+      </a:effectRef>
+      <a:fontRef idx="minor"/>
+    </dgm:style>
+  </dgm:styleLbl>
+  <dgm:styleLbl name="trAlignAcc1">
+    <dgm:scene3d>
+      <a:camera prst="orthographicFront"/>
+      <a:lightRig rig="threePt" dir="t"/>
+    </dgm:scene3d>
+    <dgm:sp3d/>
+    <dgm:txPr/>
+    <dgm:style>
+      <a:lnRef idx="1">
+        <a:scrgbClr r="0" g="0" b="0"/>
+      </a:lnRef>
+      <a:fillRef idx="1">
+        <a:scrgbClr r="0" g="0" b="0"/>
+      </a:fillRef>
+      <a:effectRef idx="0">
+        <a:scrgbClr r="0" g="0" b="0"/>
+      </a:effectRef>
+      <a:fontRef idx="minor"/>
+    </dgm:style>
+  </dgm:styleLbl>
+  <dgm:styleLbl name="bgAcc1">
+    <dgm:scene3d>
+      <a:camera prst="orthographicFront"/>
+      <a:lightRig rig="threePt" dir="t"/>
+    </dgm:scene3d>
+    <dgm:sp3d/>
+    <dgm:txPr/>
+    <dgm:style>
+      <a:lnRef idx="2">
+        <a:scrgbClr r="0" g="0" b="0"/>
+      </a:lnRef>
+      <a:fillRef idx="1">
+        <a:scrgbClr r="0" g="0" b="0"/>
+      </a:fillRef>
+      <a:effectRef idx="0">
+        <a:scrgbClr r="0" g="0" b="0"/>
+      </a:effectRef>
+      <a:fontRef idx="minor"/>
+    </dgm:style>
+  </dgm:styleLbl>
+  <dgm:styleLbl name="solidFgAcc1">
+    <dgm:scene3d>
+      <a:camera prst="orthographicFront"/>
+      <a:lightRig rig="threePt" dir="t"/>
+    </dgm:scene3d>
+    <dgm:sp3d/>
+    <dgm:txPr/>
+    <dgm:style>
+      <a:lnRef idx="2">
+        <a:scrgbClr r="0" g="0" b="0"/>
+      </a:lnRef>
+      <a:fillRef idx="1">
+        <a:scrgbClr r="0" g="0" b="0"/>
+      </a:fillRef>
+      <a:effectRef idx="0">
+        <a:scrgbClr r="0" g="0" b="0"/>
+      </a:effectRef>
+      <a:fontRef idx="minor"/>
+    </dgm:style>
+  </dgm:styleLbl>
+  <dgm:styleLbl name="solidAlignAcc1">
+    <dgm:scene3d>
+      <a:camera prst="orthographicFront"/>
+      <a:lightRig rig="threePt" dir="t"/>
+    </dgm:scene3d>
+    <dgm:sp3d/>
+    <dgm:txPr/>
+    <dgm:style>
+      <a:lnRef idx="2">
+        <a:scrgbClr r="0" g="0" b="0"/>
+      </a:lnRef>
+      <a:fillRef idx="1">
+        <a:scrgbClr r="0" g="0" b="0"/>
+      </a:fillRef>
+      <a:effectRef idx="0">
+        <a:scrgbClr r="0" g="0" b="0"/>
+      </a:effectRef>
+      <a:fontRef idx="minor"/>
+    </dgm:style>
+  </dgm:styleLbl>
+  <dgm:styleLbl name="solidBgAcc1">
+    <dgm:scene3d>
+      <a:camera prst="orthographicFront"/>
+      <a:lightRig rig="threePt" dir="t"/>
+    </dgm:scene3d>
+    <dgm:sp3d/>
+    <dgm:txPr/>
+    <dgm:style>
+      <a:lnRef idx="2">
+        <a:scrgbClr r="0" g="0" b="0"/>
+      </a:lnRef>
+      <a:fillRef idx="1">
+        <a:scrgbClr r="0" g="0" b="0"/>
+      </a:fillRef>
+      <a:effectRef idx="0">
+        <a:scrgbClr r="0" g="0" b="0"/>
+      </a:effectRef>
+      <a:fontRef idx="minor"/>
+    </dgm:style>
+  </dgm:styleLbl>
+  <dgm:styleLbl name="fgAccFollowNode1">
+    <dgm:scene3d>
+      <a:camera prst="orthographicFront"/>
+      <a:lightRig rig="threePt" dir="t"/>
+    </dgm:scene3d>
+    <dgm:sp3d/>
+    <dgm:txPr/>
+    <dgm:style>
+      <a:lnRef idx="2">
+        <a:scrgbClr r="0" g="0" b="0"/>
+      </a:lnRef>
+      <a:fillRef idx="1">
+        <a:scrgbClr r="0" g="0" b="0"/>
+      </a:fillRef>
+      <a:effectRef idx="0">
+        <a:scrgbClr r="0" g="0" b="0"/>
+      </a:effectRef>
+      <a:fontRef idx="minor"/>
+    </dgm:style>
+  </dgm:styleLbl>
+  <dgm:styleLbl name="alignAccFollowNode1">
+    <dgm:scene3d>
+      <a:camera prst="orthographicFront"/>
+      <a:lightRig rig="threePt" dir="t"/>
+    </dgm:scene3d>
+    <dgm:sp3d/>
+    <dgm:txPr/>
+    <dgm:style>
+      <a:lnRef idx="2">
+        <a:scrgbClr r="0" g="0" b="0"/>
+      </a:lnRef>
+      <a:fillRef idx="1">
+        <a:scrgbClr r="0" g="0" b="0"/>
+      </a:fillRef>
+      <a:effectRef idx="0">
+        <a:scrgbClr r="0" g="0" b="0"/>
+      </a:effectRef>
+      <a:fontRef idx="minor"/>
+    </dgm:style>
+  </dgm:styleLbl>
+  <dgm:styleLbl name="bgAccFollowNode1">
+    <dgm:scene3d>
+      <a:camera prst="orthographicFront"/>
+      <a:lightRig rig="threePt" dir="t"/>
+    </dgm:scene3d>
+    <dgm:sp3d/>
+    <dgm:txPr/>
+    <dgm:style>
+      <a:lnRef idx="2">
+        <a:scrgbClr r="0" g="0" b="0"/>
+      </a:lnRef>
+      <a:fillRef idx="1">
+        <a:scrgbClr r="0" g="0" b="0"/>
+      </a:fillRef>
+      <a:effectRef idx="0">
+        <a:scrgbClr r="0" g="0" b="0"/>
+      </a:effectRef>
+      <a:fontRef idx="minor"/>
+    </dgm:style>
+  </dgm:styleLbl>
+  <dgm:styleLbl name="fgAcc0">
+    <dgm:scene3d>
+      <a:camera prst="orthographicFront"/>
+      <a:lightRig rig="threePt" dir="t"/>
+    </dgm:scene3d>
+    <dgm:sp3d/>
+    <dgm:txPr/>
+    <dgm:style>
+      <a:lnRef idx="2">
+        <a:scrgbClr r="0" g="0" b="0"/>
+      </a:lnRef>
+      <a:fillRef idx="1">
+        <a:scrgbClr r="0" g="0" b="0"/>
+      </a:fillRef>
+      <a:effectRef idx="0">
+        <a:scrgbClr r="0" g="0" b="0"/>
+      </a:effectRef>
+      <a:fontRef idx="minor"/>
+    </dgm:style>
+  </dgm:styleLbl>
+  <dgm:styleLbl name="fgAcc2">
+    <dgm:scene3d>
+      <a:camera prst="orthographicFront"/>
+      <a:lightRig rig="threePt" dir="t"/>
+    </dgm:scene3d>
+    <dgm:sp3d/>
+    <dgm:txPr/>
+    <dgm:style>
+      <a:lnRef idx="2">
+        <a:scrgbClr r="0" g="0" b="0"/>
+      </a:lnRef>
+      <a:fillRef idx="1">
+        <a:scrgbClr r="0" g="0" b="0"/>
+      </a:fillRef>
+      <a:effectRef idx="0">
+        <a:scrgbClr r="0" g="0" b="0"/>
+      </a:effectRef>
+      <a:fontRef idx="minor"/>
+    </dgm:style>
+  </dgm:styleLbl>
+  <dgm:styleLbl name="fgAcc3">
+    <dgm:scene3d>
+      <a:camera prst="orthographicFront"/>
+      <a:lightRig rig="threePt" dir="t"/>
+    </dgm:scene3d>
+    <dgm:sp3d/>
+    <dgm:txPr/>
+    <dgm:style>
+      <a:lnRef idx="2">
+        <a:scrgbClr r="0" g="0" b="0"/>
+      </a:lnRef>
+      <a:fillRef idx="1">
+        <a:scrgbClr r="0" g="0" b="0"/>
+      </a:fillRef>
+      <a:effectRef idx="0">
+        <a:scrgbClr r="0" g="0" b="0"/>
+      </a:effectRef>
+      <a:fontRef idx="minor"/>
+    </dgm:style>
+  </dgm:styleLbl>
+  <dgm:styleLbl name="fgAcc4">
+    <dgm:scene3d>
+      <a:camera prst="orthographicFront"/>
+      <a:lightRig rig="threePt" dir="t"/>
+    </dgm:scene3d>
+    <dgm:sp3d/>
+    <dgm:txPr/>
+    <dgm:style>
+      <a:lnRef idx="2">
+        <a:scrgbClr r="0" g="0" b="0"/>
+      </a:lnRef>
+      <a:fillRef idx="1">
+        <a:scrgbClr r="0" g="0" b="0"/>
+      </a:fillRef>
+      <a:effectRef idx="0">
+        <a:scrgbClr r="0" g="0" b="0"/>
+      </a:effectRef>
+      <a:fontRef idx="minor"/>
+    </dgm:style>
+  </dgm:styleLbl>
+  <dgm:styleLbl name="bgShp">
+    <dgm:scene3d>
+      <a:camera prst="orthographicFront"/>
+      <a:lightRig rig="threePt" dir="t"/>
+    </dgm:scene3d>
+    <dgm:sp3d/>
+    <dgm:txPr/>
+    <dgm:style>
+      <a:lnRef idx="0">
+        <a:scrgbClr r="0" g="0" b="0"/>
+      </a:lnRef>
+      <a:fillRef idx="1">
+        <a:scrgbClr r="0" g="0" b="0"/>
+      </a:fillRef>
+      <a:effectRef idx="0">
+        <a:scrgbClr r="0" g="0" b="0"/>
+      </a:effectRef>
+      <a:fontRef idx="minor"/>
+    </dgm:style>
+  </dgm:styleLbl>
+  <dgm:styleLbl name="dkBgShp">
+    <dgm:scene3d>
+      <a:camera prst="orthographicFront"/>
+      <a:lightRig rig="threePt" dir="t"/>
+    </dgm:scene3d>
+    <dgm:sp3d/>
+    <dgm:txPr/>
+    <dgm:style>
+      <a:lnRef idx="0">
+        <a:scrgbClr r="0" g="0" b="0"/>
+      </a:lnRef>
+      <a:fillRef idx="1">
+        <a:scrgbClr r="0" g="0" b="0"/>
+      </a:fillRef>
+      <a:effectRef idx="0">
+        <a:scrgbClr r="0" g="0" b="0"/>
+      </a:effectRef>
+      <a:fontRef idx="minor"/>
+    </dgm:style>
+  </dgm:styleLbl>
+  <dgm:styleLbl name="trBgShp">
+    <dgm:scene3d>
+      <a:camera prst="orthographicFront"/>
+      <a:lightRig rig="threePt" dir="t"/>
+    </dgm:scene3d>
+    <dgm:sp3d/>
+    <dgm:txPr/>
+    <dgm:style>
+      <a:lnRef idx="0">
+        <a:scrgbClr r="0" g="0" b="0"/>
+      </a:lnRef>
+      <a:fillRef idx="1">
+        <a:scrgbClr r="0" g="0" b="0"/>
+      </a:fillRef>
+      <a:effectRef idx="0">
+        <a:scrgbClr r="0" g="0" b="0"/>
+      </a:effectRef>
+      <a:fontRef idx="minor"/>
+    </dgm:style>
+  </dgm:styleLbl>
+  <dgm:styleLbl name="fgShp">
+    <dgm:scene3d>
+      <a:camera prst="orthographicFront"/>
+      <a:lightRig rig="threePt" dir="t"/>
+    </dgm:scene3d>
+    <dgm:sp3d/>
+    <dgm:txPr/>
+    <dgm:style>
+      <a:lnRef idx="2">
+        <a:scrgbClr r="0" g="0" b="0"/>
+      </a:lnRef>
+      <a:fillRef idx="1">
+        <a:scrgbClr r="0" g="0" b="0"/>
+      </a:fillRef>
+      <a:effectRef idx="0">
+        <a:scrgbClr r="0" g="0" b="0"/>
+      </a:effectRef>
+      <a:fontRef idx="minor"/>
+    </dgm:style>
+  </dgm:styleLbl>
+  <dgm:styleLbl name="revTx">
+    <dgm:scene3d>
+      <a:camera prst="orthographicFront"/>
+      <a:lightRig rig="threePt" dir="t"/>
+    </dgm:scene3d>
+    <dgm:sp3d/>
+    <dgm:txPr/>
+    <dgm:style>
+      <a:lnRef idx="0">
+        <a:scrgbClr r="0" g="0" b="0"/>
+      </a:lnRef>
+      <a:fillRef idx="0">
+        <a:scrgbClr r="0" g="0" b="0"/>
+      </a:fillRef>
+      <a:effectRef idx="0">
+        <a:scrgbClr r="0" g="0" b="0"/>
+      </a:effectRef>
+      <a:fontRef idx="minor"/>
+    </dgm:style>
+  </dgm:styleLbl>
+</dgm:styleDef>
+</file>
+
+<file path=ppt/diagrams/quickStyle4.xml><?xml version="1.0" encoding="utf-8"?>
 <dgm:styleDef xmlns:dgm="http://schemas.openxmlformats.org/drawingml/2006/diagram" xmlns:a="http://schemas.openxmlformats.org/drawingml/2006/main" uniqueId="urn:microsoft.com/office/officeart/2005/8/quickstyle/simple1">
   <dgm:title val=""/>
   <dgm:desc val=""/>
@@ -9334,7 +12308,7 @@
           <a:p>
             <a:fld id="{05D24ABC-B950-4096-92E2-D69FE0588DD3}" type="datetimeFigureOut">
               <a:rPr lang="en-US" smtClean="0"/>
-              <a:t>9/12/2019</a:t>
+              <a:t>10/17/2019</a:t>
             </a:fld>
             <a:endParaRPr lang="en-US"/>
           </a:p>
@@ -9723,7 +12697,7 @@
           <a:p>
             <a:fld id="{62072DC8-D49D-432C-9D46-A7718B5F5490}" type="datetime8">
               <a:rPr lang="en-US" smtClean="0"/>
-              <a:t>9/12/2019 3:14 PM</a:t>
+              <a:t>10/17/2019 12:37 PM</a:t>
             </a:fld>
             <a:endParaRPr lang="en-US" dirty="0"/>
           </a:p>
@@ -9757,6 +12731,206 @@
     <p:extLst>
       <p:ext uri="{BB962C8B-B14F-4D97-AF65-F5344CB8AC3E}">
         <p14:creationId xmlns:p14="http://schemas.microsoft.com/office/powerpoint/2010/main" val="2156106936"/>
+      </p:ext>
+    </p:extLst>
+  </p:cSld>
+  <p:clrMapOvr>
+    <a:masterClrMapping/>
+  </p:clrMapOvr>
+</p:notes>
+</file>
+
+<file path=ppt/notesSlides/notesSlide10.xml><?xml version="1.0" encoding="utf-8"?>
+<p:notes xmlns:a="http://schemas.openxmlformats.org/drawingml/2006/main" xmlns:r="http://schemas.openxmlformats.org/officeDocument/2006/relationships" xmlns:p="http://schemas.openxmlformats.org/presentationml/2006/main">
+  <p:cSld>
+    <p:spTree>
+      <p:nvGrpSpPr>
+        <p:cNvPr id="1" name=""/>
+        <p:cNvGrpSpPr/>
+        <p:nvPr/>
+      </p:nvGrpSpPr>
+      <p:grpSpPr>
+        <a:xfrm>
+          <a:off x="0" y="0"/>
+          <a:ext cx="0" cy="0"/>
+          <a:chOff x="0" y="0"/>
+          <a:chExt cx="0" cy="0"/>
+        </a:xfrm>
+      </p:grpSpPr>
+      <p:sp>
+        <p:nvSpPr>
+          <p:cNvPr id="2" name="Slide Image Placeholder 1"/>
+          <p:cNvSpPr>
+            <a:spLocks noGrp="1" noRot="1" noChangeAspect="1"/>
+          </p:cNvSpPr>
+          <p:nvPr>
+            <p:ph type="sldImg"/>
+          </p:nvPr>
+        </p:nvSpPr>
+        <p:spPr>
+          <a:xfrm>
+            <a:off x="381000" y="685800"/>
+            <a:ext cx="6096000" cy="3429000"/>
+          </a:xfrm>
+        </p:spPr>
+      </p:sp>
+      <p:sp>
+        <p:nvSpPr>
+          <p:cNvPr id="3" name="Notes Placeholder 2"/>
+          <p:cNvSpPr>
+            <a:spLocks noGrp="1"/>
+          </p:cNvSpPr>
+          <p:nvPr>
+            <p:ph type="body" idx="1"/>
+          </p:nvPr>
+        </p:nvSpPr>
+        <p:spPr/>
+        <p:txBody>
+          <a:bodyPr>
+            <a:normAutofit/>
+          </a:bodyPr>
+          <a:lstStyle/>
+          <a:p>
+            <a:endParaRPr lang="en-US" dirty="0"/>
+          </a:p>
+        </p:txBody>
+      </p:sp>
+      <p:sp>
+        <p:nvSpPr>
+          <p:cNvPr id="4" name="Header Placeholder 3"/>
+          <p:cNvSpPr>
+            <a:spLocks noGrp="1"/>
+          </p:cNvSpPr>
+          <p:nvPr>
+            <p:ph type="hdr" sz="quarter" idx="10"/>
+          </p:nvPr>
+        </p:nvSpPr>
+        <p:spPr>
+          <a:xfrm>
+            <a:off x="0" y="0"/>
+            <a:ext cx="2971800" cy="457200"/>
+          </a:xfrm>
+          <a:prstGeom prst="rect">
+            <a:avLst/>
+          </a:prstGeom>
+        </p:spPr>
+        <p:txBody>
+          <a:bodyPr/>
+          <a:lstStyle/>
+          <a:p>
+            <a:endParaRPr lang="en-US" dirty="0">
+              <a:solidFill>
+                <a:prstClr val="black"/>
+              </a:solidFill>
+            </a:endParaRPr>
+          </a:p>
+        </p:txBody>
+      </p:sp>
+      <p:sp>
+        <p:nvSpPr>
+          <p:cNvPr id="5" name="Date Placeholder 4"/>
+          <p:cNvSpPr>
+            <a:spLocks noGrp="1"/>
+          </p:cNvSpPr>
+          <p:nvPr>
+            <p:ph type="dt" idx="11"/>
+          </p:nvPr>
+        </p:nvSpPr>
+        <p:spPr/>
+        <p:txBody>
+          <a:bodyPr/>
+          <a:lstStyle/>
+          <a:p>
+            <a:fld id="{0ECFDC7D-F4BE-4668-920D-08874925A5D7}" type="datetime8">
+              <a:rPr lang="en-US" smtClean="0">
+                <a:solidFill>
+                  <a:prstClr val="black"/>
+                </a:solidFill>
+              </a:rPr>
+              <a:t>10/17/2019 12:37 PM</a:t>
+            </a:fld>
+            <a:endParaRPr lang="en-US" dirty="0">
+              <a:solidFill>
+                <a:prstClr val="black"/>
+              </a:solidFill>
+            </a:endParaRPr>
+          </a:p>
+        </p:txBody>
+      </p:sp>
+      <p:sp>
+        <p:nvSpPr>
+          <p:cNvPr id="7" name="Slide Number Placeholder 6"/>
+          <p:cNvSpPr>
+            <a:spLocks noGrp="1"/>
+          </p:cNvSpPr>
+          <p:nvPr>
+            <p:ph type="sldNum" sz="quarter" idx="13"/>
+          </p:nvPr>
+        </p:nvSpPr>
+        <p:spPr/>
+        <p:txBody>
+          <a:bodyPr/>
+          <a:lstStyle/>
+          <a:p>
+            <a:fld id="{EC87E0CF-87F6-4B58-B8B8-DCAB2DAAF3CA}" type="slidenum">
+              <a:rPr lang="en-US" smtClean="0">
+                <a:solidFill>
+                  <a:prstClr val="black"/>
+                </a:solidFill>
+              </a:rPr>
+              <a:pPr/>
+              <a:t>10</a:t>
+            </a:fld>
+            <a:endParaRPr lang="en-US" dirty="0">
+              <a:solidFill>
+                <a:prstClr val="black"/>
+              </a:solidFill>
+            </a:endParaRPr>
+          </a:p>
+        </p:txBody>
+      </p:sp>
+      <p:sp>
+        <p:nvSpPr>
+          <p:cNvPr id="6" name="Footer Placeholder 5"/>
+          <p:cNvSpPr>
+            <a:spLocks noGrp="1"/>
+          </p:cNvSpPr>
+          <p:nvPr>
+            <p:ph type="ftr" sz="quarter" idx="14"/>
+          </p:nvPr>
+        </p:nvSpPr>
+        <p:spPr/>
+        <p:txBody>
+          <a:bodyPr/>
+          <a:lstStyle/>
+          <a:p>
+            <a:pPr defTabSz="914099" eaLnBrk="0" hangingPunct="0"/>
+            <a:r>
+              <a:rPr lang="en-US" sz="400" dirty="0">
+                <a:gradFill>
+                  <a:gsLst>
+                    <a:gs pos="0">
+                      <a:prstClr val="black"/>
+                    </a:gs>
+                    <a:gs pos="100000">
+                      <a:prstClr val="black"/>
+                    </a:gs>
+                  </a:gsLst>
+                  <a:lin ang="5400000" scaled="0"/>
+                </a:gradFill>
+                <a:latin typeface="Segoe UI" pitchFamily="34" charset="0"/>
+                <a:ea typeface="Segoe UI" pitchFamily="34" charset="0"/>
+                <a:cs typeface="Segoe UI" pitchFamily="34" charset="0"/>
+              </a:rPr>
+              <a:t>© Microsoft Corporation. All rights reserved. MICROSOFT MAKES NO WARRANTIES, EXPRESS, IMPLIED OR STATUTORY, AS TO THE INFORMATION IN THIS PRESENTATION.</a:t>
+            </a:r>
+          </a:p>
+        </p:txBody>
+      </p:sp>
+    </p:spTree>
+    <p:extLst>
+      <p:ext uri="{BB962C8B-B14F-4D97-AF65-F5344CB8AC3E}">
+        <p14:creationId xmlns:p14="http://schemas.microsoft.com/office/powerpoint/2010/main" val="2185510719"/>
       </p:ext>
     </p:extLst>
   </p:cSld>
@@ -9949,7 +13123,7 @@
           <a:p>
             <a:fld id="{72E0C910-0166-48E0-B8EF-5071277A02A8}" type="datetime8">
               <a:rPr lang="en-US" smtClean="0"/>
-              <a:t>9/12/2019 3:14 PM</a:t>
+              <a:t>10/17/2019 12:37 PM</a:t>
             </a:fld>
             <a:endParaRPr lang="en-US" dirty="0"/>
           </a:p>
@@ -10125,7 +13299,7 @@
           <a:p>
             <a:fld id="{72E0C910-0166-48E0-B8EF-5071277A02A8}" type="datetime8">
               <a:rPr lang="en-US" smtClean="0"/>
-              <a:t>9/12/2019 3:14 PM</a:t>
+              <a:t>10/17/2019 12:37 PM</a:t>
             </a:fld>
             <a:endParaRPr lang="en-US" dirty="0"/>
           </a:p>
@@ -10520,7 +13694,7 @@
           <a:p>
             <a:fld id="{72E0C910-0166-48E0-B8EF-5071277A02A8}" type="datetime8">
               <a:rPr lang="en-US" smtClean="0"/>
-              <a:t>9/12/2019 3:14 PM</a:t>
+              <a:t>10/17/2019 12:37 PM</a:t>
             </a:fld>
             <a:endParaRPr lang="en-US" dirty="0"/>
           </a:p>
@@ -10978,7 +14152,7 @@
           <a:p>
             <a:fld id="{72E0C910-0166-48E0-B8EF-5071277A02A8}" type="datetime8">
               <a:rPr lang="en-US" smtClean="0"/>
-              <a:t>9/12/2019 3:14 PM</a:t>
+              <a:t>10/17/2019 12:37 PM</a:t>
             </a:fld>
             <a:endParaRPr lang="en-US" dirty="0"/>
           </a:p>
@@ -11563,7 +14737,7 @@
           <a:p>
             <a:fld id="{72E0C910-0166-48E0-B8EF-5071277A02A8}" type="datetime8">
               <a:rPr lang="en-US" smtClean="0"/>
-              <a:t>9/12/2019 3:14 PM</a:t>
+              <a:t>10/17/2019 12:37 PM</a:t>
             </a:fld>
             <a:endParaRPr lang="en-US" dirty="0"/>
           </a:p>
@@ -11650,18 +14824,32 @@
           <a:bodyPr/>
           <a:lstStyle/>
           <a:p>
+            <a:r>
+              <a:rPr lang="en-US" sz="1200" kern="1200" dirty="0">
+                <a:solidFill>
+                  <a:schemeClr val="tx1"/>
+                </a:solidFill>
+                <a:effectLst/>
+                <a:latin typeface="+mn-lt"/>
+                <a:ea typeface="+mn-ea"/>
+                <a:cs typeface="+mn-cs"/>
+              </a:rPr>
+              <a:t>Scalability for the biggest query (high water mark), 1K. - Let’s say that you have a SCCM collection that have 50,000 endpoints, that is ~50MB max over the network.</a:t>
+            </a:r>
+          </a:p>
+          <a:p>
             <a:endParaRPr lang="en-US" dirty="0"/>
           </a:p>
         </p:txBody>
       </p:sp>
       <p:sp>
         <p:nvSpPr>
-          <p:cNvPr id="4" name="Header Placeholder 3"/>
+          <p:cNvPr id="4" name="Slide Number Placeholder 3"/>
           <p:cNvSpPr>
             <a:spLocks noGrp="1"/>
           </p:cNvSpPr>
           <p:nvPr>
-            <p:ph type="hdr" sz="quarter" idx="10"/>
+            <p:ph type="sldNum" sz="quarter" idx="5"/>
           </p:nvPr>
         </p:nvSpPr>
         <p:spPr/>
@@ -11669,270 +14857,18 @@
           <a:bodyPr/>
           <a:lstStyle/>
           <a:p>
-            <a:pPr marL="0" marR="0" lvl="0" indent="0" algn="l" defTabSz="914367" rtl="0" eaLnBrk="1" fontAlgn="auto" latinLnBrk="0" hangingPunct="1">
-              <a:lnSpc>
-                <a:spcPct val="100000"/>
-              </a:lnSpc>
-              <a:spcBef>
-                <a:spcPts val="0"/>
-              </a:spcBef>
-              <a:spcAft>
-                <a:spcPts val="0"/>
-              </a:spcAft>
-              <a:buClrTx/>
-              <a:buSzTx/>
-              <a:buFontTx/>
-              <a:buNone/>
-              <a:tabLst/>
-              <a:defRPr/>
-            </a:pPr>
-            <a:endParaRPr kumimoji="0" lang="en-US" sz="1200" b="0" i="0" u="none" strike="noStrike" kern="1200" cap="none" spc="0" normalizeH="0" baseline="0" noProof="0" dirty="0">
-              <a:ln>
-                <a:noFill/>
-              </a:ln>
-              <a:solidFill>
-                <a:prstClr val="black"/>
-              </a:solidFill>
-              <a:effectLst/>
-              <a:uLnTx/>
-              <a:uFillTx/>
-              <a:latin typeface="Segoe UI" pitchFamily="34" charset="0"/>
-              <a:ea typeface="+mn-ea"/>
-              <a:cs typeface="+mn-cs"/>
-            </a:endParaRPr>
-          </a:p>
-        </p:txBody>
-      </p:sp>
-      <p:sp>
-        <p:nvSpPr>
-          <p:cNvPr id="5" name="Footer Placeholder 4"/>
-          <p:cNvSpPr>
-            <a:spLocks noGrp="1"/>
-          </p:cNvSpPr>
-          <p:nvPr>
-            <p:ph type="ftr" sz="quarter" idx="11"/>
-          </p:nvPr>
-        </p:nvSpPr>
-        <p:spPr/>
-        <p:txBody>
-          <a:bodyPr/>
-          <a:lstStyle/>
-          <a:p>
-            <a:pPr marL="571500" marR="0" lvl="0" indent="0" algn="l" defTabSz="914099" rtl="0" eaLnBrk="0" fontAlgn="auto" latinLnBrk="0" hangingPunct="0">
-              <a:lnSpc>
-                <a:spcPct val="100000"/>
-              </a:lnSpc>
-              <a:spcBef>
-                <a:spcPts val="0"/>
-              </a:spcBef>
-              <a:spcAft>
-                <a:spcPts val="0"/>
-              </a:spcAft>
-              <a:buClrTx/>
-              <a:buSzTx/>
-              <a:buFontTx/>
-              <a:buNone/>
-              <a:tabLst/>
-              <a:defRPr/>
-            </a:pPr>
-            <a:r>
-              <a:rPr kumimoji="0" lang="en-US" sz="400" b="0" i="0" u="none" strike="noStrike" kern="1200" cap="none" spc="0" normalizeH="0" baseline="0" noProof="0" dirty="0">
-                <a:ln>
-                  <a:noFill/>
-                </a:ln>
-                <a:gradFill>
-                  <a:gsLst>
-                    <a:gs pos="0">
-                      <a:prstClr val="black"/>
-                    </a:gs>
-                    <a:gs pos="100000">
-                      <a:prstClr val="black"/>
-                    </a:gs>
-                  </a:gsLst>
-                  <a:lin ang="5400000" scaled="0"/>
-                </a:gradFill>
-                <a:effectLst/>
-                <a:uLnTx/>
-                <a:uFillTx/>
-                <a:latin typeface="Segoe UI" pitchFamily="34" charset="0"/>
-                <a:ea typeface="Segoe UI" pitchFamily="34" charset="0"/>
-                <a:cs typeface="Segoe UI" pitchFamily="34" charset="0"/>
-              </a:rPr>
-              <a:t>© Microsoft Corporation. All rights reserved. MICROSOFT MAKES NO WARRANTIES, EXPRESS, IMPLIED OR STATUTORY, AS TO THE INFORMATION IN THIS PRESENTATION.</a:t>
-            </a:r>
-          </a:p>
-        </p:txBody>
-      </p:sp>
-      <p:sp>
-        <p:nvSpPr>
-          <p:cNvPr id="6" name="Date Placeholder 5"/>
-          <p:cNvSpPr>
-            <a:spLocks noGrp="1"/>
-          </p:cNvSpPr>
-          <p:nvPr>
-            <p:ph type="dt" idx="12"/>
-          </p:nvPr>
-        </p:nvSpPr>
-        <p:spPr/>
-        <p:txBody>
-          <a:bodyPr/>
-          <a:lstStyle/>
-          <a:p>
-            <a:pPr marL="0" marR="0" lvl="0" indent="0" algn="r" defTabSz="914367" rtl="0" eaLnBrk="1" fontAlgn="auto" latinLnBrk="0" hangingPunct="1">
-              <a:lnSpc>
-                <a:spcPct val="100000"/>
-              </a:lnSpc>
-              <a:spcBef>
-                <a:spcPts val="0"/>
-              </a:spcBef>
-              <a:spcAft>
-                <a:spcPts val="0"/>
-              </a:spcAft>
-              <a:buClrTx/>
-              <a:buSzTx/>
-              <a:buFontTx/>
-              <a:buNone/>
-              <a:tabLst/>
-              <a:defRPr/>
-            </a:pPr>
-            <a:fld id="{B16574EE-8191-4BCC-ABE6-D00A4F4D7690}" type="datetime8">
-              <a:rPr kumimoji="0" lang="en-US" sz="1200" b="0" i="0" u="none" strike="noStrike" kern="1200" cap="none" spc="0" normalizeH="0" baseline="0" noProof="0" smtClean="0">
-                <a:ln>
-                  <a:noFill/>
-                </a:ln>
-                <a:solidFill>
-                  <a:prstClr val="black"/>
-                </a:solidFill>
-                <a:effectLst/>
-                <a:uLnTx/>
-                <a:uFillTx/>
-                <a:latin typeface="Segoe UI" pitchFamily="34" charset="0"/>
-                <a:ea typeface="+mn-ea"/>
-                <a:cs typeface="+mn-cs"/>
-              </a:rPr>
-              <a:pPr marL="0" marR="0" lvl="0" indent="0" algn="r" defTabSz="914367" rtl="0" eaLnBrk="1" fontAlgn="auto" latinLnBrk="0" hangingPunct="1">
-                <a:lnSpc>
-                  <a:spcPct val="100000"/>
-                </a:lnSpc>
-                <a:spcBef>
-                  <a:spcPts val="0"/>
-                </a:spcBef>
-                <a:spcAft>
-                  <a:spcPts val="0"/>
-                </a:spcAft>
-                <a:buClrTx/>
-                <a:buSzTx/>
-                <a:buFontTx/>
-                <a:buNone/>
-                <a:tabLst/>
-                <a:defRPr/>
-              </a:pPr>
-              <a:t>9/12/2019 3:14 PM</a:t>
-            </a:fld>
-            <a:endParaRPr kumimoji="0" lang="en-US" sz="1200" b="0" i="0" u="none" strike="noStrike" kern="1200" cap="none" spc="0" normalizeH="0" baseline="0" noProof="0" dirty="0">
-              <a:ln>
-                <a:noFill/>
-              </a:ln>
-              <a:solidFill>
-                <a:prstClr val="black"/>
-              </a:solidFill>
-              <a:effectLst/>
-              <a:uLnTx/>
-              <a:uFillTx/>
-              <a:latin typeface="Segoe UI" pitchFamily="34" charset="0"/>
-              <a:ea typeface="+mn-ea"/>
-              <a:cs typeface="+mn-cs"/>
-            </a:endParaRPr>
-          </a:p>
-        </p:txBody>
-      </p:sp>
-      <p:sp>
-        <p:nvSpPr>
-          <p:cNvPr id="7" name="Slide Number Placeholder 6"/>
-          <p:cNvSpPr>
-            <a:spLocks noGrp="1"/>
-          </p:cNvSpPr>
-          <p:nvPr>
-            <p:ph type="sldNum" sz="quarter" idx="13"/>
-          </p:nvPr>
-        </p:nvSpPr>
-        <p:spPr/>
-        <p:txBody>
-          <a:bodyPr/>
-          <a:lstStyle/>
-          <a:p>
-            <a:pPr marL="0" marR="0" lvl="0" indent="0" algn="r" defTabSz="914367" rtl="0" eaLnBrk="1" fontAlgn="auto" latinLnBrk="0" hangingPunct="1">
-              <a:lnSpc>
-                <a:spcPct val="100000"/>
-              </a:lnSpc>
-              <a:spcBef>
-                <a:spcPts val="0"/>
-              </a:spcBef>
-              <a:spcAft>
-                <a:spcPts val="0"/>
-              </a:spcAft>
-              <a:buClrTx/>
-              <a:buSzTx/>
-              <a:buFontTx/>
-              <a:buNone/>
-              <a:tabLst/>
-              <a:defRPr/>
-            </a:pPr>
-            <a:fld id="{B4008EB6-D09E-4580-8CD6-DDB14511944F}" type="slidenum">
-              <a:rPr kumimoji="0" lang="en-US" sz="1200" b="0" i="0" u="none" strike="noStrike" kern="1200" cap="none" spc="0" normalizeH="0" baseline="0" noProof="0" smtClean="0">
-                <a:ln>
-                  <a:noFill/>
-                </a:ln>
-                <a:solidFill>
-                  <a:prstClr val="black"/>
-                </a:solidFill>
-                <a:effectLst/>
-                <a:uLnTx/>
-                <a:uFillTx/>
-                <a:latin typeface="Segoe UI" pitchFamily="34" charset="0"/>
-                <a:ea typeface="+mn-ea"/>
-                <a:cs typeface="+mn-cs"/>
-              </a:rPr>
-              <a:pPr marL="0" marR="0" lvl="0" indent="0" algn="r" defTabSz="914367" rtl="0" eaLnBrk="1" fontAlgn="auto" latinLnBrk="0" hangingPunct="1">
-                <a:lnSpc>
-                  <a:spcPct val="100000"/>
-                </a:lnSpc>
-                <a:spcBef>
-                  <a:spcPts val="0"/>
-                </a:spcBef>
-                <a:spcAft>
-                  <a:spcPts val="0"/>
-                </a:spcAft>
-                <a:buClrTx/>
-                <a:buSzTx/>
-                <a:buFontTx/>
-                <a:buNone/>
-                <a:tabLst/>
-                <a:defRPr/>
-              </a:pPr>
+            <a:fld id="{730BBCD0-6F30-4ADF-BBF8-E13B1E17BE4D}" type="slidenum">
+              <a:rPr lang="en-US" smtClean="0"/>
               <a:t>7</a:t>
             </a:fld>
-            <a:endParaRPr kumimoji="0" lang="en-US" sz="1200" b="0" i="0" u="none" strike="noStrike" kern="1200" cap="none" spc="0" normalizeH="0" baseline="0" noProof="0" dirty="0">
-              <a:ln>
-                <a:noFill/>
-              </a:ln>
-              <a:solidFill>
-                <a:prstClr val="black"/>
-              </a:solidFill>
-              <a:effectLst/>
-              <a:uLnTx/>
-              <a:uFillTx/>
-              <a:latin typeface="Segoe UI" pitchFamily="34" charset="0"/>
-              <a:ea typeface="+mn-ea"/>
-              <a:cs typeface="+mn-cs"/>
-            </a:endParaRPr>
+            <a:endParaRPr lang="en-US"/>
           </a:p>
         </p:txBody>
       </p:sp>
     </p:spTree>
     <p:extLst>
       <p:ext uri="{BB962C8B-B14F-4D97-AF65-F5344CB8AC3E}">
-        <p14:creationId xmlns:p14="http://schemas.microsoft.com/office/powerpoint/2010/main" val="511922872"/>
+        <p14:creationId xmlns:p14="http://schemas.microsoft.com/office/powerpoint/2010/main" val="3074749519"/>
       </p:ext>
     </p:extLst>
   </p:cSld>
@@ -12005,7 +14941,37 @@
           <a:bodyPr/>
           <a:lstStyle/>
           <a:p>
-            <a:endParaRPr lang="en-US" dirty="0"/>
+            <a:pPr marL="0" marR="0" lvl="0" indent="0" algn="l" defTabSz="914367" rtl="0" eaLnBrk="1" fontAlgn="auto" latinLnBrk="0" hangingPunct="1">
+              <a:lnSpc>
+                <a:spcPct val="100000"/>
+              </a:lnSpc>
+              <a:spcBef>
+                <a:spcPts val="0"/>
+              </a:spcBef>
+              <a:spcAft>
+                <a:spcPts val="0"/>
+              </a:spcAft>
+              <a:buClrTx/>
+              <a:buSzTx/>
+              <a:buFontTx/>
+              <a:buNone/>
+              <a:tabLst/>
+              <a:defRPr/>
+            </a:pPr>
+            <a:endParaRPr kumimoji="0" lang="en-US" sz="1200" b="0" i="0" u="none" strike="noStrike" kern="1200" cap="none" spc="0" normalizeH="0" baseline="0" noProof="0" dirty="0">
+              <a:ln>
+                <a:noFill/>
+              </a:ln>
+              <a:solidFill>
+                <a:prstClr val="black"/>
+              </a:solidFill>
+              <a:effectLst/>
+              <a:uLnTx/>
+              <a:uFillTx/>
+              <a:latin typeface="Segoe UI" pitchFamily="34" charset="0"/>
+              <a:ea typeface="+mn-ea"/>
+              <a:cs typeface="+mn-cs"/>
+            </a:endParaRPr>
           </a:p>
         </p:txBody>
       </p:sp>
@@ -12024,9 +14990,28 @@
           <a:bodyPr/>
           <a:lstStyle/>
           <a:p>
-            <a:pPr defTabSz="914099" eaLnBrk="0" hangingPunct="0"/>
+            <a:pPr marL="571500" marR="0" lvl="0" indent="0" algn="l" defTabSz="914099" rtl="0" eaLnBrk="0" fontAlgn="auto" latinLnBrk="0" hangingPunct="0">
+              <a:lnSpc>
+                <a:spcPct val="100000"/>
+              </a:lnSpc>
+              <a:spcBef>
+                <a:spcPts val="0"/>
+              </a:spcBef>
+              <a:spcAft>
+                <a:spcPts val="0"/>
+              </a:spcAft>
+              <a:buClrTx/>
+              <a:buSzTx/>
+              <a:buFontTx/>
+              <a:buNone/>
+              <a:tabLst/>
+              <a:defRPr/>
+            </a:pPr>
             <a:r>
-              <a:rPr lang="en-US" sz="400" dirty="0">
+              <a:rPr kumimoji="0" lang="en-US" sz="400" b="0" i="0" u="none" strike="noStrike" kern="1200" cap="none" spc="0" normalizeH="0" baseline="0" noProof="0" dirty="0">
+                <a:ln>
+                  <a:noFill/>
+                </a:ln>
                 <a:gradFill>
                   <a:gsLst>
                     <a:gs pos="0">
@@ -12038,6 +15023,9 @@
                   </a:gsLst>
                   <a:lin ang="5400000" scaled="0"/>
                 </a:gradFill>
+                <a:effectLst/>
+                <a:uLnTx/>
+                <a:uFillTx/>
                 <a:latin typeface="Segoe UI" pitchFamily="34" charset="0"/>
                 <a:ea typeface="Segoe UI" pitchFamily="34" charset="0"/>
                 <a:cs typeface="Segoe UI" pitchFamily="34" charset="0"/>
@@ -12062,11 +15050,71 @@
           <a:bodyPr/>
           <a:lstStyle/>
           <a:p>
-            <a:fld id="{E2F19A73-88F5-4B80-A929-CF8E66EE5449}" type="datetime8">
-              <a:rPr lang="en-US" smtClean="0"/>
-              <a:t>9/12/2019 3:14 PM</a:t>
+            <a:pPr marL="0" marR="0" lvl="0" indent="0" algn="r" defTabSz="914367" rtl="0" eaLnBrk="1" fontAlgn="auto" latinLnBrk="0" hangingPunct="1">
+              <a:lnSpc>
+                <a:spcPct val="100000"/>
+              </a:lnSpc>
+              <a:spcBef>
+                <a:spcPts val="0"/>
+              </a:spcBef>
+              <a:spcAft>
+                <a:spcPts val="0"/>
+              </a:spcAft>
+              <a:buClrTx/>
+              <a:buSzTx/>
+              <a:buFontTx/>
+              <a:buNone/>
+              <a:tabLst/>
+              <a:defRPr/>
+            </a:pPr>
+            <a:fld id="{B16574EE-8191-4BCC-ABE6-D00A4F4D7690}" type="datetime8">
+              <a:rPr kumimoji="0" lang="en-US" sz="1200" b="0" i="0" u="none" strike="noStrike" kern="1200" cap="none" spc="0" normalizeH="0" baseline="0" noProof="0" smtClean="0">
+                <a:ln>
+                  <a:noFill/>
+                </a:ln>
+                <a:solidFill>
+                  <a:prstClr val="black"/>
+                </a:solidFill>
+                <a:effectLst/>
+                <a:uLnTx/>
+                <a:uFillTx/>
+                <a:latin typeface="Segoe UI" pitchFamily="34" charset="0"/>
+                <a:ea typeface="+mn-ea"/>
+                <a:cs typeface="+mn-cs"/>
+              </a:rPr>
+              <a:pPr marL="0" marR="0" lvl="0" indent="0" algn="r" defTabSz="914367" rtl="0" eaLnBrk="1" fontAlgn="auto" latinLnBrk="0" hangingPunct="1">
+                <a:lnSpc>
+                  <a:spcPct val="100000"/>
+                </a:lnSpc>
+                <a:spcBef>
+                  <a:spcPts val="0"/>
+                </a:spcBef>
+                <a:spcAft>
+                  <a:spcPts val="0"/>
+                </a:spcAft>
+                <a:buClrTx/>
+                <a:buSzTx/>
+                <a:buFontTx/>
+                <a:buNone/>
+                <a:tabLst/>
+                <a:defRPr/>
+              </a:pPr>
+              <a:t>10/17/2019 12:37 PM</a:t>
             </a:fld>
-            <a:endParaRPr lang="en-US" dirty="0"/>
+            <a:endParaRPr kumimoji="0" lang="en-US" sz="1200" b="0" i="0" u="none" strike="noStrike" kern="1200" cap="none" spc="0" normalizeH="0" baseline="0" noProof="0" dirty="0">
+              <a:ln>
+                <a:noFill/>
+              </a:ln>
+              <a:solidFill>
+                <a:prstClr val="black"/>
+              </a:solidFill>
+              <a:effectLst/>
+              <a:uLnTx/>
+              <a:uFillTx/>
+              <a:latin typeface="Segoe UI" pitchFamily="34" charset="0"/>
+              <a:ea typeface="+mn-ea"/>
+              <a:cs typeface="+mn-cs"/>
+            </a:endParaRPr>
           </a:p>
         </p:txBody>
       </p:sp>
@@ -12085,19 +15133,78 @@
           <a:bodyPr/>
           <a:lstStyle/>
           <a:p>
+            <a:pPr marL="0" marR="0" lvl="0" indent="0" algn="r" defTabSz="914367" rtl="0" eaLnBrk="1" fontAlgn="auto" latinLnBrk="0" hangingPunct="1">
+              <a:lnSpc>
+                <a:spcPct val="100000"/>
+              </a:lnSpc>
+              <a:spcBef>
+                <a:spcPts val="0"/>
+              </a:spcBef>
+              <a:spcAft>
+                <a:spcPts val="0"/>
+              </a:spcAft>
+              <a:buClrTx/>
+              <a:buSzTx/>
+              <a:buFontTx/>
+              <a:buNone/>
+              <a:tabLst/>
+              <a:defRPr/>
+            </a:pPr>
             <a:fld id="{B4008EB6-D09E-4580-8CD6-DDB14511944F}" type="slidenum">
-              <a:rPr lang="en-US" smtClean="0"/>
-              <a:pPr/>
+              <a:rPr kumimoji="0" lang="en-US" sz="1200" b="0" i="0" u="none" strike="noStrike" kern="1200" cap="none" spc="0" normalizeH="0" baseline="0" noProof="0" smtClean="0">
+                <a:ln>
+                  <a:noFill/>
+                </a:ln>
+                <a:solidFill>
+                  <a:prstClr val="black"/>
+                </a:solidFill>
+                <a:effectLst/>
+                <a:uLnTx/>
+                <a:uFillTx/>
+                <a:latin typeface="Segoe UI" pitchFamily="34" charset="0"/>
+                <a:ea typeface="+mn-ea"/>
+                <a:cs typeface="+mn-cs"/>
+              </a:rPr>
+              <a:pPr marL="0" marR="0" lvl="0" indent="0" algn="r" defTabSz="914367" rtl="0" eaLnBrk="1" fontAlgn="auto" latinLnBrk="0" hangingPunct="1">
+                <a:lnSpc>
+                  <a:spcPct val="100000"/>
+                </a:lnSpc>
+                <a:spcBef>
+                  <a:spcPts val="0"/>
+                </a:spcBef>
+                <a:spcAft>
+                  <a:spcPts val="0"/>
+                </a:spcAft>
+                <a:buClrTx/>
+                <a:buSzTx/>
+                <a:buFontTx/>
+                <a:buNone/>
+                <a:tabLst/>
+                <a:defRPr/>
+              </a:pPr>
               <a:t>8</a:t>
             </a:fld>
-            <a:endParaRPr lang="en-US" dirty="0"/>
+            <a:endParaRPr kumimoji="0" lang="en-US" sz="1200" b="0" i="0" u="none" strike="noStrike" kern="1200" cap="none" spc="0" normalizeH="0" baseline="0" noProof="0" dirty="0">
+              <a:ln>
+                <a:noFill/>
+              </a:ln>
+              <a:solidFill>
+                <a:prstClr val="black"/>
+              </a:solidFill>
+              <a:effectLst/>
+              <a:uLnTx/>
+              <a:uFillTx/>
+              <a:latin typeface="Segoe UI" pitchFamily="34" charset="0"/>
+              <a:ea typeface="+mn-ea"/>
+              <a:cs typeface="+mn-cs"/>
+            </a:endParaRPr>
           </a:p>
         </p:txBody>
       </p:sp>
     </p:spTree>
     <p:extLst>
       <p:ext uri="{BB962C8B-B14F-4D97-AF65-F5344CB8AC3E}">
-        <p14:creationId xmlns:p14="http://schemas.microsoft.com/office/powerpoint/2010/main" val="2548236910"/>
+        <p14:creationId xmlns:p14="http://schemas.microsoft.com/office/powerpoint/2010/main" val="511922872"/>
       </p:ext>
     </p:extLst>
   </p:cSld>
@@ -12134,12 +15241,7 @@
             <p:ph type="sldImg"/>
           </p:nvPr>
         </p:nvSpPr>
-        <p:spPr>
-          <a:xfrm>
-            <a:off x="381000" y="685800"/>
-            <a:ext cx="6096000" cy="3429000"/>
-          </a:xfrm>
-        </p:spPr>
+        <p:spPr/>
       </p:sp>
       <p:sp>
         <p:nvSpPr>
@@ -12153,9 +15255,7 @@
         </p:nvSpPr>
         <p:spPr/>
         <p:txBody>
-          <a:bodyPr>
-            <a:normAutofit/>
-          </a:bodyPr>
+          <a:bodyPr/>
           <a:lstStyle/>
           <a:p>
             <a:endParaRPr lang="en-US" dirty="0"/>
@@ -12172,98 +15272,23 @@
             <p:ph type="hdr" sz="quarter" idx="10"/>
           </p:nvPr>
         </p:nvSpPr>
-        <p:spPr>
-          <a:xfrm>
-            <a:off x="0" y="0"/>
-            <a:ext cx="2971800" cy="457200"/>
-          </a:xfrm>
-          <a:prstGeom prst="rect">
-            <a:avLst/>
-          </a:prstGeom>
-        </p:spPr>
+        <p:spPr/>
         <p:txBody>
           <a:bodyPr/>
           <a:lstStyle/>
           <a:p>
-            <a:endParaRPr lang="en-US" dirty="0">
-              <a:solidFill>
-                <a:prstClr val="black"/>
-              </a:solidFill>
-            </a:endParaRPr>
+            <a:endParaRPr lang="en-US" dirty="0"/>
           </a:p>
         </p:txBody>
       </p:sp>
       <p:sp>
         <p:nvSpPr>
-          <p:cNvPr id="5" name="Date Placeholder 4"/>
+          <p:cNvPr id="5" name="Footer Placeholder 4"/>
           <p:cNvSpPr>
             <a:spLocks noGrp="1"/>
           </p:cNvSpPr>
           <p:nvPr>
-            <p:ph type="dt" idx="11"/>
-          </p:nvPr>
-        </p:nvSpPr>
-        <p:spPr/>
-        <p:txBody>
-          <a:bodyPr/>
-          <a:lstStyle/>
-          <a:p>
-            <a:fld id="{0ECFDC7D-F4BE-4668-920D-08874925A5D7}" type="datetime8">
-              <a:rPr lang="en-US" smtClean="0">
-                <a:solidFill>
-                  <a:prstClr val="black"/>
-                </a:solidFill>
-              </a:rPr>
-              <a:t>9/12/2019 3:14 PM</a:t>
-            </a:fld>
-            <a:endParaRPr lang="en-US" dirty="0">
-              <a:solidFill>
-                <a:prstClr val="black"/>
-              </a:solidFill>
-            </a:endParaRPr>
-          </a:p>
-        </p:txBody>
-      </p:sp>
-      <p:sp>
-        <p:nvSpPr>
-          <p:cNvPr id="7" name="Slide Number Placeholder 6"/>
-          <p:cNvSpPr>
-            <a:spLocks noGrp="1"/>
-          </p:cNvSpPr>
-          <p:nvPr>
-            <p:ph type="sldNum" sz="quarter" idx="13"/>
-          </p:nvPr>
-        </p:nvSpPr>
-        <p:spPr/>
-        <p:txBody>
-          <a:bodyPr/>
-          <a:lstStyle/>
-          <a:p>
-            <a:fld id="{EC87E0CF-87F6-4B58-B8B8-DCAB2DAAF3CA}" type="slidenum">
-              <a:rPr lang="en-US" smtClean="0">
-                <a:solidFill>
-                  <a:prstClr val="black"/>
-                </a:solidFill>
-              </a:rPr>
-              <a:pPr/>
-              <a:t>9</a:t>
-            </a:fld>
-            <a:endParaRPr lang="en-US" dirty="0">
-              <a:solidFill>
-                <a:prstClr val="black"/>
-              </a:solidFill>
-            </a:endParaRPr>
-          </a:p>
-        </p:txBody>
-      </p:sp>
-      <p:sp>
-        <p:nvSpPr>
-          <p:cNvPr id="6" name="Footer Placeholder 5"/>
-          <p:cNvSpPr>
-            <a:spLocks noGrp="1"/>
-          </p:cNvSpPr>
-          <p:nvPr>
-            <p:ph type="ftr" sz="quarter" idx="14"/>
+            <p:ph type="ftr" sz="quarter" idx="11"/>
           </p:nvPr>
         </p:nvSpPr>
         <p:spPr/>
@@ -12294,10 +15319,57 @@
           </a:p>
         </p:txBody>
       </p:sp>
+      <p:sp>
+        <p:nvSpPr>
+          <p:cNvPr id="6" name="Date Placeholder 5"/>
+          <p:cNvSpPr>
+            <a:spLocks noGrp="1"/>
+          </p:cNvSpPr>
+          <p:nvPr>
+            <p:ph type="dt" idx="12"/>
+          </p:nvPr>
+        </p:nvSpPr>
+        <p:spPr/>
+        <p:txBody>
+          <a:bodyPr/>
+          <a:lstStyle/>
+          <a:p>
+            <a:fld id="{E2F19A73-88F5-4B80-A929-CF8E66EE5449}" type="datetime8">
+              <a:rPr lang="en-US" smtClean="0"/>
+              <a:t>10/17/2019 12:37 PM</a:t>
+            </a:fld>
+            <a:endParaRPr lang="en-US" dirty="0"/>
+          </a:p>
+        </p:txBody>
+      </p:sp>
+      <p:sp>
+        <p:nvSpPr>
+          <p:cNvPr id="7" name="Slide Number Placeholder 6"/>
+          <p:cNvSpPr>
+            <a:spLocks noGrp="1"/>
+          </p:cNvSpPr>
+          <p:nvPr>
+            <p:ph type="sldNum" sz="quarter" idx="13"/>
+          </p:nvPr>
+        </p:nvSpPr>
+        <p:spPr/>
+        <p:txBody>
+          <a:bodyPr/>
+          <a:lstStyle/>
+          <a:p>
+            <a:fld id="{B4008EB6-D09E-4580-8CD6-DDB14511944F}" type="slidenum">
+              <a:rPr lang="en-US" smtClean="0"/>
+              <a:pPr/>
+              <a:t>9</a:t>
+            </a:fld>
+            <a:endParaRPr lang="en-US" dirty="0"/>
+          </a:p>
+        </p:txBody>
+      </p:sp>
     </p:spTree>
     <p:extLst>
       <p:ext uri="{BB962C8B-B14F-4D97-AF65-F5344CB8AC3E}">
-        <p14:creationId xmlns:p14="http://schemas.microsoft.com/office/powerpoint/2010/main" val="2185510719"/>
+        <p14:creationId xmlns:p14="http://schemas.microsoft.com/office/powerpoint/2010/main" val="2548236910"/>
       </p:ext>
     </p:extLst>
   </p:cSld>
@@ -12454,7 +15526,7 @@
           <a:p>
             <a:fld id="{2D3FC8E9-B3DB-4393-9A21-5CD1D770F39E}" type="datetimeFigureOut">
               <a:rPr lang="en-US" smtClean="0"/>
-              <a:t>9/12/2019</a:t>
+              <a:t>10/17/2019</a:t>
             </a:fld>
             <a:endParaRPr lang="en-US"/>
           </a:p>
@@ -12652,7 +15724,7 @@
           <a:p>
             <a:fld id="{2D3FC8E9-B3DB-4393-9A21-5CD1D770F39E}" type="datetimeFigureOut">
               <a:rPr lang="en-US" smtClean="0"/>
-              <a:t>9/12/2019</a:t>
+              <a:t>10/17/2019</a:t>
             </a:fld>
             <a:endParaRPr lang="en-US"/>
           </a:p>
@@ -12860,7 +15932,7 @@
           <a:p>
             <a:fld id="{2D3FC8E9-B3DB-4393-9A21-5CD1D770F39E}" type="datetimeFigureOut">
               <a:rPr lang="en-US" smtClean="0"/>
-              <a:t>9/12/2019</a:t>
+              <a:t>10/17/2019</a:t>
             </a:fld>
             <a:endParaRPr lang="en-US"/>
           </a:p>
@@ -14784,7 +17856,7 @@
           <a:p>
             <a:fld id="{2D3FC8E9-B3DB-4393-9A21-5CD1D770F39E}" type="datetimeFigureOut">
               <a:rPr lang="en-US" smtClean="0"/>
-              <a:t>9/12/2019</a:t>
+              <a:t>10/17/2019</a:t>
             </a:fld>
             <a:endParaRPr lang="en-US"/>
           </a:p>
@@ -17073,7 +20145,7 @@
           <a:p>
             <a:fld id="{2D3FC8E9-B3DB-4393-9A21-5CD1D770F39E}" type="datetimeFigureOut">
               <a:rPr lang="en-US" smtClean="0"/>
-              <a:t>9/12/2019</a:t>
+              <a:t>10/17/2019</a:t>
             </a:fld>
             <a:endParaRPr lang="en-US"/>
           </a:p>
@@ -18838,7 +21910,7 @@
           <a:p>
             <a:fld id="{2D3FC8E9-B3DB-4393-9A21-5CD1D770F39E}" type="datetimeFigureOut">
               <a:rPr lang="en-US" smtClean="0"/>
-              <a:t>9/12/2019</a:t>
+              <a:t>10/17/2019</a:t>
             </a:fld>
             <a:endParaRPr lang="en-US"/>
           </a:p>
@@ -19250,7 +22322,7 @@
           <a:p>
             <a:fld id="{2D3FC8E9-B3DB-4393-9A21-5CD1D770F39E}" type="datetimeFigureOut">
               <a:rPr lang="en-US" smtClean="0"/>
-              <a:t>9/12/2019</a:t>
+              <a:t>10/17/2019</a:t>
             </a:fld>
             <a:endParaRPr lang="en-US"/>
           </a:p>
@@ -19391,7 +22463,7 @@
           <a:p>
             <a:fld id="{2D3FC8E9-B3DB-4393-9A21-5CD1D770F39E}" type="datetimeFigureOut">
               <a:rPr lang="en-US" smtClean="0"/>
-              <a:t>9/12/2019</a:t>
+              <a:t>10/17/2019</a:t>
             </a:fld>
             <a:endParaRPr lang="en-US"/>
           </a:p>
@@ -19504,7 +22576,7 @@
           <a:p>
             <a:fld id="{2D3FC8E9-B3DB-4393-9A21-5CD1D770F39E}" type="datetimeFigureOut">
               <a:rPr lang="en-US" smtClean="0"/>
-              <a:t>9/12/2019</a:t>
+              <a:t>10/17/2019</a:t>
             </a:fld>
             <a:endParaRPr lang="en-US"/>
           </a:p>
@@ -19815,7 +22887,7 @@
           <a:p>
             <a:fld id="{2D3FC8E9-B3DB-4393-9A21-5CD1D770F39E}" type="datetimeFigureOut">
               <a:rPr lang="en-US" smtClean="0"/>
-              <a:t>9/12/2019</a:t>
+              <a:t>10/17/2019</a:t>
             </a:fld>
             <a:endParaRPr lang="en-US"/>
           </a:p>
@@ -20103,7 +23175,7 @@
           <a:p>
             <a:fld id="{2D3FC8E9-B3DB-4393-9A21-5CD1D770F39E}" type="datetimeFigureOut">
               <a:rPr lang="en-US" smtClean="0"/>
-              <a:t>9/12/2019</a:t>
+              <a:t>10/17/2019</a:t>
             </a:fld>
             <a:endParaRPr lang="en-US"/>
           </a:p>
@@ -20344,7 +23416,7 @@
           <a:p>
             <a:fld id="{2D3FC8E9-B3DB-4393-9A21-5CD1D770F39E}" type="datetimeFigureOut">
               <a:rPr lang="en-US" smtClean="0"/>
-              <a:t>9/12/2019</a:t>
+              <a:t>10/17/2019</a:t>
             </a:fld>
             <a:endParaRPr lang="en-US"/>
           </a:p>
@@ -23139,6 +26211,48 @@
 </p:sld>
 </file>
 
+<file path=ppt/slides/slide10.xml><?xml version="1.0" encoding="utf-8"?>
+<p:sld xmlns:a="http://schemas.openxmlformats.org/drawingml/2006/main" xmlns:r="http://schemas.openxmlformats.org/officeDocument/2006/relationships" xmlns:p="http://schemas.openxmlformats.org/presentationml/2006/main">
+  <p:cSld>
+    <p:spTree>
+      <p:nvGrpSpPr>
+        <p:cNvPr id="1" name=""/>
+        <p:cNvGrpSpPr/>
+        <p:nvPr/>
+      </p:nvGrpSpPr>
+      <p:grpSpPr>
+        <a:xfrm>
+          <a:off x="0" y="0"/>
+          <a:ext cx="0" cy="0"/>
+          <a:chOff x="0" y="0"/>
+          <a:chExt cx="0" cy="0"/>
+        </a:xfrm>
+      </p:grpSpPr>
+    </p:spTree>
+    <p:extLst>
+      <p:ext uri="{BB962C8B-B14F-4D97-AF65-F5344CB8AC3E}">
+        <p14:creationId xmlns:p14="http://schemas.microsoft.com/office/powerpoint/2010/main" val="2402828649"/>
+      </p:ext>
+    </p:extLst>
+  </p:cSld>
+  <p:clrMapOvr>
+    <a:masterClrMapping/>
+  </p:clrMapOvr>
+  <mc:AlternateContent xmlns:mc="http://schemas.openxmlformats.org/markup-compatibility/2006" xmlns:p14="http://schemas.microsoft.com/office/powerpoint/2010/main">
+    <mc:Choice Requires="p14">
+      <p:transition spd="med" p14:dur="700">
+        <p:fade/>
+      </p:transition>
+    </mc:Choice>
+    <mc:Fallback xmlns="">
+      <p:transition spd="med">
+        <p:fade/>
+      </p:transition>
+    </mc:Fallback>
+  </mc:AlternateContent>
+</p:sld>
+</file>
+
 <file path=ppt/slides/slide2.xml><?xml version="1.0" encoding="utf-8"?>
 <p:sld xmlns:a="http://schemas.openxmlformats.org/drawingml/2006/main" xmlns:r="http://schemas.openxmlformats.org/officeDocument/2006/relationships" xmlns:p="http://schemas.openxmlformats.org/presentationml/2006/main">
   <p:cSld>
@@ -23991,7 +27105,7 @@
           <p:nvPr>
             <p:extLst>
               <p:ext uri="{D42A27DB-BD31-4B8C-83A1-F6EECF244321}">
-                <p14:modId xmlns:p14="http://schemas.microsoft.com/office/powerpoint/2010/main" val="3698420484"/>
+                <p14:modId xmlns:p14="http://schemas.microsoft.com/office/powerpoint/2010/main" val="3699619072"/>
               </p:ext>
             </p:extLst>
           </p:nvPr>
@@ -25001,6 +28115,213 @@
 <file path=ppt/slides/slide7.xml><?xml version="1.0" encoding="utf-8"?>
 <p:sld xmlns:a="http://schemas.openxmlformats.org/drawingml/2006/main" xmlns:r="http://schemas.openxmlformats.org/officeDocument/2006/relationships" xmlns:p="http://schemas.openxmlformats.org/presentationml/2006/main">
   <p:cSld>
+    <p:bg>
+      <p:bgPr>
+        <a:solidFill>
+          <a:schemeClr val="bg1"/>
+        </a:solidFill>
+        <a:effectLst/>
+      </p:bgPr>
+    </p:bg>
+    <p:spTree>
+      <p:nvGrpSpPr>
+        <p:cNvPr id="1" name=""/>
+        <p:cNvGrpSpPr/>
+        <p:nvPr/>
+      </p:nvGrpSpPr>
+      <p:grpSpPr>
+        <a:xfrm>
+          <a:off x="0" y="0"/>
+          <a:ext cx="0" cy="0"/>
+          <a:chOff x="0" y="0"/>
+          <a:chExt cx="0" cy="0"/>
+        </a:xfrm>
+      </p:grpSpPr>
+      <p:sp>
+        <p:nvSpPr>
+          <p:cNvPr id="2" name="Title 1">
+            <a:extLst>
+              <a:ext uri="{FF2B5EF4-FFF2-40B4-BE49-F238E27FC236}">
+                <a16:creationId xmlns:a16="http://schemas.microsoft.com/office/drawing/2014/main" id="{99E5BAAD-E0C3-4124-B38D-AF24D9B3F527}"/>
+              </a:ext>
+            </a:extLst>
+          </p:cNvPr>
+          <p:cNvSpPr>
+            <a:spLocks noGrp="1"/>
+          </p:cNvSpPr>
+          <p:nvPr>
+            <p:ph type="title"/>
+          </p:nvPr>
+        </p:nvSpPr>
+        <p:spPr>
+          <a:xfrm>
+            <a:off x="870204" y="606564"/>
+            <a:ext cx="10451592" cy="1325563"/>
+          </a:xfrm>
+        </p:spPr>
+        <p:txBody>
+          <a:bodyPr vert="horz" lIns="91440" tIns="45720" rIns="91440" bIns="45720" rtlCol="0" anchor="ctr">
+            <a:normAutofit/>
+          </a:bodyPr>
+          <a:lstStyle/>
+          <a:p>
+            <a:r>
+              <a:rPr lang="en-US" sz="4400" kern="1200">
+                <a:solidFill>
+                  <a:schemeClr val="tx1"/>
+                </a:solidFill>
+                <a:latin typeface="+mj-lt"/>
+                <a:ea typeface="+mj-ea"/>
+                <a:cs typeface="+mj-cs"/>
+              </a:rPr>
+              <a:t>CMPivot</a:t>
+            </a:r>
+          </a:p>
+        </p:txBody>
+      </p:sp>
+      <p:sp>
+        <p:nvSpPr>
+          <p:cNvPr id="17" name="Rectangle 14">
+            <a:extLst>
+              <a:ext uri="{FF2B5EF4-FFF2-40B4-BE49-F238E27FC236}">
+                <a16:creationId xmlns:a16="http://schemas.microsoft.com/office/drawing/2014/main" id="{A5711A0E-A428-4ED1-96CB-33D69FD842E4}"/>
+              </a:ext>
+              <a:ext uri="{C183D7F6-B498-43B3-948B-1728B52AA6E4}">
+                <adec:decorative xmlns:adec="http://schemas.microsoft.com/office/drawing/2017/decorative" val="1"/>
+              </a:ext>
+            </a:extLst>
+          </p:cNvPr>
+          <p:cNvSpPr>
+            <a:spLocks noGrp="1" noRot="1" noChangeAspect="1" noMove="1" noResize="1" noEditPoints="1" noAdjustHandles="1" noChangeArrowheads="1" noChangeShapeType="1" noTextEdit="1"/>
+          </p:cNvSpPr>
+          <p:nvPr>
+            <p:extLst>
+              <p:ext uri="{386F3935-93C4-4BCD-93E2-E3B085C9AB24}">
+                <p16:designElem xmlns:p16="http://schemas.microsoft.com/office/powerpoint/2015/main" val="1"/>
+              </p:ext>
+            </p:extLst>
+          </p:nvPr>
+        </p:nvSpPr>
+        <p:spPr>
+          <a:xfrm>
+            <a:off x="1000874" y="2043803"/>
+            <a:ext cx="10190252" cy="80683"/>
+          </a:xfrm>
+          <a:prstGeom prst="rect">
+            <a:avLst/>
+          </a:prstGeom>
+          <a:solidFill>
+            <a:schemeClr val="tx1">
+              <a:lumMod val="50000"/>
+              <a:lumOff val="50000"/>
+              <a:alpha val="65000"/>
+            </a:schemeClr>
+          </a:solidFill>
+          <a:ln>
+            <a:noFill/>
+          </a:ln>
+        </p:spPr>
+        <p:style>
+          <a:lnRef idx="2">
+            <a:schemeClr val="accent1">
+              <a:shade val="50000"/>
+            </a:schemeClr>
+          </a:lnRef>
+          <a:fillRef idx="1">
+            <a:schemeClr val="accent1"/>
+          </a:fillRef>
+          <a:effectRef idx="0">
+            <a:schemeClr val="accent1"/>
+          </a:effectRef>
+          <a:fontRef idx="minor">
+            <a:schemeClr val="lt1"/>
+          </a:fontRef>
+        </p:style>
+        <p:txBody>
+          <a:bodyPr rtlCol="0" anchor="ctr"/>
+          <a:lstStyle/>
+          <a:p>
+            <a:pPr marL="0" marR="0" lvl="0" indent="0" algn="ctr" defTabSz="457200" rtl="0" eaLnBrk="1" fontAlgn="auto" latinLnBrk="0" hangingPunct="1">
+              <a:lnSpc>
+                <a:spcPct val="100000"/>
+              </a:lnSpc>
+              <a:spcBef>
+                <a:spcPts val="0"/>
+              </a:spcBef>
+              <a:spcAft>
+                <a:spcPts val="0"/>
+              </a:spcAft>
+              <a:buClrTx/>
+              <a:buSzTx/>
+              <a:buFontTx/>
+              <a:buNone/>
+              <a:tabLst/>
+              <a:defRPr/>
+            </a:pPr>
+            <a:endParaRPr kumimoji="0" lang="en-US" sz="1800" b="0" i="0" u="none" strike="noStrike" kern="1200" cap="none" spc="0" normalizeH="0" baseline="0" noProof="0">
+              <a:ln>
+                <a:noFill/>
+              </a:ln>
+              <a:solidFill>
+                <a:prstClr val="white"/>
+              </a:solidFill>
+              <a:effectLst/>
+              <a:uLnTx/>
+              <a:uFillTx/>
+              <a:latin typeface="Calibri" panose="020F0502020204030204"/>
+              <a:ea typeface="+mn-ea"/>
+              <a:cs typeface="+mn-cs"/>
+            </a:endParaRPr>
+          </a:p>
+        </p:txBody>
+      </p:sp>
+      <p:graphicFrame>
+        <p:nvGraphicFramePr>
+          <p:cNvPr id="5" name="Text Placeholder 2">
+            <a:extLst>
+              <a:ext uri="{FF2B5EF4-FFF2-40B4-BE49-F238E27FC236}">
+                <a16:creationId xmlns:a16="http://schemas.microsoft.com/office/drawing/2014/main" id="{457C2F9D-E7F9-4E33-A1A0-52906A648642}"/>
+              </a:ext>
+            </a:extLst>
+          </p:cNvPr>
+          <p:cNvGraphicFramePr/>
+          <p:nvPr>
+            <p:extLst>
+              <p:ext uri="{D42A27DB-BD31-4B8C-83A1-F6EECF244321}">
+                <p14:modId xmlns:p14="http://schemas.microsoft.com/office/powerpoint/2010/main" val="1186419823"/>
+              </p:ext>
+            </p:extLst>
+          </p:nvPr>
+        </p:nvGraphicFramePr>
+        <p:xfrm>
+          <a:off x="1000874" y="2385390"/>
+          <a:ext cx="10190252" cy="3617845"/>
+        </p:xfrm>
+        <a:graphic>
+          <a:graphicData uri="http://schemas.openxmlformats.org/drawingml/2006/diagram">
+            <dgm:relIds xmlns:dgm="http://schemas.openxmlformats.org/drawingml/2006/diagram" xmlns:r="http://schemas.openxmlformats.org/officeDocument/2006/relationships" r:dm="rId3" r:lo="rId4" r:qs="rId5" r:cs="rId6"/>
+          </a:graphicData>
+        </a:graphic>
+      </p:graphicFrame>
+    </p:spTree>
+    <p:extLst>
+      <p:ext uri="{BB962C8B-B14F-4D97-AF65-F5344CB8AC3E}">
+        <p14:creationId xmlns:p14="http://schemas.microsoft.com/office/powerpoint/2010/main" val="1091149744"/>
+      </p:ext>
+    </p:extLst>
+  </p:cSld>
+  <p:clrMapOvr>
+    <a:masterClrMapping/>
+  </p:clrMapOvr>
+  <p:transition>
+    <p:fade/>
+  </p:transition>
+</p:sld>
+</file>
+
+<file path=ppt/slides/slide8.xml><?xml version="1.0" encoding="utf-8"?>
+<p:sld xmlns:a="http://schemas.openxmlformats.org/drawingml/2006/main" xmlns:r="http://schemas.openxmlformats.org/officeDocument/2006/relationships" xmlns:p="http://schemas.openxmlformats.org/presentationml/2006/main">
+  <p:cSld>
     <p:spTree>
       <p:nvGrpSpPr>
         <p:cNvPr id="1" name=""/>
@@ -25046,76 +28367,6 @@
     <p:extLst>
       <p:ext uri="{BB962C8B-B14F-4D97-AF65-F5344CB8AC3E}">
         <p14:creationId xmlns:p14="http://schemas.microsoft.com/office/powerpoint/2010/main" val="203203085"/>
-      </p:ext>
-    </p:extLst>
-  </p:cSld>
-  <p:clrMapOvr>
-    <a:masterClrMapping/>
-  </p:clrMapOvr>
-  <mc:AlternateContent xmlns:mc="http://schemas.openxmlformats.org/markup-compatibility/2006" xmlns:p14="http://schemas.microsoft.com/office/powerpoint/2010/main">
-    <mc:Choice Requires="p14">
-      <p:transition spd="med" p14:dur="700">
-        <p:fade/>
-      </p:transition>
-    </mc:Choice>
-    <mc:Fallback xmlns="">
-      <p:transition spd="med">
-        <p:fade/>
-      </p:transition>
-    </mc:Fallback>
-  </mc:AlternateContent>
-</p:sld>
-</file>
-
-<file path=ppt/slides/slide8.xml><?xml version="1.0" encoding="utf-8"?>
-<p:sld xmlns:a="http://schemas.openxmlformats.org/drawingml/2006/main" xmlns:r="http://schemas.openxmlformats.org/officeDocument/2006/relationships" xmlns:p="http://schemas.openxmlformats.org/presentationml/2006/main">
-  <p:cSld>
-    <p:spTree>
-      <p:nvGrpSpPr>
-        <p:cNvPr id="1" name=""/>
-        <p:cNvGrpSpPr/>
-        <p:nvPr/>
-      </p:nvGrpSpPr>
-      <p:grpSpPr>
-        <a:xfrm>
-          <a:off x="0" y="0"/>
-          <a:ext cx="0" cy="0"/>
-          <a:chOff x="0" y="0"/>
-          <a:chExt cx="0" cy="0"/>
-        </a:xfrm>
-      </p:grpSpPr>
-      <p:sp>
-        <p:nvSpPr>
-          <p:cNvPr id="2" name="Title 1"/>
-          <p:cNvSpPr>
-            <a:spLocks noGrp="1"/>
-          </p:cNvSpPr>
-          <p:nvPr>
-            <p:ph type="title"/>
-          </p:nvPr>
-        </p:nvSpPr>
-        <p:spPr>
-          <a:xfrm>
-            <a:off x="584200" y="3033713"/>
-            <a:ext cx="9144000" cy="498598"/>
-          </a:xfrm>
-        </p:spPr>
-        <p:txBody>
-          <a:bodyPr/>
-          <a:lstStyle/>
-          <a:p>
-            <a:r>
-              <a:rPr lang="en-US"/>
-              <a:t>Questions ???</a:t>
-            </a:r>
-            <a:endParaRPr lang="en-US" dirty="0"/>
-          </a:p>
-        </p:txBody>
-      </p:sp>
-    </p:spTree>
-    <p:extLst>
-      <p:ext uri="{BB962C8B-B14F-4D97-AF65-F5344CB8AC3E}">
-        <p14:creationId xmlns:p14="http://schemas.microsoft.com/office/powerpoint/2010/main" val="3249496989"/>
       </p:ext>
     </p:extLst>
   </p:cSld>
@@ -25154,10 +28405,38 @@
           <a:chExt cx="0" cy="0"/>
         </a:xfrm>
       </p:grpSpPr>
+      <p:sp>
+        <p:nvSpPr>
+          <p:cNvPr id="2" name="Title 1"/>
+          <p:cNvSpPr>
+            <a:spLocks noGrp="1"/>
+          </p:cNvSpPr>
+          <p:nvPr>
+            <p:ph type="title"/>
+          </p:nvPr>
+        </p:nvSpPr>
+        <p:spPr>
+          <a:xfrm>
+            <a:off x="584200" y="3033713"/>
+            <a:ext cx="9144000" cy="498598"/>
+          </a:xfrm>
+        </p:spPr>
+        <p:txBody>
+          <a:bodyPr/>
+          <a:lstStyle/>
+          <a:p>
+            <a:r>
+              <a:rPr lang="en-US"/>
+              <a:t>Questions ???</a:t>
+            </a:r>
+            <a:endParaRPr lang="en-US" dirty="0"/>
+          </a:p>
+        </p:txBody>
+      </p:sp>
     </p:spTree>
     <p:extLst>
       <p:ext uri="{BB962C8B-B14F-4D97-AF65-F5344CB8AC3E}">
-        <p14:creationId xmlns:p14="http://schemas.microsoft.com/office/powerpoint/2010/main" val="2402828649"/>
+        <p14:creationId xmlns:p14="http://schemas.microsoft.com/office/powerpoint/2010/main" val="3249496989"/>
       </p:ext>
     </p:extLst>
   </p:cSld>
@@ -26106,6 +29385,25 @@
 </file>
 
 <file path=customXml/item1.xml><?xml version="1.0" encoding="utf-8"?>
+<?mso-contentType ?>
+<FormTemplates xmlns="http://schemas.microsoft.com/sharepoint/v3/contenttype/forms">
+  <Display>DocumentLibraryForm</Display>
+  <Edit>DocumentLibraryForm</Edit>
+  <New>DocumentLibraryForm</New>
+</FormTemplates>
+</file>
+
+<file path=customXml/item2.xml><?xml version="1.0" encoding="utf-8"?>
+<p:properties xmlns:p="http://schemas.microsoft.com/office/2006/metadata/properties" xmlns:xsi="http://www.w3.org/2001/XMLSchema-instance" xmlns:pc="http://schemas.microsoft.com/office/infopath/2007/PartnerControls">
+  <documentManagement>
+    <_ip_UnifiedCompliancePolicyUIAction xmlns="http://schemas.microsoft.com/sharepoint/v3" xsi:nil="true"/>
+    <MediaServiceKeyPoints xmlns="f24a919e-12c1-483b-830c-4be086a429cb" xsi:nil="true"/>
+    <_ip_UnifiedCompliancePolicyProperties xmlns="http://schemas.microsoft.com/sharepoint/v3" xsi:nil="true"/>
+  </documentManagement>
+</p:properties>
+</file>
+
+<file path=customXml/item3.xml><?xml version="1.0" encoding="utf-8"?>
 <ct:contentTypeSchema xmlns:ct="http://schemas.microsoft.com/office/2006/metadata/contentType" xmlns:ma="http://schemas.microsoft.com/office/2006/metadata/properties/metaAttributes" ct:_="" ma:_="" ma:contentTypeName="Document" ma:contentTypeID="0x010100CD3EAE716A50A145BDE074FAECF1D382" ma:contentTypeVersion="16" ma:contentTypeDescription="Create a new document." ma:contentTypeScope="" ma:versionID="4741153e0d89f1d59e6858885402ebba">
   <xsd:schema xmlns:xsd="http://www.w3.org/2001/XMLSchema" xmlns:xs="http://www.w3.org/2001/XMLSchema" xmlns:p="http://schemas.microsoft.com/office/2006/metadata/properties" xmlns:ns1="http://schemas.microsoft.com/sharepoint/v3" xmlns:ns3="f24a919e-12c1-483b-830c-4be086a429cb" xmlns:ns4="290dade0-5652-4319-9373-9c15370b48af" targetNamespace="http://schemas.microsoft.com/office/2006/metadata/properties" ma:root="true" ma:fieldsID="a68b0955047a84251e7817c246d50fff" ns1:_="" ns3:_="" ns4:_="">
     <xsd:import namespace="http://schemas.microsoft.com/sharepoint/v3"/>
@@ -26351,41 +29649,10 @@
 </ct:contentTypeSchema>
 </file>
 
-<file path=customXml/item2.xml><?xml version="1.0" encoding="utf-8"?>
-<p:properties xmlns:p="http://schemas.microsoft.com/office/2006/metadata/properties" xmlns:xsi="http://www.w3.org/2001/XMLSchema-instance" xmlns:pc="http://schemas.microsoft.com/office/infopath/2007/PartnerControls">
-  <documentManagement>
-    <_ip_UnifiedCompliancePolicyUIAction xmlns="http://schemas.microsoft.com/sharepoint/v3" xsi:nil="true"/>
-    <MediaServiceKeyPoints xmlns="f24a919e-12c1-483b-830c-4be086a429cb" xsi:nil="true"/>
-    <_ip_UnifiedCompliancePolicyProperties xmlns="http://schemas.microsoft.com/sharepoint/v3" xsi:nil="true"/>
-  </documentManagement>
-</p:properties>
-</file>
-
-<file path=customXml/item3.xml><?xml version="1.0" encoding="utf-8"?>
-<?mso-contentType ?>
-<FormTemplates xmlns="http://schemas.microsoft.com/sharepoint/v3/contenttype/forms">
-  <Display>DocumentLibraryForm</Display>
-  <Edit>DocumentLibraryForm</Edit>
-  <New>DocumentLibraryForm</New>
-</FormTemplates>
-</file>
-
 <file path=customXml/itemProps1.xml><?xml version="1.0" encoding="utf-8"?>
-<ds:datastoreItem xmlns:ds="http://schemas.openxmlformats.org/officeDocument/2006/customXml" ds:itemID="{F690D854-605C-474F-82D7-374502032DD6}">
+<ds:datastoreItem xmlns:ds="http://schemas.openxmlformats.org/officeDocument/2006/customXml" ds:itemID="{7C7D1F02-298E-4AC2-9048-2A5A3C9F8E96}">
   <ds:schemaRefs>
-    <ds:schemaRef ds:uri="http://schemas.microsoft.com/office/2006/metadata/contentType"/>
-    <ds:schemaRef ds:uri="http://schemas.microsoft.com/office/2006/metadata/properties/metaAttributes"/>
-    <ds:schemaRef ds:uri="http://www.w3.org/2001/XMLSchema"/>
-    <ds:schemaRef ds:uri="http://schemas.microsoft.com/office/2006/metadata/properties"/>
-    <ds:schemaRef ds:uri="http://schemas.microsoft.com/sharepoint/v3"/>
-    <ds:schemaRef ds:uri="f24a919e-12c1-483b-830c-4be086a429cb"/>
-    <ds:schemaRef ds:uri="290dade0-5652-4319-9373-9c15370b48af"/>
-    <ds:schemaRef ds:uri="http://schemas.microsoft.com/office/2006/documentManagement/types"/>
-    <ds:schemaRef ds:uri="http://schemas.microsoft.com/office/infopath/2007/PartnerControls"/>
-    <ds:schemaRef ds:uri="http://schemas.openxmlformats.org/package/2006/metadata/core-properties"/>
-    <ds:schemaRef ds:uri="http://purl.org/dc/elements/1.1/"/>
-    <ds:schemaRef ds:uri="http://purl.org/dc/terms/"/>
-    <ds:schemaRef ds:uri="http://schemas.microsoft.com/internal/obd"/>
+    <ds:schemaRef ds:uri="http://schemas.microsoft.com/sharepoint/v3/contenttype/forms"/>
   </ds:schemaRefs>
 </ds:datastoreItem>
 </file>
@@ -26409,9 +29676,21 @@
 </file>
 
 <file path=customXml/itemProps3.xml><?xml version="1.0" encoding="utf-8"?>
-<ds:datastoreItem xmlns:ds="http://schemas.openxmlformats.org/officeDocument/2006/customXml" ds:itemID="{7C7D1F02-298E-4AC2-9048-2A5A3C9F8E96}">
+<ds:datastoreItem xmlns:ds="http://schemas.openxmlformats.org/officeDocument/2006/customXml" ds:itemID="{F690D854-605C-474F-82D7-374502032DD6}">
   <ds:schemaRefs>
-    <ds:schemaRef ds:uri="http://schemas.microsoft.com/sharepoint/v3/contenttype/forms"/>
+    <ds:schemaRef ds:uri="http://schemas.microsoft.com/office/2006/metadata/contentType"/>
+    <ds:schemaRef ds:uri="http://schemas.microsoft.com/office/2006/metadata/properties/metaAttributes"/>
+    <ds:schemaRef ds:uri="http://www.w3.org/2001/XMLSchema"/>
+    <ds:schemaRef ds:uri="http://schemas.microsoft.com/office/2006/metadata/properties"/>
+    <ds:schemaRef ds:uri="http://schemas.microsoft.com/sharepoint/v3"/>
+    <ds:schemaRef ds:uri="f24a919e-12c1-483b-830c-4be086a429cb"/>
+    <ds:schemaRef ds:uri="290dade0-5652-4319-9373-9c15370b48af"/>
+    <ds:schemaRef ds:uri="http://schemas.microsoft.com/office/2006/documentManagement/types"/>
+    <ds:schemaRef ds:uri="http://schemas.microsoft.com/office/infopath/2007/PartnerControls"/>
+    <ds:schemaRef ds:uri="http://schemas.openxmlformats.org/package/2006/metadata/core-properties"/>
+    <ds:schemaRef ds:uri="http://purl.org/dc/elements/1.1/"/>
+    <ds:schemaRef ds:uri="http://purl.org/dc/terms/"/>
+    <ds:schemaRef ds:uri="http://schemas.microsoft.com/internal/obd"/>
   </ds:schemaRefs>
 </ds:datastoreItem>
 </file>
</xml_diff>